<commit_message>
Eliminato utils da modules e diagramma stati iniziato
</commit_message>
<xml_diff>
--- a/docs/diagram.pptx
+++ b/docs/diagram.pptx
@@ -6,6 +6,7 @@
   </p:sldMasterIdLst>
   <p:sldIdLst>
     <p:sldId id="256" r:id="rId2"/>
+    <p:sldId id="257" r:id="rId3"/>
   </p:sldIdLst>
   <p:sldSz cx="12192000" cy="6858000"/>
   <p:notesSz cx="6858000" cy="9144000"/>
@@ -259,7 +260,7 @@
           <a:p>
             <a:fld id="{C3B0D377-F0C3-DB42-9866-B6F08E6D4957}" type="datetimeFigureOut">
               <a:rPr lang="it-IT" smtClean="0"/>
-              <a:t>05/01/22</a:t>
+              <a:t>06/02/2022</a:t>
             </a:fld>
             <a:endParaRPr lang="it-IT"/>
           </a:p>
@@ -457,7 +458,7 @@
           <a:p>
             <a:fld id="{C3B0D377-F0C3-DB42-9866-B6F08E6D4957}" type="datetimeFigureOut">
               <a:rPr lang="it-IT" smtClean="0"/>
-              <a:t>05/01/22</a:t>
+              <a:t>06/02/2022</a:t>
             </a:fld>
             <a:endParaRPr lang="it-IT"/>
           </a:p>
@@ -665,7 +666,7 @@
           <a:p>
             <a:fld id="{C3B0D377-F0C3-DB42-9866-B6F08E6D4957}" type="datetimeFigureOut">
               <a:rPr lang="it-IT" smtClean="0"/>
-              <a:t>05/01/22</a:t>
+              <a:t>06/02/2022</a:t>
             </a:fld>
             <a:endParaRPr lang="it-IT"/>
           </a:p>
@@ -863,7 +864,7 @@
           <a:p>
             <a:fld id="{C3B0D377-F0C3-DB42-9866-B6F08E6D4957}" type="datetimeFigureOut">
               <a:rPr lang="it-IT" smtClean="0"/>
-              <a:t>05/01/22</a:t>
+              <a:t>06/02/2022</a:t>
             </a:fld>
             <a:endParaRPr lang="it-IT"/>
           </a:p>
@@ -1138,7 +1139,7 @@
           <a:p>
             <a:fld id="{C3B0D377-F0C3-DB42-9866-B6F08E6D4957}" type="datetimeFigureOut">
               <a:rPr lang="it-IT" smtClean="0"/>
-              <a:t>05/01/22</a:t>
+              <a:t>06/02/2022</a:t>
             </a:fld>
             <a:endParaRPr lang="it-IT"/>
           </a:p>
@@ -1403,7 +1404,7 @@
           <a:p>
             <a:fld id="{C3B0D377-F0C3-DB42-9866-B6F08E6D4957}" type="datetimeFigureOut">
               <a:rPr lang="it-IT" smtClean="0"/>
-              <a:t>05/01/22</a:t>
+              <a:t>06/02/2022</a:t>
             </a:fld>
             <a:endParaRPr lang="it-IT"/>
           </a:p>
@@ -1815,7 +1816,7 @@
           <a:p>
             <a:fld id="{C3B0D377-F0C3-DB42-9866-B6F08E6D4957}" type="datetimeFigureOut">
               <a:rPr lang="it-IT" smtClean="0"/>
-              <a:t>05/01/22</a:t>
+              <a:t>06/02/2022</a:t>
             </a:fld>
             <a:endParaRPr lang="it-IT"/>
           </a:p>
@@ -1956,7 +1957,7 @@
           <a:p>
             <a:fld id="{C3B0D377-F0C3-DB42-9866-B6F08E6D4957}" type="datetimeFigureOut">
               <a:rPr lang="it-IT" smtClean="0"/>
-              <a:t>05/01/22</a:t>
+              <a:t>06/02/2022</a:t>
             </a:fld>
             <a:endParaRPr lang="it-IT"/>
           </a:p>
@@ -2069,7 +2070,7 @@
           <a:p>
             <a:fld id="{C3B0D377-F0C3-DB42-9866-B6F08E6D4957}" type="datetimeFigureOut">
               <a:rPr lang="it-IT" smtClean="0"/>
-              <a:t>05/01/22</a:t>
+              <a:t>06/02/2022</a:t>
             </a:fld>
             <a:endParaRPr lang="it-IT"/>
           </a:p>
@@ -2380,7 +2381,7 @@
           <a:p>
             <a:fld id="{C3B0D377-F0C3-DB42-9866-B6F08E6D4957}" type="datetimeFigureOut">
               <a:rPr lang="it-IT" smtClean="0"/>
-              <a:t>05/01/22</a:t>
+              <a:t>06/02/2022</a:t>
             </a:fld>
             <a:endParaRPr lang="it-IT"/>
           </a:p>
@@ -2668,7 +2669,7 @@
           <a:p>
             <a:fld id="{C3B0D377-F0C3-DB42-9866-B6F08E6D4957}" type="datetimeFigureOut">
               <a:rPr lang="it-IT" smtClean="0"/>
-              <a:t>05/01/22</a:t>
+              <a:t>06/02/2022</a:t>
             </a:fld>
             <a:endParaRPr lang="it-IT"/>
           </a:p>
@@ -2909,7 +2910,7 @@
           <a:p>
             <a:fld id="{C3B0D377-F0C3-DB42-9866-B6F08E6D4957}" type="datetimeFigureOut">
               <a:rPr lang="it-IT" smtClean="0"/>
-              <a:t>05/01/22</a:t>
+              <a:t>06/02/2022</a:t>
             </a:fld>
             <a:endParaRPr lang="it-IT"/>
           </a:p>
@@ -6129,6 +6130,264 @@
 </p:sld>
 </file>
 
+<file path=ppt/slides/slide2.xml><?xml version="1.0" encoding="utf-8"?>
+<p:sld xmlns:a="http://schemas.openxmlformats.org/drawingml/2006/main" xmlns:r="http://schemas.openxmlformats.org/officeDocument/2006/relationships" xmlns:p="http://schemas.openxmlformats.org/presentationml/2006/main">
+  <p:cSld>
+    <p:spTree>
+      <p:nvGrpSpPr>
+        <p:cNvPr id="1" name=""/>
+        <p:cNvGrpSpPr/>
+        <p:nvPr/>
+      </p:nvGrpSpPr>
+      <p:grpSpPr>
+        <a:xfrm>
+          <a:off x="0" y="0"/>
+          <a:ext cx="0" cy="0"/>
+          <a:chOff x="0" y="0"/>
+          <a:chExt cx="0" cy="0"/>
+        </a:xfrm>
+      </p:grpSpPr>
+      <p:sp>
+        <p:nvSpPr>
+          <p:cNvPr id="2" name="CasellaDiTesto 1">
+            <a:extLst>
+              <a:ext uri="{FF2B5EF4-FFF2-40B4-BE49-F238E27FC236}">
+                <a16:creationId xmlns:a16="http://schemas.microsoft.com/office/drawing/2014/main" id="{BA3DA572-6DB1-43A6-85DD-912F1F618AD3}"/>
+              </a:ext>
+            </a:extLst>
+          </p:cNvPr>
+          <p:cNvSpPr txBox="1"/>
+          <p:nvPr/>
+        </p:nvSpPr>
+        <p:spPr>
+          <a:xfrm>
+            <a:off x="3793787" y="165052"/>
+            <a:ext cx="4260715" cy="369332"/>
+          </a:xfrm>
+          <a:prstGeom prst="rect">
+            <a:avLst/>
+          </a:prstGeom>
+          <a:noFill/>
+        </p:spPr>
+        <p:txBody>
+          <a:bodyPr wrap="square" rtlCol="0">
+            <a:spAutoFit/>
+          </a:bodyPr>
+          <a:lstStyle/>
+          <a:p>
+            <a:r>
+              <a:rPr lang="it-IT" dirty="0"/>
+              <a:t>Diagramma a stati: «Consegna pacchi»</a:t>
+            </a:r>
+          </a:p>
+        </p:txBody>
+      </p:sp>
+      <p:sp>
+        <p:nvSpPr>
+          <p:cNvPr id="3" name="Ovale 2">
+            <a:extLst>
+              <a:ext uri="{FF2B5EF4-FFF2-40B4-BE49-F238E27FC236}">
+                <a16:creationId xmlns:a16="http://schemas.microsoft.com/office/drawing/2014/main" id="{16E17F8D-45F2-4731-84D3-3C50DDB413B4}"/>
+              </a:ext>
+            </a:extLst>
+          </p:cNvPr>
+          <p:cNvSpPr/>
+          <p:nvPr/>
+        </p:nvSpPr>
+        <p:spPr>
+          <a:xfrm>
+            <a:off x="112309" y="990001"/>
+            <a:ext cx="1745673" cy="887437"/>
+          </a:xfrm>
+          <a:prstGeom prst="ellipse">
+            <a:avLst/>
+          </a:prstGeom>
+        </p:spPr>
+        <p:style>
+          <a:lnRef idx="2">
+            <a:schemeClr val="accent1">
+              <a:shade val="50000"/>
+            </a:schemeClr>
+          </a:lnRef>
+          <a:fillRef idx="1">
+            <a:schemeClr val="accent1"/>
+          </a:fillRef>
+          <a:effectRef idx="0">
+            <a:schemeClr val="accent1"/>
+          </a:effectRef>
+          <a:fontRef idx="minor">
+            <a:schemeClr val="lt1"/>
+          </a:fontRef>
+        </p:style>
+        <p:txBody>
+          <a:bodyPr rtlCol="0" anchor="ctr"/>
+          <a:lstStyle/>
+          <a:p>
+            <a:pPr algn="ctr"/>
+            <a:endParaRPr lang="it-IT" dirty="0"/>
+          </a:p>
+          <a:p>
+            <a:pPr algn="ctr"/>
+            <a:r>
+              <a:rPr lang="it-IT" dirty="0"/>
+              <a:t>Check new </a:t>
+            </a:r>
+            <a:r>
+              <a:rPr lang="it-IT" dirty="0" err="1"/>
+              <a:t>orders</a:t>
+            </a:r>
+            <a:endParaRPr lang="it-IT" dirty="0"/>
+          </a:p>
+          <a:p>
+            <a:pPr algn="ctr"/>
+            <a:endParaRPr lang="it-IT" dirty="0"/>
+          </a:p>
+        </p:txBody>
+      </p:sp>
+      <p:sp>
+        <p:nvSpPr>
+          <p:cNvPr id="4" name="Ovale 3">
+            <a:extLst>
+              <a:ext uri="{FF2B5EF4-FFF2-40B4-BE49-F238E27FC236}">
+                <a16:creationId xmlns:a16="http://schemas.microsoft.com/office/drawing/2014/main" id="{6EBCAB3B-666D-4207-B86F-F637948719E1}"/>
+              </a:ext>
+            </a:extLst>
+          </p:cNvPr>
+          <p:cNvSpPr/>
+          <p:nvPr/>
+        </p:nvSpPr>
+        <p:spPr>
+          <a:xfrm>
+            <a:off x="2650639" y="990000"/>
+            <a:ext cx="1745673" cy="887437"/>
+          </a:xfrm>
+          <a:prstGeom prst="ellipse">
+            <a:avLst/>
+          </a:prstGeom>
+        </p:spPr>
+        <p:style>
+          <a:lnRef idx="2">
+            <a:schemeClr val="accent1">
+              <a:shade val="50000"/>
+            </a:schemeClr>
+          </a:lnRef>
+          <a:fillRef idx="1">
+            <a:schemeClr val="accent1"/>
+          </a:fillRef>
+          <a:effectRef idx="0">
+            <a:schemeClr val="accent1"/>
+          </a:effectRef>
+          <a:fontRef idx="minor">
+            <a:schemeClr val="lt1"/>
+          </a:fontRef>
+        </p:style>
+        <p:txBody>
+          <a:bodyPr rtlCol="0" anchor="ctr"/>
+          <a:lstStyle/>
+          <a:p>
+            <a:pPr algn="ctr"/>
+            <a:endParaRPr lang="it-IT" dirty="0"/>
+          </a:p>
+          <a:p>
+            <a:pPr algn="ctr"/>
+            <a:r>
+              <a:rPr lang="it-IT" dirty="0"/>
+              <a:t>Reach quota</a:t>
+            </a:r>
+          </a:p>
+          <a:p>
+            <a:pPr algn="ctr"/>
+            <a:endParaRPr lang="it-IT" dirty="0"/>
+          </a:p>
+        </p:txBody>
+      </p:sp>
+      <p:cxnSp>
+        <p:nvCxnSpPr>
+          <p:cNvPr id="6" name="Connettore 2 5">
+            <a:extLst>
+              <a:ext uri="{FF2B5EF4-FFF2-40B4-BE49-F238E27FC236}">
+                <a16:creationId xmlns:a16="http://schemas.microsoft.com/office/drawing/2014/main" id="{D8150B61-8A5B-4B57-8CCA-941BE9DFFA58}"/>
+              </a:ext>
+            </a:extLst>
+          </p:cNvPr>
+          <p:cNvCxnSpPr>
+            <a:stCxn id="3" idx="6"/>
+            <a:endCxn id="4" idx="2"/>
+          </p:cNvCxnSpPr>
+          <p:nvPr/>
+        </p:nvCxnSpPr>
+        <p:spPr>
+          <a:xfrm flipV="1">
+            <a:off x="1857982" y="1433719"/>
+            <a:ext cx="792657" cy="1"/>
+          </a:xfrm>
+          <a:prstGeom prst="straightConnector1">
+            <a:avLst/>
+          </a:prstGeom>
+          <a:ln>
+            <a:tailEnd type="triangle"/>
+          </a:ln>
+        </p:spPr>
+        <p:style>
+          <a:lnRef idx="1">
+            <a:schemeClr val="accent1"/>
+          </a:lnRef>
+          <a:fillRef idx="0">
+            <a:schemeClr val="accent1"/>
+          </a:fillRef>
+          <a:effectRef idx="0">
+            <a:schemeClr val="accent1"/>
+          </a:effectRef>
+          <a:fontRef idx="minor">
+            <a:schemeClr val="tx1"/>
+          </a:fontRef>
+        </p:style>
+      </p:cxnSp>
+      <p:sp>
+        <p:nvSpPr>
+          <p:cNvPr id="7" name="CasellaDiTesto 6">
+            <a:extLst>
+              <a:ext uri="{FF2B5EF4-FFF2-40B4-BE49-F238E27FC236}">
+                <a16:creationId xmlns:a16="http://schemas.microsoft.com/office/drawing/2014/main" id="{2EA1005B-2754-49A6-B0A5-8759185BA2DC}"/>
+              </a:ext>
+            </a:extLst>
+          </p:cNvPr>
+          <p:cNvSpPr txBox="1"/>
+          <p:nvPr/>
+        </p:nvSpPr>
+        <p:spPr>
+          <a:xfrm>
+            <a:off x="1862894" y="1027194"/>
+            <a:ext cx="184731" cy="369332"/>
+          </a:xfrm>
+          <a:prstGeom prst="rect">
+            <a:avLst/>
+          </a:prstGeom>
+          <a:noFill/>
+        </p:spPr>
+        <p:txBody>
+          <a:bodyPr wrap="none" rtlCol="0">
+            <a:spAutoFit/>
+          </a:bodyPr>
+          <a:lstStyle/>
+          <a:p>
+            <a:endParaRPr lang="it-IT" dirty="0"/>
+          </a:p>
+        </p:txBody>
+      </p:sp>
+    </p:spTree>
+    <p:extLst>
+      <p:ext uri="{BB962C8B-B14F-4D97-AF65-F5344CB8AC3E}">
+        <p14:creationId xmlns:p14="http://schemas.microsoft.com/office/powerpoint/2010/main" val="2151255226"/>
+      </p:ext>
+    </p:extLst>
+  </p:cSld>
+  <p:clrMapOvr>
+    <a:masterClrMapping/>
+  </p:clrMapOvr>
+</p:sld>
+</file>
+
 <file path=ppt/theme/theme1.xml><?xml version="1.0" encoding="utf-8"?>
 <a:theme xmlns:a="http://schemas.openxmlformats.org/drawingml/2006/main" name="Tema di Office">
   <a:themeElements>

</xml_diff>

<commit_message>
Terminare emergenzy e comunicazione diagram
</commit_message>
<xml_diff>
--- a/docs/diagram.pptx
+++ b/docs/diagram.pptx
@@ -3371,13 +3371,8 @@
             <a:pPr algn="ctr"/>
             <a:r>
               <a:rPr lang="it-IT" dirty="0"/>
-              <a:t>Check new </a:t>
-            </a:r>
-            <a:r>
-              <a:rPr lang="it-IT" dirty="0" err="1"/>
-              <a:t>orders</a:t>
-            </a:r>
-            <a:endParaRPr lang="it-IT" dirty="0"/>
+              <a:t>Check new orders</a:t>
+            </a:r>
           </a:p>
           <a:p>
             <a:pPr algn="ctr"/>
@@ -3439,12 +3434,8 @@
           <a:p>
             <a:pPr algn="ctr"/>
             <a:r>
-              <a:rPr lang="it-IT" dirty="0" err="1"/>
-              <a:t>orders</a:t>
-            </a:r>
-            <a:r>
               <a:rPr lang="it-IT" dirty="0"/>
-              <a:t> list</a:t>
+              <a:t>orders list</a:t>
             </a:r>
           </a:p>
         </p:txBody>
@@ -3493,13 +3484,8 @@
             <a:pPr algn="ctr"/>
             <a:r>
               <a:rPr lang="it-IT" dirty="0"/>
-              <a:t>Update </a:t>
-            </a:r>
-            <a:r>
-              <a:rPr lang="it-IT" dirty="0" err="1"/>
-              <a:t>orders</a:t>
-            </a:r>
-            <a:endParaRPr lang="it-IT" dirty="0"/>
+              <a:t>Update orders</a:t>
+            </a:r>
           </a:p>
         </p:txBody>
       </p:sp>
@@ -3633,15 +3619,7 @@
             <a:pPr algn="ctr"/>
             <a:r>
               <a:rPr lang="it-IT" dirty="0"/>
-              <a:t>Global </a:t>
-            </a:r>
-            <a:r>
-              <a:rPr lang="it-IT" dirty="0" err="1"/>
-              <a:t>orders</a:t>
-            </a:r>
-            <a:r>
-              <a:rPr lang="it-IT" dirty="0"/>
-              <a:t> list</a:t>
+              <a:t>Global orders list</a:t>
             </a:r>
           </a:p>
         </p:txBody>
@@ -4079,21 +4057,8 @@
           <a:p>
             <a:r>
               <a:rPr lang="it-IT" dirty="0"/>
-              <a:t>No </a:t>
-            </a:r>
-            <a:r>
-              <a:rPr lang="it-IT" dirty="0" err="1"/>
-              <a:t>orders</a:t>
-            </a:r>
-            <a:r>
-              <a:rPr lang="it-IT" dirty="0"/>
-              <a:t> || no </a:t>
-            </a:r>
-            <a:r>
-              <a:rPr lang="it-IT" dirty="0" err="1"/>
-              <a:t>battery</a:t>
-            </a:r>
-            <a:endParaRPr lang="it-IT" dirty="0"/>
+              <a:t>No orders || no battery</a:t>
+            </a:r>
           </a:p>
         </p:txBody>
       </p:sp>
@@ -4383,13 +4348,8 @@
           <a:p>
             <a:r>
               <a:rPr lang="it-IT" sz="1400" dirty="0"/>
-              <a:t>&amp;&amp; </a:t>
-            </a:r>
-            <a:r>
-              <a:rPr lang="it-IT" sz="1400" dirty="0" err="1"/>
-              <a:t>battery</a:t>
-            </a:r>
-            <a:endParaRPr lang="it-IT" sz="1400" dirty="0"/>
+              <a:t>&amp;&amp; battery</a:t>
+            </a:r>
           </a:p>
         </p:txBody>
       </p:sp>
@@ -6196,7 +6156,7 @@
         </p:nvSpPr>
         <p:spPr>
           <a:xfrm>
-            <a:off x="112309" y="990001"/>
+            <a:off x="168951" y="990001"/>
             <a:ext cx="1745673" cy="887437"/>
           </a:xfrm>
           <a:prstGeom prst="ellipse">
@@ -6230,13 +6190,8 @@
             <a:pPr algn="ctr"/>
             <a:r>
               <a:rPr lang="it-IT" dirty="0"/>
-              <a:t>Check new </a:t>
-            </a:r>
-            <a:r>
-              <a:rPr lang="it-IT" dirty="0" err="1"/>
-              <a:t>orders</a:t>
-            </a:r>
-            <a:endParaRPr lang="it-IT" dirty="0"/>
+              <a:t>Check new orders (1)</a:t>
+            </a:r>
           </a:p>
           <a:p>
             <a:pPr algn="ctr"/>
@@ -6258,7 +6213,7 @@
         </p:nvSpPr>
         <p:spPr>
           <a:xfrm>
-            <a:off x="2650639" y="990000"/>
+            <a:off x="2650639" y="1024172"/>
             <a:ext cx="1745673" cy="887437"/>
           </a:xfrm>
           <a:prstGeom prst="ellipse">
@@ -6292,7 +6247,7 @@
             <a:pPr algn="ctr"/>
             <a:r>
               <a:rPr lang="it-IT" dirty="0"/>
-              <a:t>Reach quota</a:t>
+              <a:t>Reach quota (2)</a:t>
             </a:r>
           </a:p>
           <a:p>
@@ -6317,9 +6272,9 @@
           <p:nvPr/>
         </p:nvCxnSpPr>
         <p:spPr>
-          <a:xfrm flipV="1">
-            <a:off x="1857982" y="1433719"/>
-            <a:ext cx="792657" cy="1"/>
+          <a:xfrm>
+            <a:off x="1914624" y="1433720"/>
+            <a:ext cx="736015" cy="34171"/>
           </a:xfrm>
           <a:prstGeom prst="straightConnector1">
             <a:avLst/>
@@ -6372,6 +6327,3096 @@
           <a:lstStyle/>
           <a:p>
             <a:endParaRPr lang="it-IT" dirty="0"/>
+          </a:p>
+        </p:txBody>
+      </p:sp>
+      <p:sp>
+        <p:nvSpPr>
+          <p:cNvPr id="5" name="CasellaDiTesto 4">
+            <a:extLst>
+              <a:ext uri="{FF2B5EF4-FFF2-40B4-BE49-F238E27FC236}">
+                <a16:creationId xmlns:a16="http://schemas.microsoft.com/office/drawing/2014/main" id="{392D0768-54EF-491D-89FF-06B6C11FE33D}"/>
+              </a:ext>
+            </a:extLst>
+          </p:cNvPr>
+          <p:cNvSpPr txBox="1"/>
+          <p:nvPr/>
+        </p:nvSpPr>
+        <p:spPr>
+          <a:xfrm rot="2118385">
+            <a:off x="1672405" y="1929661"/>
+            <a:ext cx="1163810" cy="307777"/>
+          </a:xfrm>
+          <a:prstGeom prst="rect">
+            <a:avLst/>
+          </a:prstGeom>
+          <a:noFill/>
+        </p:spPr>
+        <p:txBody>
+          <a:bodyPr wrap="square" rtlCol="0">
+            <a:spAutoFit/>
+          </a:bodyPr>
+          <a:lstStyle/>
+          <a:p>
+            <a:r>
+              <a:rPr lang="it-IT" sz="1400" dirty="0"/>
+              <a:t>O &amp; !CB &amp; !5</a:t>
+            </a:r>
+          </a:p>
+        </p:txBody>
+      </p:sp>
+      <p:sp>
+        <p:nvSpPr>
+          <p:cNvPr id="8" name="Ovale 7">
+            <a:extLst>
+              <a:ext uri="{FF2B5EF4-FFF2-40B4-BE49-F238E27FC236}">
+                <a16:creationId xmlns:a16="http://schemas.microsoft.com/office/drawing/2014/main" id="{40B82C80-5833-4E7A-BD8F-E1A7EDB89CC4}"/>
+              </a:ext>
+            </a:extLst>
+          </p:cNvPr>
+          <p:cNvSpPr/>
+          <p:nvPr/>
+        </p:nvSpPr>
+        <p:spPr>
+          <a:xfrm>
+            <a:off x="2650638" y="2075743"/>
+            <a:ext cx="1745673" cy="887437"/>
+          </a:xfrm>
+          <a:prstGeom prst="ellipse">
+            <a:avLst/>
+          </a:prstGeom>
+        </p:spPr>
+        <p:style>
+          <a:lnRef idx="2">
+            <a:schemeClr val="accent1">
+              <a:shade val="50000"/>
+            </a:schemeClr>
+          </a:lnRef>
+          <a:fillRef idx="1">
+            <a:schemeClr val="accent1"/>
+          </a:fillRef>
+          <a:effectRef idx="0">
+            <a:schemeClr val="accent1"/>
+          </a:effectRef>
+          <a:fontRef idx="minor">
+            <a:schemeClr val="lt1"/>
+          </a:fontRef>
+        </p:style>
+        <p:txBody>
+          <a:bodyPr rtlCol="0" anchor="ctr"/>
+          <a:lstStyle/>
+          <a:p>
+            <a:pPr algn="ctr"/>
+            <a:r>
+              <a:rPr lang="it-IT" dirty="0"/>
+              <a:t>Recharge battery (3)</a:t>
+            </a:r>
+          </a:p>
+        </p:txBody>
+      </p:sp>
+      <p:cxnSp>
+        <p:nvCxnSpPr>
+          <p:cNvPr id="11" name="Connettore 2 10">
+            <a:extLst>
+              <a:ext uri="{FF2B5EF4-FFF2-40B4-BE49-F238E27FC236}">
+                <a16:creationId xmlns:a16="http://schemas.microsoft.com/office/drawing/2014/main" id="{0F1F56E0-EF63-4D76-B1F5-981E9ABD69A9}"/>
+              </a:ext>
+            </a:extLst>
+          </p:cNvPr>
+          <p:cNvCxnSpPr>
+            <a:stCxn id="3" idx="5"/>
+            <a:endCxn id="8" idx="2"/>
+          </p:cNvCxnSpPr>
+          <p:nvPr/>
+        </p:nvCxnSpPr>
+        <p:spPr>
+          <a:xfrm>
+            <a:off x="1658976" y="1747476"/>
+            <a:ext cx="991662" cy="771986"/>
+          </a:xfrm>
+          <a:prstGeom prst="straightConnector1">
+            <a:avLst/>
+          </a:prstGeom>
+          <a:ln>
+            <a:tailEnd type="triangle"/>
+          </a:ln>
+        </p:spPr>
+        <p:style>
+          <a:lnRef idx="1">
+            <a:schemeClr val="accent1"/>
+          </a:lnRef>
+          <a:fillRef idx="0">
+            <a:schemeClr val="accent1"/>
+          </a:fillRef>
+          <a:effectRef idx="0">
+            <a:schemeClr val="accent1"/>
+          </a:effectRef>
+          <a:fontRef idx="minor">
+            <a:schemeClr val="tx1"/>
+          </a:fontRef>
+        </p:style>
+      </p:cxnSp>
+      <p:sp>
+        <p:nvSpPr>
+          <p:cNvPr id="12" name="CasellaDiTesto 11">
+            <a:extLst>
+              <a:ext uri="{FF2B5EF4-FFF2-40B4-BE49-F238E27FC236}">
+                <a16:creationId xmlns:a16="http://schemas.microsoft.com/office/drawing/2014/main" id="{421C74FD-C553-4D8C-B3E5-2CE03FEA7D59}"/>
+              </a:ext>
+            </a:extLst>
+          </p:cNvPr>
+          <p:cNvSpPr txBox="1"/>
+          <p:nvPr/>
+        </p:nvSpPr>
+        <p:spPr>
+          <a:xfrm>
+            <a:off x="1857982" y="1196115"/>
+            <a:ext cx="977388" cy="307777"/>
+          </a:xfrm>
+          <a:prstGeom prst="rect">
+            <a:avLst/>
+          </a:prstGeom>
+          <a:noFill/>
+        </p:spPr>
+        <p:txBody>
+          <a:bodyPr wrap="square" rtlCol="0">
+            <a:spAutoFit/>
+          </a:bodyPr>
+          <a:lstStyle/>
+          <a:p>
+            <a:r>
+              <a:rPr lang="it-IT" sz="1400" dirty="0"/>
+              <a:t>O &amp; CB</a:t>
+            </a:r>
+          </a:p>
+        </p:txBody>
+      </p:sp>
+      <p:cxnSp>
+        <p:nvCxnSpPr>
+          <p:cNvPr id="13" name="Connettore 2 12">
+            <a:extLst>
+              <a:ext uri="{FF2B5EF4-FFF2-40B4-BE49-F238E27FC236}">
+                <a16:creationId xmlns:a16="http://schemas.microsoft.com/office/drawing/2014/main" id="{4E992D47-4BEF-4B6A-9A87-C41DEF301F6A}"/>
+              </a:ext>
+            </a:extLst>
+          </p:cNvPr>
+          <p:cNvCxnSpPr>
+            <a:cxnSpLocks/>
+          </p:cNvCxnSpPr>
+          <p:nvPr/>
+        </p:nvCxnSpPr>
+        <p:spPr>
+          <a:xfrm>
+            <a:off x="1062383" y="1879271"/>
+            <a:ext cx="451792" cy="1095802"/>
+          </a:xfrm>
+          <a:prstGeom prst="straightConnector1">
+            <a:avLst/>
+          </a:prstGeom>
+          <a:ln>
+            <a:tailEnd type="triangle"/>
+          </a:ln>
+        </p:spPr>
+        <p:style>
+          <a:lnRef idx="1">
+            <a:schemeClr val="accent1"/>
+          </a:lnRef>
+          <a:fillRef idx="0">
+            <a:schemeClr val="accent1"/>
+          </a:fillRef>
+          <a:effectRef idx="0">
+            <a:schemeClr val="accent1"/>
+          </a:effectRef>
+          <a:fontRef idx="minor">
+            <a:schemeClr val="tx1"/>
+          </a:fontRef>
+        </p:style>
+      </p:cxnSp>
+      <p:sp>
+        <p:nvSpPr>
+          <p:cNvPr id="15" name="Ovale 14">
+            <a:extLst>
+              <a:ext uri="{FF2B5EF4-FFF2-40B4-BE49-F238E27FC236}">
+                <a16:creationId xmlns:a16="http://schemas.microsoft.com/office/drawing/2014/main" id="{D1199056-AB7E-4BBF-8166-556811F1B783}"/>
+              </a:ext>
+            </a:extLst>
+          </p:cNvPr>
+          <p:cNvSpPr/>
+          <p:nvPr/>
+        </p:nvSpPr>
+        <p:spPr>
+          <a:xfrm>
+            <a:off x="1062382" y="2873713"/>
+            <a:ext cx="2089616" cy="1158321"/>
+          </a:xfrm>
+          <a:prstGeom prst="ellipse">
+            <a:avLst/>
+          </a:prstGeom>
+        </p:spPr>
+        <p:style>
+          <a:lnRef idx="2">
+            <a:schemeClr val="accent1">
+              <a:shade val="50000"/>
+            </a:schemeClr>
+          </a:lnRef>
+          <a:fillRef idx="1">
+            <a:schemeClr val="accent1"/>
+          </a:fillRef>
+          <a:effectRef idx="0">
+            <a:schemeClr val="accent1"/>
+          </a:effectRef>
+          <a:fontRef idx="minor">
+            <a:schemeClr val="lt1"/>
+          </a:fontRef>
+        </p:style>
+        <p:txBody>
+          <a:bodyPr rtlCol="0" anchor="ctr"/>
+          <a:lstStyle/>
+          <a:p>
+            <a:pPr algn="ctr"/>
+            <a:endParaRPr lang="en-US" dirty="0">
+              <a:solidFill>
+                <a:schemeClr val="bg1"/>
+              </a:solidFill>
+            </a:endParaRPr>
+          </a:p>
+          <a:p>
+            <a:pPr algn="ctr"/>
+            <a:r>
+              <a:rPr lang="en-US" dirty="0">
+                <a:solidFill>
+                  <a:schemeClr val="bg1"/>
+                </a:solidFill>
+              </a:rPr>
+              <a:t>S</a:t>
+            </a:r>
+            <a:r>
+              <a:rPr lang="en-US" b="0" dirty="0">
+                <a:solidFill>
+                  <a:schemeClr val="bg1"/>
+                </a:solidFill>
+                <a:effectLst/>
+              </a:rPr>
+              <a:t>tabilize</a:t>
+            </a:r>
+            <a:r>
+              <a:rPr lang="en-US" dirty="0">
+                <a:solidFill>
+                  <a:schemeClr val="bg1"/>
+                </a:solidFill>
+              </a:rPr>
+              <a:t> </a:t>
+            </a:r>
+            <a:r>
+              <a:rPr lang="en-US" b="0" dirty="0">
+                <a:solidFill>
+                  <a:schemeClr val="bg1"/>
+                </a:solidFill>
+                <a:effectLst/>
+              </a:rPr>
+              <a:t>before</a:t>
+            </a:r>
+            <a:r>
+              <a:rPr lang="en-US" dirty="0">
+                <a:solidFill>
+                  <a:schemeClr val="bg1"/>
+                </a:solidFill>
+              </a:rPr>
+              <a:t> </a:t>
+            </a:r>
+            <a:r>
+              <a:rPr lang="en-US" b="0" dirty="0">
+                <a:solidFill>
+                  <a:schemeClr val="bg1"/>
+                </a:solidFill>
+                <a:effectLst/>
+              </a:rPr>
+              <a:t>land</a:t>
+            </a:r>
+            <a:r>
+              <a:rPr lang="en-US" dirty="0">
+                <a:solidFill>
+                  <a:schemeClr val="bg1"/>
+                </a:solidFill>
+              </a:rPr>
+              <a:t> </a:t>
+            </a:r>
+            <a:r>
+              <a:rPr lang="en-US" b="0" dirty="0">
+                <a:solidFill>
+                  <a:schemeClr val="bg1"/>
+                </a:solidFill>
+                <a:effectLst/>
+              </a:rPr>
+              <a:t>on</a:t>
+            </a:r>
+            <a:r>
+              <a:rPr lang="en-US" dirty="0">
+                <a:solidFill>
+                  <a:schemeClr val="bg1"/>
+                </a:solidFill>
+              </a:rPr>
+              <a:t> </a:t>
+            </a:r>
+            <a:r>
+              <a:rPr lang="en-US" b="0" dirty="0">
+                <a:solidFill>
+                  <a:schemeClr val="bg1"/>
+                </a:solidFill>
+                <a:effectLst/>
+              </a:rPr>
+              <a:t>base (4)</a:t>
+            </a:r>
+          </a:p>
+          <a:p>
+            <a:pPr algn="ctr"/>
+            <a:endParaRPr lang="it-IT" dirty="0"/>
+          </a:p>
+        </p:txBody>
+      </p:sp>
+      <p:sp>
+        <p:nvSpPr>
+          <p:cNvPr id="16" name="CasellaDiTesto 15">
+            <a:extLst>
+              <a:ext uri="{FF2B5EF4-FFF2-40B4-BE49-F238E27FC236}">
+                <a16:creationId xmlns:a16="http://schemas.microsoft.com/office/drawing/2014/main" id="{570E7552-58FC-45E9-95A0-3411C6BCF1E1}"/>
+              </a:ext>
+            </a:extLst>
+          </p:cNvPr>
+          <p:cNvSpPr txBox="1"/>
+          <p:nvPr/>
+        </p:nvSpPr>
+        <p:spPr>
+          <a:xfrm rot="3782367">
+            <a:off x="1280990" y="2300442"/>
+            <a:ext cx="1163810" cy="307777"/>
+          </a:xfrm>
+          <a:prstGeom prst="rect">
+            <a:avLst/>
+          </a:prstGeom>
+          <a:noFill/>
+        </p:spPr>
+        <p:txBody>
+          <a:bodyPr wrap="square" rtlCol="0">
+            <a:spAutoFit/>
+          </a:bodyPr>
+          <a:lstStyle/>
+          <a:p>
+            <a:r>
+              <a:rPr lang="it-IT" sz="1400" dirty="0"/>
+              <a:t>O &amp; !CB &amp; 5</a:t>
+            </a:r>
+          </a:p>
+        </p:txBody>
+      </p:sp>
+      <p:cxnSp>
+        <p:nvCxnSpPr>
+          <p:cNvPr id="21" name="Connettore 2 20">
+            <a:extLst>
+              <a:ext uri="{FF2B5EF4-FFF2-40B4-BE49-F238E27FC236}">
+                <a16:creationId xmlns:a16="http://schemas.microsoft.com/office/drawing/2014/main" id="{BCD0B8CD-ECC8-4DDE-9376-9344945D2D58}"/>
+              </a:ext>
+            </a:extLst>
+          </p:cNvPr>
+          <p:cNvCxnSpPr>
+            <a:cxnSpLocks/>
+          </p:cNvCxnSpPr>
+          <p:nvPr/>
+        </p:nvCxnSpPr>
+        <p:spPr>
+          <a:xfrm>
+            <a:off x="1420517" y="1794122"/>
+            <a:ext cx="525624" cy="1079591"/>
+          </a:xfrm>
+          <a:prstGeom prst="straightConnector1">
+            <a:avLst/>
+          </a:prstGeom>
+          <a:ln>
+            <a:tailEnd type="triangle"/>
+          </a:ln>
+        </p:spPr>
+        <p:style>
+          <a:lnRef idx="1">
+            <a:schemeClr val="accent1"/>
+          </a:lnRef>
+          <a:fillRef idx="0">
+            <a:schemeClr val="accent1"/>
+          </a:fillRef>
+          <a:effectRef idx="0">
+            <a:schemeClr val="accent1"/>
+          </a:effectRef>
+          <a:fontRef idx="minor">
+            <a:schemeClr val="tx1"/>
+          </a:fontRef>
+        </p:style>
+      </p:cxnSp>
+      <p:sp>
+        <p:nvSpPr>
+          <p:cNvPr id="24" name="CasellaDiTesto 23">
+            <a:extLst>
+              <a:ext uri="{FF2B5EF4-FFF2-40B4-BE49-F238E27FC236}">
+                <a16:creationId xmlns:a16="http://schemas.microsoft.com/office/drawing/2014/main" id="{39CC834B-30D1-433C-8688-FB548F9A6B97}"/>
+              </a:ext>
+            </a:extLst>
+          </p:cNvPr>
+          <p:cNvSpPr txBox="1"/>
+          <p:nvPr/>
+        </p:nvSpPr>
+        <p:spPr>
+          <a:xfrm rot="4167982">
+            <a:off x="901864" y="2481025"/>
+            <a:ext cx="1163810" cy="307777"/>
+          </a:xfrm>
+          <a:prstGeom prst="rect">
+            <a:avLst/>
+          </a:prstGeom>
+          <a:noFill/>
+        </p:spPr>
+        <p:txBody>
+          <a:bodyPr wrap="square" rtlCol="0">
+            <a:spAutoFit/>
+          </a:bodyPr>
+          <a:lstStyle/>
+          <a:p>
+            <a:r>
+              <a:rPr lang="it-IT" sz="1400" dirty="0"/>
+              <a:t>!O &amp; 5</a:t>
+            </a:r>
+          </a:p>
+        </p:txBody>
+      </p:sp>
+      <p:sp>
+        <p:nvSpPr>
+          <p:cNvPr id="25" name="Ovale 24">
+            <a:extLst>
+              <a:ext uri="{FF2B5EF4-FFF2-40B4-BE49-F238E27FC236}">
+                <a16:creationId xmlns:a16="http://schemas.microsoft.com/office/drawing/2014/main" id="{DD5AE540-AD69-458A-B53A-3E17BF1B59D4}"/>
+              </a:ext>
+            </a:extLst>
+          </p:cNvPr>
+          <p:cNvSpPr/>
+          <p:nvPr/>
+        </p:nvSpPr>
+        <p:spPr>
+          <a:xfrm>
+            <a:off x="59257" y="5171643"/>
+            <a:ext cx="1745673" cy="887437"/>
+          </a:xfrm>
+          <a:prstGeom prst="ellipse">
+            <a:avLst/>
+          </a:prstGeom>
+        </p:spPr>
+        <p:style>
+          <a:lnRef idx="2">
+            <a:schemeClr val="accent1">
+              <a:shade val="50000"/>
+            </a:schemeClr>
+          </a:lnRef>
+          <a:fillRef idx="1">
+            <a:schemeClr val="accent1"/>
+          </a:fillRef>
+          <a:effectRef idx="0">
+            <a:schemeClr val="accent1"/>
+          </a:effectRef>
+          <a:fontRef idx="minor">
+            <a:schemeClr val="lt1"/>
+          </a:fontRef>
+        </p:style>
+        <p:txBody>
+          <a:bodyPr rtlCol="0" anchor="ctr"/>
+          <a:lstStyle/>
+          <a:p>
+            <a:pPr algn="ctr"/>
+            <a:endParaRPr lang="it-IT" dirty="0"/>
+          </a:p>
+          <a:p>
+            <a:pPr algn="ctr"/>
+            <a:r>
+              <a:rPr lang="it-IT" dirty="0"/>
+              <a:t>Go back home (5)</a:t>
+            </a:r>
+          </a:p>
+          <a:p>
+            <a:pPr algn="ctr"/>
+            <a:endParaRPr lang="it-IT" dirty="0"/>
+          </a:p>
+        </p:txBody>
+      </p:sp>
+      <p:cxnSp>
+        <p:nvCxnSpPr>
+          <p:cNvPr id="27" name="Connettore 2 26">
+            <a:extLst>
+              <a:ext uri="{FF2B5EF4-FFF2-40B4-BE49-F238E27FC236}">
+                <a16:creationId xmlns:a16="http://schemas.microsoft.com/office/drawing/2014/main" id="{18D4E82A-3C80-4428-A775-8459828395C7}"/>
+              </a:ext>
+            </a:extLst>
+          </p:cNvPr>
+          <p:cNvCxnSpPr>
+            <a:cxnSpLocks/>
+            <a:endCxn id="25" idx="0"/>
+          </p:cNvCxnSpPr>
+          <p:nvPr/>
+        </p:nvCxnSpPr>
+        <p:spPr>
+          <a:xfrm>
+            <a:off x="746344" y="1794122"/>
+            <a:ext cx="185750" cy="3377521"/>
+          </a:xfrm>
+          <a:prstGeom prst="straightConnector1">
+            <a:avLst/>
+          </a:prstGeom>
+          <a:ln>
+            <a:tailEnd type="triangle"/>
+          </a:ln>
+        </p:spPr>
+        <p:style>
+          <a:lnRef idx="1">
+            <a:schemeClr val="accent1"/>
+          </a:lnRef>
+          <a:fillRef idx="0">
+            <a:schemeClr val="accent1"/>
+          </a:fillRef>
+          <a:effectRef idx="0">
+            <a:schemeClr val="accent1"/>
+          </a:effectRef>
+          <a:fontRef idx="minor">
+            <a:schemeClr val="tx1"/>
+          </a:fontRef>
+        </p:style>
+      </p:cxnSp>
+      <p:sp>
+        <p:nvSpPr>
+          <p:cNvPr id="28" name="CasellaDiTesto 27">
+            <a:extLst>
+              <a:ext uri="{FF2B5EF4-FFF2-40B4-BE49-F238E27FC236}">
+                <a16:creationId xmlns:a16="http://schemas.microsoft.com/office/drawing/2014/main" id="{E31E96AF-FEB3-4488-9340-2A9DA8C7691A}"/>
+              </a:ext>
+            </a:extLst>
+          </p:cNvPr>
+          <p:cNvSpPr txBox="1"/>
+          <p:nvPr/>
+        </p:nvSpPr>
+        <p:spPr>
+          <a:xfrm rot="5201319">
+            <a:off x="308994" y="2798978"/>
+            <a:ext cx="1163810" cy="307777"/>
+          </a:xfrm>
+          <a:prstGeom prst="rect">
+            <a:avLst/>
+          </a:prstGeom>
+          <a:noFill/>
+        </p:spPr>
+        <p:txBody>
+          <a:bodyPr wrap="square" rtlCol="0">
+            <a:spAutoFit/>
+          </a:bodyPr>
+          <a:lstStyle/>
+          <a:p>
+            <a:r>
+              <a:rPr lang="it-IT" sz="1400" dirty="0"/>
+              <a:t>!O &amp; ?</a:t>
+            </a:r>
+          </a:p>
+        </p:txBody>
+      </p:sp>
+      <p:cxnSp>
+        <p:nvCxnSpPr>
+          <p:cNvPr id="31" name="Connettore a gomito 30">
+            <a:extLst>
+              <a:ext uri="{FF2B5EF4-FFF2-40B4-BE49-F238E27FC236}">
+                <a16:creationId xmlns:a16="http://schemas.microsoft.com/office/drawing/2014/main" id="{0CD930D9-0515-4107-9A0A-AB1422E11E94}"/>
+              </a:ext>
+            </a:extLst>
+          </p:cNvPr>
+          <p:cNvCxnSpPr>
+            <a:stCxn id="3" idx="1"/>
+            <a:endCxn id="3" idx="0"/>
+          </p:cNvCxnSpPr>
+          <p:nvPr/>
+        </p:nvCxnSpPr>
+        <p:spPr>
+          <a:xfrm rot="5400000" flipH="1" flipV="1">
+            <a:off x="668212" y="746388"/>
+            <a:ext cx="129962" cy="617189"/>
+          </a:xfrm>
+          <a:prstGeom prst="bentConnector3">
+            <a:avLst>
+              <a:gd name="adj1" fmla="val 275898"/>
+            </a:avLst>
+          </a:prstGeom>
+          <a:ln>
+            <a:tailEnd type="triangle"/>
+          </a:ln>
+        </p:spPr>
+        <p:style>
+          <a:lnRef idx="1">
+            <a:schemeClr val="accent1"/>
+          </a:lnRef>
+          <a:fillRef idx="0">
+            <a:schemeClr val="accent1"/>
+          </a:fillRef>
+          <a:effectRef idx="0">
+            <a:schemeClr val="accent1"/>
+          </a:effectRef>
+          <a:fontRef idx="minor">
+            <a:schemeClr val="tx1"/>
+          </a:fontRef>
+        </p:style>
+      </p:cxnSp>
+      <p:sp>
+        <p:nvSpPr>
+          <p:cNvPr id="32" name="CasellaDiTesto 31">
+            <a:extLst>
+              <a:ext uri="{FF2B5EF4-FFF2-40B4-BE49-F238E27FC236}">
+                <a16:creationId xmlns:a16="http://schemas.microsoft.com/office/drawing/2014/main" id="{7E7C011C-F729-403A-B23E-A777D1F46475}"/>
+              </a:ext>
+            </a:extLst>
+          </p:cNvPr>
+          <p:cNvSpPr txBox="1"/>
+          <p:nvPr/>
+        </p:nvSpPr>
+        <p:spPr>
+          <a:xfrm>
+            <a:off x="440144" y="521395"/>
+            <a:ext cx="977388" cy="307777"/>
+          </a:xfrm>
+          <a:prstGeom prst="rect">
+            <a:avLst/>
+          </a:prstGeom>
+          <a:noFill/>
+        </p:spPr>
+        <p:txBody>
+          <a:bodyPr wrap="square" rtlCol="0">
+            <a:spAutoFit/>
+          </a:bodyPr>
+          <a:lstStyle/>
+          <a:p>
+            <a:r>
+              <a:rPr lang="it-IT" sz="1400" dirty="0"/>
+              <a:t>TAC</a:t>
+            </a:r>
+          </a:p>
+        </p:txBody>
+      </p:sp>
+      <p:sp>
+        <p:nvSpPr>
+          <p:cNvPr id="33" name="Ovale 32">
+            <a:extLst>
+              <a:ext uri="{FF2B5EF4-FFF2-40B4-BE49-F238E27FC236}">
+                <a16:creationId xmlns:a16="http://schemas.microsoft.com/office/drawing/2014/main" id="{CFA66643-3484-4ECE-B87A-40183AD25BFB}"/>
+              </a:ext>
+            </a:extLst>
+          </p:cNvPr>
+          <p:cNvSpPr/>
+          <p:nvPr/>
+        </p:nvSpPr>
+        <p:spPr>
+          <a:xfrm>
+            <a:off x="4789776" y="1024171"/>
+            <a:ext cx="1745673" cy="887437"/>
+          </a:xfrm>
+          <a:prstGeom prst="ellipse">
+            <a:avLst/>
+          </a:prstGeom>
+        </p:spPr>
+        <p:style>
+          <a:lnRef idx="2">
+            <a:schemeClr val="accent1">
+              <a:shade val="50000"/>
+            </a:schemeClr>
+          </a:lnRef>
+          <a:fillRef idx="1">
+            <a:schemeClr val="accent1"/>
+          </a:fillRef>
+          <a:effectRef idx="0">
+            <a:schemeClr val="accent1"/>
+          </a:effectRef>
+          <a:fontRef idx="minor">
+            <a:schemeClr val="lt1"/>
+          </a:fontRef>
+        </p:style>
+        <p:txBody>
+          <a:bodyPr rtlCol="0" anchor="ctr"/>
+          <a:lstStyle/>
+          <a:p>
+            <a:pPr algn="ctr"/>
+            <a:endParaRPr lang="it-IT" dirty="0"/>
+          </a:p>
+          <a:p>
+            <a:pPr algn="ctr"/>
+            <a:r>
+              <a:rPr lang="it-IT" dirty="0"/>
+              <a:t>Go near box (6)</a:t>
+            </a:r>
+          </a:p>
+          <a:p>
+            <a:pPr algn="ctr"/>
+            <a:endParaRPr lang="it-IT" dirty="0"/>
+          </a:p>
+        </p:txBody>
+      </p:sp>
+      <p:cxnSp>
+        <p:nvCxnSpPr>
+          <p:cNvPr id="35" name="Connettore 2 34">
+            <a:extLst>
+              <a:ext uri="{FF2B5EF4-FFF2-40B4-BE49-F238E27FC236}">
+                <a16:creationId xmlns:a16="http://schemas.microsoft.com/office/drawing/2014/main" id="{52E4E617-C0D0-4667-998C-288D81698694}"/>
+              </a:ext>
+            </a:extLst>
+          </p:cNvPr>
+          <p:cNvCxnSpPr>
+            <a:stCxn id="4" idx="6"/>
+            <a:endCxn id="33" idx="2"/>
+          </p:cNvCxnSpPr>
+          <p:nvPr/>
+        </p:nvCxnSpPr>
+        <p:spPr>
+          <a:xfrm flipV="1">
+            <a:off x="4396312" y="1467890"/>
+            <a:ext cx="393464" cy="1"/>
+          </a:xfrm>
+          <a:prstGeom prst="straightConnector1">
+            <a:avLst/>
+          </a:prstGeom>
+          <a:ln>
+            <a:tailEnd type="triangle"/>
+          </a:ln>
+        </p:spPr>
+        <p:style>
+          <a:lnRef idx="1">
+            <a:schemeClr val="accent1"/>
+          </a:lnRef>
+          <a:fillRef idx="0">
+            <a:schemeClr val="accent1"/>
+          </a:fillRef>
+          <a:effectRef idx="0">
+            <a:schemeClr val="accent1"/>
+          </a:effectRef>
+          <a:fontRef idx="minor">
+            <a:schemeClr val="tx1"/>
+          </a:fontRef>
+        </p:style>
+      </p:cxnSp>
+      <p:sp>
+        <p:nvSpPr>
+          <p:cNvPr id="37" name="CasellaDiTesto 36">
+            <a:extLst>
+              <a:ext uri="{FF2B5EF4-FFF2-40B4-BE49-F238E27FC236}">
+                <a16:creationId xmlns:a16="http://schemas.microsoft.com/office/drawing/2014/main" id="{1912F515-360C-4905-8CDA-3E10AD380AD2}"/>
+              </a:ext>
+            </a:extLst>
+          </p:cNvPr>
+          <p:cNvSpPr txBox="1"/>
+          <p:nvPr/>
+        </p:nvSpPr>
+        <p:spPr>
+          <a:xfrm>
+            <a:off x="4314410" y="1217692"/>
+            <a:ext cx="977388" cy="307777"/>
+          </a:xfrm>
+          <a:prstGeom prst="rect">
+            <a:avLst/>
+          </a:prstGeom>
+          <a:noFill/>
+        </p:spPr>
+        <p:txBody>
+          <a:bodyPr wrap="square" rtlCol="0">
+            <a:spAutoFit/>
+          </a:bodyPr>
+          <a:lstStyle/>
+          <a:p>
+            <a:r>
+              <a:rPr lang="it-IT" sz="1400" dirty="0"/>
+              <a:t> QR</a:t>
+            </a:r>
+          </a:p>
+        </p:txBody>
+      </p:sp>
+      <p:cxnSp>
+        <p:nvCxnSpPr>
+          <p:cNvPr id="38" name="Connettore a gomito 37">
+            <a:extLst>
+              <a:ext uri="{FF2B5EF4-FFF2-40B4-BE49-F238E27FC236}">
+                <a16:creationId xmlns:a16="http://schemas.microsoft.com/office/drawing/2014/main" id="{2A859DE0-8E93-4685-B616-59AC76F0FC35}"/>
+              </a:ext>
+            </a:extLst>
+          </p:cNvPr>
+          <p:cNvCxnSpPr/>
+          <p:nvPr/>
+        </p:nvCxnSpPr>
+        <p:spPr>
+          <a:xfrm rot="5400000" flipH="1" flipV="1">
+            <a:off x="3149900" y="788520"/>
+            <a:ext cx="129962" cy="617189"/>
+          </a:xfrm>
+          <a:prstGeom prst="bentConnector3">
+            <a:avLst>
+              <a:gd name="adj1" fmla="val 275898"/>
+            </a:avLst>
+          </a:prstGeom>
+          <a:ln>
+            <a:tailEnd type="triangle"/>
+          </a:ln>
+        </p:spPr>
+        <p:style>
+          <a:lnRef idx="1">
+            <a:schemeClr val="accent1"/>
+          </a:lnRef>
+          <a:fillRef idx="0">
+            <a:schemeClr val="accent1"/>
+          </a:fillRef>
+          <a:effectRef idx="0">
+            <a:schemeClr val="accent1"/>
+          </a:effectRef>
+          <a:fontRef idx="minor">
+            <a:schemeClr val="tx1"/>
+          </a:fontRef>
+        </p:style>
+      </p:cxnSp>
+      <p:sp>
+        <p:nvSpPr>
+          <p:cNvPr id="39" name="CasellaDiTesto 38">
+            <a:extLst>
+              <a:ext uri="{FF2B5EF4-FFF2-40B4-BE49-F238E27FC236}">
+                <a16:creationId xmlns:a16="http://schemas.microsoft.com/office/drawing/2014/main" id="{DCC2D12A-E653-4BB1-9FB8-AE703B86387F}"/>
+              </a:ext>
+            </a:extLst>
+          </p:cNvPr>
+          <p:cNvSpPr txBox="1"/>
+          <p:nvPr/>
+        </p:nvSpPr>
+        <p:spPr>
+          <a:xfrm>
+            <a:off x="2974378" y="546982"/>
+            <a:ext cx="977388" cy="307777"/>
+          </a:xfrm>
+          <a:prstGeom prst="rect">
+            <a:avLst/>
+          </a:prstGeom>
+          <a:noFill/>
+        </p:spPr>
+        <p:txBody>
+          <a:bodyPr wrap="square" rtlCol="0">
+            <a:spAutoFit/>
+          </a:bodyPr>
+          <a:lstStyle/>
+          <a:p>
+            <a:r>
+              <a:rPr lang="it-IT" sz="1400" dirty="0"/>
+              <a:t>!QR</a:t>
+            </a:r>
+          </a:p>
+        </p:txBody>
+      </p:sp>
+      <p:sp>
+        <p:nvSpPr>
+          <p:cNvPr id="40" name="Ovale 39">
+            <a:extLst>
+              <a:ext uri="{FF2B5EF4-FFF2-40B4-BE49-F238E27FC236}">
+                <a16:creationId xmlns:a16="http://schemas.microsoft.com/office/drawing/2014/main" id="{A20C307B-C0DF-406A-8128-9DE732F34704}"/>
+              </a:ext>
+            </a:extLst>
+          </p:cNvPr>
+          <p:cNvSpPr/>
+          <p:nvPr/>
+        </p:nvSpPr>
+        <p:spPr>
+          <a:xfrm>
+            <a:off x="6955569" y="1024172"/>
+            <a:ext cx="1745673" cy="887437"/>
+          </a:xfrm>
+          <a:prstGeom prst="ellipse">
+            <a:avLst/>
+          </a:prstGeom>
+        </p:spPr>
+        <p:style>
+          <a:lnRef idx="2">
+            <a:schemeClr val="accent1">
+              <a:shade val="50000"/>
+            </a:schemeClr>
+          </a:lnRef>
+          <a:fillRef idx="1">
+            <a:schemeClr val="accent1"/>
+          </a:fillRef>
+          <a:effectRef idx="0">
+            <a:schemeClr val="accent1"/>
+          </a:effectRef>
+          <a:fontRef idx="minor">
+            <a:schemeClr val="lt1"/>
+          </a:fontRef>
+        </p:style>
+        <p:txBody>
+          <a:bodyPr rtlCol="0" anchor="ctr"/>
+          <a:lstStyle/>
+          <a:p>
+            <a:pPr algn="ctr"/>
+            <a:endParaRPr lang="it-IT" dirty="0"/>
+          </a:p>
+          <a:p>
+            <a:pPr algn="ctr"/>
+            <a:r>
+              <a:rPr lang="it-IT" dirty="0"/>
+              <a:t>Stabilize on position (7)</a:t>
+            </a:r>
+          </a:p>
+          <a:p>
+            <a:pPr algn="ctr"/>
+            <a:endParaRPr lang="it-IT" dirty="0"/>
+          </a:p>
+        </p:txBody>
+      </p:sp>
+      <p:cxnSp>
+        <p:nvCxnSpPr>
+          <p:cNvPr id="43" name="Connettore 2 42">
+            <a:extLst>
+              <a:ext uri="{FF2B5EF4-FFF2-40B4-BE49-F238E27FC236}">
+                <a16:creationId xmlns:a16="http://schemas.microsoft.com/office/drawing/2014/main" id="{8794928F-4532-47A6-A71E-3397D1DD9351}"/>
+              </a:ext>
+            </a:extLst>
+          </p:cNvPr>
+          <p:cNvCxnSpPr>
+            <a:stCxn id="33" idx="6"/>
+            <a:endCxn id="40" idx="2"/>
+          </p:cNvCxnSpPr>
+          <p:nvPr/>
+        </p:nvCxnSpPr>
+        <p:spPr>
+          <a:xfrm>
+            <a:off x="6535449" y="1467890"/>
+            <a:ext cx="420120" cy="1"/>
+          </a:xfrm>
+          <a:prstGeom prst="straightConnector1">
+            <a:avLst/>
+          </a:prstGeom>
+          <a:ln>
+            <a:tailEnd type="triangle"/>
+          </a:ln>
+        </p:spPr>
+        <p:style>
+          <a:lnRef idx="1">
+            <a:schemeClr val="accent1"/>
+          </a:lnRef>
+          <a:fillRef idx="0">
+            <a:schemeClr val="accent1"/>
+          </a:fillRef>
+          <a:effectRef idx="0">
+            <a:schemeClr val="accent1"/>
+          </a:effectRef>
+          <a:fontRef idx="minor">
+            <a:schemeClr val="tx1"/>
+          </a:fontRef>
+        </p:style>
+      </p:cxnSp>
+      <p:sp>
+        <p:nvSpPr>
+          <p:cNvPr id="45" name="CasellaDiTesto 44">
+            <a:extLst>
+              <a:ext uri="{FF2B5EF4-FFF2-40B4-BE49-F238E27FC236}">
+                <a16:creationId xmlns:a16="http://schemas.microsoft.com/office/drawing/2014/main" id="{6C128365-4404-4ACD-A27D-ADB311BAE3EA}"/>
+              </a:ext>
+            </a:extLst>
+          </p:cNvPr>
+          <p:cNvSpPr txBox="1"/>
+          <p:nvPr/>
+        </p:nvSpPr>
+        <p:spPr>
+          <a:xfrm>
+            <a:off x="6466875" y="1242637"/>
+            <a:ext cx="977388" cy="307777"/>
+          </a:xfrm>
+          <a:prstGeom prst="rect">
+            <a:avLst/>
+          </a:prstGeom>
+          <a:noFill/>
+        </p:spPr>
+        <p:txBody>
+          <a:bodyPr wrap="square" rtlCol="0">
+            <a:spAutoFit/>
+          </a:bodyPr>
+          <a:lstStyle/>
+          <a:p>
+            <a:r>
+              <a:rPr lang="it-IT" sz="1400" dirty="0"/>
+              <a:t> BR</a:t>
+            </a:r>
+          </a:p>
+        </p:txBody>
+      </p:sp>
+      <p:cxnSp>
+        <p:nvCxnSpPr>
+          <p:cNvPr id="46" name="Connettore a gomito 45">
+            <a:extLst>
+              <a:ext uri="{FF2B5EF4-FFF2-40B4-BE49-F238E27FC236}">
+                <a16:creationId xmlns:a16="http://schemas.microsoft.com/office/drawing/2014/main" id="{4146DB41-D5C3-4F2C-8C66-7EA00400DC05}"/>
+              </a:ext>
+            </a:extLst>
+          </p:cNvPr>
+          <p:cNvCxnSpPr/>
+          <p:nvPr/>
+        </p:nvCxnSpPr>
+        <p:spPr>
+          <a:xfrm rot="5400000" flipH="1" flipV="1">
+            <a:off x="5297059" y="789666"/>
+            <a:ext cx="129962" cy="617189"/>
+          </a:xfrm>
+          <a:prstGeom prst="bentConnector3">
+            <a:avLst>
+              <a:gd name="adj1" fmla="val 275898"/>
+            </a:avLst>
+          </a:prstGeom>
+          <a:ln>
+            <a:tailEnd type="triangle"/>
+          </a:ln>
+        </p:spPr>
+        <p:style>
+          <a:lnRef idx="1">
+            <a:schemeClr val="accent1"/>
+          </a:lnRef>
+          <a:fillRef idx="0">
+            <a:schemeClr val="accent1"/>
+          </a:fillRef>
+          <a:effectRef idx="0">
+            <a:schemeClr val="accent1"/>
+          </a:effectRef>
+          <a:fontRef idx="minor">
+            <a:schemeClr val="tx1"/>
+          </a:fontRef>
+        </p:style>
+      </p:cxnSp>
+      <p:sp>
+        <p:nvSpPr>
+          <p:cNvPr id="47" name="CasellaDiTesto 46">
+            <a:extLst>
+              <a:ext uri="{FF2B5EF4-FFF2-40B4-BE49-F238E27FC236}">
+                <a16:creationId xmlns:a16="http://schemas.microsoft.com/office/drawing/2014/main" id="{72D9907F-E9F6-4B9D-AAD6-BDF5E1B1BA17}"/>
+              </a:ext>
+            </a:extLst>
+          </p:cNvPr>
+          <p:cNvSpPr txBox="1"/>
+          <p:nvPr/>
+        </p:nvSpPr>
+        <p:spPr>
+          <a:xfrm>
+            <a:off x="5112848" y="544502"/>
+            <a:ext cx="977388" cy="307777"/>
+          </a:xfrm>
+          <a:prstGeom prst="rect">
+            <a:avLst/>
+          </a:prstGeom>
+          <a:noFill/>
+        </p:spPr>
+        <p:txBody>
+          <a:bodyPr wrap="square" rtlCol="0">
+            <a:spAutoFit/>
+          </a:bodyPr>
+          <a:lstStyle/>
+          <a:p>
+            <a:r>
+              <a:rPr lang="it-IT" sz="1400" dirty="0"/>
+              <a:t>!BR</a:t>
+            </a:r>
+          </a:p>
+        </p:txBody>
+      </p:sp>
+      <p:sp>
+        <p:nvSpPr>
+          <p:cNvPr id="48" name="Ovale 47">
+            <a:extLst>
+              <a:ext uri="{FF2B5EF4-FFF2-40B4-BE49-F238E27FC236}">
+                <a16:creationId xmlns:a16="http://schemas.microsoft.com/office/drawing/2014/main" id="{66AAE31D-6C53-4E98-9D99-16915DCA098D}"/>
+              </a:ext>
+            </a:extLst>
+          </p:cNvPr>
+          <p:cNvSpPr/>
+          <p:nvPr/>
+        </p:nvSpPr>
+        <p:spPr>
+          <a:xfrm>
+            <a:off x="5760590" y="3458425"/>
+            <a:ext cx="1745673" cy="887437"/>
+          </a:xfrm>
+          <a:prstGeom prst="ellipse">
+            <a:avLst/>
+          </a:prstGeom>
+        </p:spPr>
+        <p:style>
+          <a:lnRef idx="2">
+            <a:schemeClr val="accent1">
+              <a:shade val="50000"/>
+            </a:schemeClr>
+          </a:lnRef>
+          <a:fillRef idx="1">
+            <a:schemeClr val="accent1"/>
+          </a:fillRef>
+          <a:effectRef idx="0">
+            <a:schemeClr val="accent1"/>
+          </a:effectRef>
+          <a:fontRef idx="minor">
+            <a:schemeClr val="lt1"/>
+          </a:fontRef>
+        </p:style>
+        <p:txBody>
+          <a:bodyPr rtlCol="0" anchor="ctr"/>
+          <a:lstStyle/>
+          <a:p>
+            <a:pPr algn="ctr"/>
+            <a:endParaRPr lang="it-IT" dirty="0"/>
+          </a:p>
+          <a:p>
+            <a:pPr algn="ctr"/>
+            <a:r>
+              <a:rPr lang="it-IT" dirty="0"/>
+              <a:t>Avoid obstacles (8)</a:t>
+            </a:r>
+          </a:p>
+          <a:p>
+            <a:pPr algn="ctr"/>
+            <a:endParaRPr lang="it-IT" dirty="0"/>
+          </a:p>
+        </p:txBody>
+      </p:sp>
+      <p:cxnSp>
+        <p:nvCxnSpPr>
+          <p:cNvPr id="50" name="Connettore 2 49">
+            <a:extLst>
+              <a:ext uri="{FF2B5EF4-FFF2-40B4-BE49-F238E27FC236}">
+                <a16:creationId xmlns:a16="http://schemas.microsoft.com/office/drawing/2014/main" id="{1B7F2AB1-E715-4BD6-9AC9-07D1BBD5BC9A}"/>
+              </a:ext>
+            </a:extLst>
+          </p:cNvPr>
+          <p:cNvCxnSpPr>
+            <a:cxnSpLocks/>
+            <a:stCxn id="33" idx="4"/>
+            <a:endCxn id="48" idx="1"/>
+          </p:cNvCxnSpPr>
+          <p:nvPr/>
+        </p:nvCxnSpPr>
+        <p:spPr>
+          <a:xfrm>
+            <a:off x="5662613" y="1911608"/>
+            <a:ext cx="353625" cy="1676779"/>
+          </a:xfrm>
+          <a:prstGeom prst="straightConnector1">
+            <a:avLst/>
+          </a:prstGeom>
+          <a:ln>
+            <a:tailEnd type="triangle"/>
+          </a:ln>
+        </p:spPr>
+        <p:style>
+          <a:lnRef idx="1">
+            <a:schemeClr val="accent1"/>
+          </a:lnRef>
+          <a:fillRef idx="0">
+            <a:schemeClr val="accent1"/>
+          </a:fillRef>
+          <a:effectRef idx="0">
+            <a:schemeClr val="accent1"/>
+          </a:effectRef>
+          <a:fontRef idx="minor">
+            <a:schemeClr val="tx1"/>
+          </a:fontRef>
+        </p:style>
+      </p:cxnSp>
+      <p:sp>
+        <p:nvSpPr>
+          <p:cNvPr id="55" name="CasellaDiTesto 54">
+            <a:extLst>
+              <a:ext uri="{FF2B5EF4-FFF2-40B4-BE49-F238E27FC236}">
+                <a16:creationId xmlns:a16="http://schemas.microsoft.com/office/drawing/2014/main" id="{CB39ECC9-A6F6-4C78-9619-73F166B0BC2C}"/>
+              </a:ext>
+            </a:extLst>
+          </p:cNvPr>
+          <p:cNvSpPr txBox="1"/>
+          <p:nvPr/>
+        </p:nvSpPr>
+        <p:spPr>
+          <a:xfrm rot="4533724">
+            <a:off x="5435450" y="2491874"/>
+            <a:ext cx="977388" cy="307777"/>
+          </a:xfrm>
+          <a:prstGeom prst="rect">
+            <a:avLst/>
+          </a:prstGeom>
+          <a:noFill/>
+        </p:spPr>
+        <p:txBody>
+          <a:bodyPr wrap="square" rtlCol="0">
+            <a:spAutoFit/>
+          </a:bodyPr>
+          <a:lstStyle/>
+          <a:p>
+            <a:r>
+              <a:rPr lang="it-IT" sz="1400" dirty="0"/>
+              <a:t> RO</a:t>
+            </a:r>
+          </a:p>
+        </p:txBody>
+      </p:sp>
+      <p:sp>
+        <p:nvSpPr>
+          <p:cNvPr id="62" name="Ovale 61">
+            <a:extLst>
+              <a:ext uri="{FF2B5EF4-FFF2-40B4-BE49-F238E27FC236}">
+                <a16:creationId xmlns:a16="http://schemas.microsoft.com/office/drawing/2014/main" id="{F3E2B3DD-2F3F-41AE-B40A-8E9D064F17F5}"/>
+              </a:ext>
+            </a:extLst>
+          </p:cNvPr>
+          <p:cNvSpPr/>
+          <p:nvPr/>
+        </p:nvSpPr>
+        <p:spPr>
+          <a:xfrm>
+            <a:off x="6779016" y="5171644"/>
+            <a:ext cx="1841785" cy="887437"/>
+          </a:xfrm>
+          <a:prstGeom prst="ellipse">
+            <a:avLst/>
+          </a:prstGeom>
+        </p:spPr>
+        <p:style>
+          <a:lnRef idx="2">
+            <a:schemeClr val="accent1">
+              <a:shade val="50000"/>
+            </a:schemeClr>
+          </a:lnRef>
+          <a:fillRef idx="1">
+            <a:schemeClr val="accent1"/>
+          </a:fillRef>
+          <a:effectRef idx="0">
+            <a:schemeClr val="accent1"/>
+          </a:effectRef>
+          <a:fontRef idx="minor">
+            <a:schemeClr val="lt1"/>
+          </a:fontRef>
+        </p:style>
+        <p:txBody>
+          <a:bodyPr rtlCol="0" anchor="ctr"/>
+          <a:lstStyle/>
+          <a:p>
+            <a:pPr algn="ctr"/>
+            <a:endParaRPr lang="it-IT" dirty="0"/>
+          </a:p>
+          <a:p>
+            <a:pPr algn="ctr"/>
+            <a:r>
+              <a:rPr lang="it-IT" dirty="0"/>
+              <a:t>Land on delivery station (12)</a:t>
+            </a:r>
+          </a:p>
+          <a:p>
+            <a:pPr algn="ctr"/>
+            <a:endParaRPr lang="it-IT" dirty="0"/>
+          </a:p>
+        </p:txBody>
+      </p:sp>
+      <p:sp>
+        <p:nvSpPr>
+          <p:cNvPr id="63" name="Ovale 62">
+            <a:extLst>
+              <a:ext uri="{FF2B5EF4-FFF2-40B4-BE49-F238E27FC236}">
+                <a16:creationId xmlns:a16="http://schemas.microsoft.com/office/drawing/2014/main" id="{5C8C1235-652D-4FA4-8A39-AE563E3AA521}"/>
+              </a:ext>
+            </a:extLst>
+          </p:cNvPr>
+          <p:cNvSpPr/>
+          <p:nvPr/>
+        </p:nvSpPr>
+        <p:spPr>
+          <a:xfrm>
+            <a:off x="9891654" y="1036699"/>
+            <a:ext cx="1745673" cy="887437"/>
+          </a:xfrm>
+          <a:prstGeom prst="ellipse">
+            <a:avLst/>
+          </a:prstGeom>
+        </p:spPr>
+        <p:style>
+          <a:lnRef idx="2">
+            <a:schemeClr val="accent1">
+              <a:shade val="50000"/>
+            </a:schemeClr>
+          </a:lnRef>
+          <a:fillRef idx="1">
+            <a:schemeClr val="accent1"/>
+          </a:fillRef>
+          <a:effectRef idx="0">
+            <a:schemeClr val="accent1"/>
+          </a:effectRef>
+          <a:fontRef idx="minor">
+            <a:schemeClr val="lt1"/>
+          </a:fontRef>
+        </p:style>
+        <p:txBody>
+          <a:bodyPr rtlCol="0" anchor="ctr"/>
+          <a:lstStyle/>
+          <a:p>
+            <a:pPr algn="ctr"/>
+            <a:endParaRPr lang="it-IT" dirty="0"/>
+          </a:p>
+          <a:p>
+            <a:pPr algn="ctr"/>
+            <a:r>
+              <a:rPr lang="it-IT" dirty="0"/>
+              <a:t>Lock box (9)</a:t>
+            </a:r>
+          </a:p>
+          <a:p>
+            <a:pPr algn="ctr"/>
+            <a:endParaRPr lang="it-IT" dirty="0"/>
+          </a:p>
+        </p:txBody>
+      </p:sp>
+      <p:cxnSp>
+        <p:nvCxnSpPr>
+          <p:cNvPr id="64" name="Connettore a gomito 63">
+            <a:extLst>
+              <a:ext uri="{FF2B5EF4-FFF2-40B4-BE49-F238E27FC236}">
+                <a16:creationId xmlns:a16="http://schemas.microsoft.com/office/drawing/2014/main" id="{9F796B19-E2DD-4D44-8AC8-3F9BE70195F0}"/>
+              </a:ext>
+            </a:extLst>
+          </p:cNvPr>
+          <p:cNvCxnSpPr>
+            <a:cxnSpLocks/>
+            <a:stCxn id="40" idx="1"/>
+            <a:endCxn id="40" idx="0"/>
+          </p:cNvCxnSpPr>
+          <p:nvPr/>
+        </p:nvCxnSpPr>
+        <p:spPr>
+          <a:xfrm rot="5400000" flipH="1" flipV="1">
+            <a:off x="7454830" y="780559"/>
+            <a:ext cx="129962" cy="617189"/>
+          </a:xfrm>
+          <a:prstGeom prst="bentConnector3">
+            <a:avLst>
+              <a:gd name="adj1" fmla="val 275898"/>
+            </a:avLst>
+          </a:prstGeom>
+          <a:ln>
+            <a:tailEnd type="triangle"/>
+          </a:ln>
+        </p:spPr>
+        <p:style>
+          <a:lnRef idx="1">
+            <a:schemeClr val="accent1"/>
+          </a:lnRef>
+          <a:fillRef idx="0">
+            <a:schemeClr val="accent1"/>
+          </a:fillRef>
+          <a:effectRef idx="0">
+            <a:schemeClr val="accent1"/>
+          </a:effectRef>
+          <a:fontRef idx="minor">
+            <a:schemeClr val="tx1"/>
+          </a:fontRef>
+        </p:style>
+      </p:cxnSp>
+      <p:sp>
+        <p:nvSpPr>
+          <p:cNvPr id="67" name="CasellaDiTesto 66">
+            <a:extLst>
+              <a:ext uri="{FF2B5EF4-FFF2-40B4-BE49-F238E27FC236}">
+                <a16:creationId xmlns:a16="http://schemas.microsoft.com/office/drawing/2014/main" id="{56E038E1-2237-40BD-BFFC-EE499C78ECEE}"/>
+              </a:ext>
+            </a:extLst>
+          </p:cNvPr>
+          <p:cNvSpPr txBox="1"/>
+          <p:nvPr/>
+        </p:nvSpPr>
+        <p:spPr>
+          <a:xfrm>
+            <a:off x="7339711" y="558810"/>
+            <a:ext cx="977388" cy="307777"/>
+          </a:xfrm>
+          <a:prstGeom prst="rect">
+            <a:avLst/>
+          </a:prstGeom>
+          <a:noFill/>
+        </p:spPr>
+        <p:txBody>
+          <a:bodyPr wrap="square" rtlCol="0">
+            <a:spAutoFit/>
+          </a:bodyPr>
+          <a:lstStyle/>
+          <a:p>
+            <a:r>
+              <a:rPr lang="it-IT" sz="1400" dirty="0"/>
+              <a:t>!S</a:t>
+            </a:r>
+          </a:p>
+        </p:txBody>
+      </p:sp>
+      <p:cxnSp>
+        <p:nvCxnSpPr>
+          <p:cNvPr id="69" name="Connettore 2 68">
+            <a:extLst>
+              <a:ext uri="{FF2B5EF4-FFF2-40B4-BE49-F238E27FC236}">
+                <a16:creationId xmlns:a16="http://schemas.microsoft.com/office/drawing/2014/main" id="{03F76A05-F216-4920-9E93-DAB365863DAD}"/>
+              </a:ext>
+            </a:extLst>
+          </p:cNvPr>
+          <p:cNvCxnSpPr>
+            <a:cxnSpLocks/>
+            <a:stCxn id="40" idx="4"/>
+            <a:endCxn id="62" idx="0"/>
+          </p:cNvCxnSpPr>
+          <p:nvPr/>
+        </p:nvCxnSpPr>
+        <p:spPr>
+          <a:xfrm flipH="1">
+            <a:off x="7699909" y="1911609"/>
+            <a:ext cx="128497" cy="3260035"/>
+          </a:xfrm>
+          <a:prstGeom prst="straightConnector1">
+            <a:avLst/>
+          </a:prstGeom>
+          <a:ln>
+            <a:tailEnd type="triangle"/>
+          </a:ln>
+        </p:spPr>
+        <p:style>
+          <a:lnRef idx="1">
+            <a:schemeClr val="accent1"/>
+          </a:lnRef>
+          <a:fillRef idx="0">
+            <a:schemeClr val="accent1"/>
+          </a:fillRef>
+          <a:effectRef idx="0">
+            <a:schemeClr val="accent1"/>
+          </a:effectRef>
+          <a:fontRef idx="minor">
+            <a:schemeClr val="tx1"/>
+          </a:fontRef>
+        </p:style>
+      </p:cxnSp>
+      <p:sp>
+        <p:nvSpPr>
+          <p:cNvPr id="71" name="CasellaDiTesto 70">
+            <a:extLst>
+              <a:ext uri="{FF2B5EF4-FFF2-40B4-BE49-F238E27FC236}">
+                <a16:creationId xmlns:a16="http://schemas.microsoft.com/office/drawing/2014/main" id="{04BA6AC1-2AE3-4EAE-9776-79DACD38EA11}"/>
+              </a:ext>
+            </a:extLst>
+          </p:cNvPr>
+          <p:cNvSpPr txBox="1"/>
+          <p:nvPr/>
+        </p:nvSpPr>
+        <p:spPr>
+          <a:xfrm rot="5575333">
+            <a:off x="7399915" y="2404216"/>
+            <a:ext cx="977388" cy="307777"/>
+          </a:xfrm>
+          <a:prstGeom prst="rect">
+            <a:avLst/>
+          </a:prstGeom>
+          <a:noFill/>
+        </p:spPr>
+        <p:txBody>
+          <a:bodyPr wrap="square" rtlCol="0">
+            <a:spAutoFit/>
+          </a:bodyPr>
+          <a:lstStyle/>
+          <a:p>
+            <a:r>
+              <a:rPr lang="it-IT" sz="1400" dirty="0"/>
+              <a:t> S &amp; ? </a:t>
+            </a:r>
+          </a:p>
+        </p:txBody>
+      </p:sp>
+      <p:cxnSp>
+        <p:nvCxnSpPr>
+          <p:cNvPr id="75" name="Connettore 2 74">
+            <a:extLst>
+              <a:ext uri="{FF2B5EF4-FFF2-40B4-BE49-F238E27FC236}">
+                <a16:creationId xmlns:a16="http://schemas.microsoft.com/office/drawing/2014/main" id="{56B3959D-A6EE-4222-9853-B80A8154A56E}"/>
+              </a:ext>
+            </a:extLst>
+          </p:cNvPr>
+          <p:cNvCxnSpPr>
+            <a:cxnSpLocks/>
+            <a:stCxn id="40" idx="5"/>
+            <a:endCxn id="62" idx="7"/>
+          </p:cNvCxnSpPr>
+          <p:nvPr/>
+        </p:nvCxnSpPr>
+        <p:spPr>
+          <a:xfrm flipH="1">
+            <a:off x="8351078" y="1781647"/>
+            <a:ext cx="94516" cy="3519959"/>
+          </a:xfrm>
+          <a:prstGeom prst="straightConnector1">
+            <a:avLst/>
+          </a:prstGeom>
+          <a:ln>
+            <a:tailEnd type="triangle"/>
+          </a:ln>
+        </p:spPr>
+        <p:style>
+          <a:lnRef idx="1">
+            <a:schemeClr val="accent1"/>
+          </a:lnRef>
+          <a:fillRef idx="0">
+            <a:schemeClr val="accent1"/>
+          </a:fillRef>
+          <a:effectRef idx="0">
+            <a:schemeClr val="accent1"/>
+          </a:effectRef>
+          <a:fontRef idx="minor">
+            <a:schemeClr val="tx1"/>
+          </a:fontRef>
+        </p:style>
+      </p:cxnSp>
+      <p:sp>
+        <p:nvSpPr>
+          <p:cNvPr id="78" name="CasellaDiTesto 77">
+            <a:extLst>
+              <a:ext uri="{FF2B5EF4-FFF2-40B4-BE49-F238E27FC236}">
+                <a16:creationId xmlns:a16="http://schemas.microsoft.com/office/drawing/2014/main" id="{208CFBF5-6615-4405-ABD1-834D6D451C46}"/>
+              </a:ext>
+            </a:extLst>
+          </p:cNvPr>
+          <p:cNvSpPr txBox="1"/>
+          <p:nvPr/>
+        </p:nvSpPr>
+        <p:spPr>
+          <a:xfrm rot="5628672">
+            <a:off x="7954868" y="2980380"/>
+            <a:ext cx="1156012" cy="307777"/>
+          </a:xfrm>
+          <a:prstGeom prst="rect">
+            <a:avLst/>
+          </a:prstGeom>
+          <a:noFill/>
+        </p:spPr>
+        <p:txBody>
+          <a:bodyPr wrap="square" rtlCol="0">
+            <a:spAutoFit/>
+          </a:bodyPr>
+          <a:lstStyle/>
+          <a:p>
+            <a:r>
+              <a:rPr lang="it-IT" sz="1400" dirty="0"/>
+              <a:t> S &amp; !? &amp; MA </a:t>
+            </a:r>
+          </a:p>
+        </p:txBody>
+      </p:sp>
+      <p:cxnSp>
+        <p:nvCxnSpPr>
+          <p:cNvPr id="92" name="Connettore 2 91">
+            <a:extLst>
+              <a:ext uri="{FF2B5EF4-FFF2-40B4-BE49-F238E27FC236}">
+                <a16:creationId xmlns:a16="http://schemas.microsoft.com/office/drawing/2014/main" id="{55050AAF-9587-4404-8AAB-45ECB1559DF6}"/>
+              </a:ext>
+            </a:extLst>
+          </p:cNvPr>
+          <p:cNvCxnSpPr>
+            <a:stCxn id="40" idx="6"/>
+            <a:endCxn id="63" idx="2"/>
+          </p:cNvCxnSpPr>
+          <p:nvPr/>
+        </p:nvCxnSpPr>
+        <p:spPr>
+          <a:xfrm>
+            <a:off x="8701242" y="1467891"/>
+            <a:ext cx="1190412" cy="12527"/>
+          </a:xfrm>
+          <a:prstGeom prst="straightConnector1">
+            <a:avLst/>
+          </a:prstGeom>
+          <a:ln>
+            <a:tailEnd type="triangle"/>
+          </a:ln>
+        </p:spPr>
+        <p:style>
+          <a:lnRef idx="1">
+            <a:schemeClr val="accent1"/>
+          </a:lnRef>
+          <a:fillRef idx="0">
+            <a:schemeClr val="accent1"/>
+          </a:fillRef>
+          <a:effectRef idx="0">
+            <a:schemeClr val="accent1"/>
+          </a:effectRef>
+          <a:fontRef idx="minor">
+            <a:schemeClr val="tx1"/>
+          </a:fontRef>
+        </p:style>
+      </p:cxnSp>
+      <p:sp>
+        <p:nvSpPr>
+          <p:cNvPr id="93" name="CasellaDiTesto 92">
+            <a:extLst>
+              <a:ext uri="{FF2B5EF4-FFF2-40B4-BE49-F238E27FC236}">
+                <a16:creationId xmlns:a16="http://schemas.microsoft.com/office/drawing/2014/main" id="{F0BEE242-6906-48E8-8696-5C508A5BED78}"/>
+              </a:ext>
+            </a:extLst>
+          </p:cNvPr>
+          <p:cNvSpPr txBox="1"/>
+          <p:nvPr/>
+        </p:nvSpPr>
+        <p:spPr>
+          <a:xfrm>
+            <a:off x="8666724" y="1207825"/>
+            <a:ext cx="1338108" cy="307777"/>
+          </a:xfrm>
+          <a:prstGeom prst="rect">
+            <a:avLst/>
+          </a:prstGeom>
+          <a:noFill/>
+        </p:spPr>
+        <p:txBody>
+          <a:bodyPr wrap="square" rtlCol="0">
+            <a:spAutoFit/>
+          </a:bodyPr>
+          <a:lstStyle/>
+          <a:p>
+            <a:r>
+              <a:rPr lang="it-IT" sz="1400" dirty="0"/>
+              <a:t> S &amp; !? &amp; !MA </a:t>
+            </a:r>
+          </a:p>
+        </p:txBody>
+      </p:sp>
+      <p:cxnSp>
+        <p:nvCxnSpPr>
+          <p:cNvPr id="99" name="Connettore a gomito 98">
+            <a:extLst>
+              <a:ext uri="{FF2B5EF4-FFF2-40B4-BE49-F238E27FC236}">
+                <a16:creationId xmlns:a16="http://schemas.microsoft.com/office/drawing/2014/main" id="{4B3EF22D-8C18-47A5-9EBA-750B2D54A63C}"/>
+              </a:ext>
+            </a:extLst>
+          </p:cNvPr>
+          <p:cNvCxnSpPr>
+            <a:cxnSpLocks/>
+            <a:stCxn id="63" idx="1"/>
+            <a:endCxn id="63" idx="0"/>
+          </p:cNvCxnSpPr>
+          <p:nvPr/>
+        </p:nvCxnSpPr>
+        <p:spPr>
+          <a:xfrm rot="5400000" flipH="1" flipV="1">
+            <a:off x="10390915" y="793086"/>
+            <a:ext cx="129962" cy="617189"/>
+          </a:xfrm>
+          <a:prstGeom prst="bentConnector3">
+            <a:avLst>
+              <a:gd name="adj1" fmla="val 275898"/>
+            </a:avLst>
+          </a:prstGeom>
+          <a:ln>
+            <a:tailEnd type="triangle"/>
+          </a:ln>
+        </p:spPr>
+        <p:style>
+          <a:lnRef idx="1">
+            <a:schemeClr val="accent1"/>
+          </a:lnRef>
+          <a:fillRef idx="0">
+            <a:schemeClr val="accent1"/>
+          </a:fillRef>
+          <a:effectRef idx="0">
+            <a:schemeClr val="accent1"/>
+          </a:effectRef>
+          <a:fontRef idx="minor">
+            <a:schemeClr val="tx1"/>
+          </a:fontRef>
+        </p:style>
+      </p:cxnSp>
+      <p:sp>
+        <p:nvSpPr>
+          <p:cNvPr id="102" name="CasellaDiTesto 101">
+            <a:extLst>
+              <a:ext uri="{FF2B5EF4-FFF2-40B4-BE49-F238E27FC236}">
+                <a16:creationId xmlns:a16="http://schemas.microsoft.com/office/drawing/2014/main" id="{64F63769-FD52-41E2-9114-30FB0FC1476C}"/>
+              </a:ext>
+            </a:extLst>
+          </p:cNvPr>
+          <p:cNvSpPr txBox="1"/>
+          <p:nvPr/>
+        </p:nvSpPr>
+        <p:spPr>
+          <a:xfrm>
+            <a:off x="10059428" y="579042"/>
+            <a:ext cx="1408672" cy="307777"/>
+          </a:xfrm>
+          <a:prstGeom prst="rect">
+            <a:avLst/>
+          </a:prstGeom>
+          <a:noFill/>
+        </p:spPr>
+        <p:txBody>
+          <a:bodyPr wrap="square" rtlCol="0">
+            <a:spAutoFit/>
+          </a:bodyPr>
+          <a:lstStyle/>
+          <a:p>
+            <a:r>
+              <a:rPr lang="it-IT" sz="1400" dirty="0"/>
+              <a:t>!MA &amp; C9&lt;500</a:t>
+            </a:r>
+          </a:p>
+        </p:txBody>
+      </p:sp>
+      <p:sp>
+        <p:nvSpPr>
+          <p:cNvPr id="103" name="Ovale 102">
+            <a:extLst>
+              <a:ext uri="{FF2B5EF4-FFF2-40B4-BE49-F238E27FC236}">
+                <a16:creationId xmlns:a16="http://schemas.microsoft.com/office/drawing/2014/main" id="{ED03CA01-F71C-417D-BF09-2EA0C9980EC0}"/>
+              </a:ext>
+            </a:extLst>
+          </p:cNvPr>
+          <p:cNvSpPr/>
+          <p:nvPr/>
+        </p:nvSpPr>
+        <p:spPr>
+          <a:xfrm>
+            <a:off x="9834356" y="2701196"/>
+            <a:ext cx="1874254" cy="887437"/>
+          </a:xfrm>
+          <a:prstGeom prst="ellipse">
+            <a:avLst/>
+          </a:prstGeom>
+        </p:spPr>
+        <p:style>
+          <a:lnRef idx="2">
+            <a:schemeClr val="accent1">
+              <a:shade val="50000"/>
+            </a:schemeClr>
+          </a:lnRef>
+          <a:fillRef idx="1">
+            <a:schemeClr val="accent1"/>
+          </a:fillRef>
+          <a:effectRef idx="0">
+            <a:schemeClr val="accent1"/>
+          </a:effectRef>
+          <a:fontRef idx="minor">
+            <a:schemeClr val="lt1"/>
+          </a:fontRef>
+        </p:style>
+        <p:txBody>
+          <a:bodyPr rtlCol="0" anchor="ctr"/>
+          <a:lstStyle/>
+          <a:p>
+            <a:pPr algn="ctr"/>
+            <a:endParaRPr lang="it-IT" dirty="0"/>
+          </a:p>
+          <a:p>
+            <a:pPr algn="ctr"/>
+            <a:r>
+              <a:rPr lang="it-IT" dirty="0"/>
+              <a:t>Reach </a:t>
+            </a:r>
+            <a:r>
+              <a:rPr lang="it-IT" dirty="0" err="1"/>
+              <a:t>nav</a:t>
+            </a:r>
+            <a:r>
+              <a:rPr lang="it-IT" dirty="0"/>
+              <a:t> </a:t>
+            </a:r>
+            <a:r>
+              <a:rPr lang="it-IT" dirty="0" err="1"/>
+              <a:t>altitude</a:t>
+            </a:r>
+            <a:r>
+              <a:rPr lang="it-IT" dirty="0"/>
+              <a:t> (10)</a:t>
+            </a:r>
+          </a:p>
+          <a:p>
+            <a:pPr algn="ctr"/>
+            <a:endParaRPr lang="it-IT" dirty="0"/>
+          </a:p>
+        </p:txBody>
+      </p:sp>
+      <p:cxnSp>
+        <p:nvCxnSpPr>
+          <p:cNvPr id="105" name="Connettore 2 104">
+            <a:extLst>
+              <a:ext uri="{FF2B5EF4-FFF2-40B4-BE49-F238E27FC236}">
+                <a16:creationId xmlns:a16="http://schemas.microsoft.com/office/drawing/2014/main" id="{419A586E-8596-46CE-93A6-D1BFEDA2069F}"/>
+              </a:ext>
+            </a:extLst>
+          </p:cNvPr>
+          <p:cNvCxnSpPr>
+            <a:cxnSpLocks/>
+            <a:stCxn id="63" idx="4"/>
+            <a:endCxn id="103" idx="0"/>
+          </p:cNvCxnSpPr>
+          <p:nvPr/>
+        </p:nvCxnSpPr>
+        <p:spPr>
+          <a:xfrm>
+            <a:off x="10764491" y="1924136"/>
+            <a:ext cx="6992" cy="777060"/>
+          </a:xfrm>
+          <a:prstGeom prst="straightConnector1">
+            <a:avLst/>
+          </a:prstGeom>
+          <a:ln>
+            <a:tailEnd type="triangle"/>
+          </a:ln>
+        </p:spPr>
+        <p:style>
+          <a:lnRef idx="1">
+            <a:schemeClr val="accent1"/>
+          </a:lnRef>
+          <a:fillRef idx="0">
+            <a:schemeClr val="accent1"/>
+          </a:fillRef>
+          <a:effectRef idx="0">
+            <a:schemeClr val="accent1"/>
+          </a:effectRef>
+          <a:fontRef idx="minor">
+            <a:schemeClr val="tx1"/>
+          </a:fontRef>
+        </p:style>
+      </p:cxnSp>
+      <p:sp>
+        <p:nvSpPr>
+          <p:cNvPr id="110" name="CasellaDiTesto 109">
+            <a:extLst>
+              <a:ext uri="{FF2B5EF4-FFF2-40B4-BE49-F238E27FC236}">
+                <a16:creationId xmlns:a16="http://schemas.microsoft.com/office/drawing/2014/main" id="{3306CE21-7420-4CB3-AE0F-E49389F87DC3}"/>
+              </a:ext>
+            </a:extLst>
+          </p:cNvPr>
+          <p:cNvSpPr txBox="1"/>
+          <p:nvPr/>
+        </p:nvSpPr>
+        <p:spPr>
+          <a:xfrm rot="5400000">
+            <a:off x="10385614" y="2320598"/>
+            <a:ext cx="977388" cy="307777"/>
+          </a:xfrm>
+          <a:prstGeom prst="rect">
+            <a:avLst/>
+          </a:prstGeom>
+          <a:noFill/>
+        </p:spPr>
+        <p:txBody>
+          <a:bodyPr wrap="square" rtlCol="0">
+            <a:spAutoFit/>
+          </a:bodyPr>
+          <a:lstStyle/>
+          <a:p>
+            <a:r>
+              <a:rPr lang="it-IT" sz="1400" dirty="0"/>
+              <a:t> MA</a:t>
+            </a:r>
+          </a:p>
+        </p:txBody>
+      </p:sp>
+      <p:sp>
+        <p:nvSpPr>
+          <p:cNvPr id="112" name="Ovale 111">
+            <a:extLst>
+              <a:ext uri="{FF2B5EF4-FFF2-40B4-BE49-F238E27FC236}">
+                <a16:creationId xmlns:a16="http://schemas.microsoft.com/office/drawing/2014/main" id="{A7FE805A-8396-452F-81E0-AADD4474F686}"/>
+              </a:ext>
+            </a:extLst>
+          </p:cNvPr>
+          <p:cNvSpPr/>
+          <p:nvPr/>
+        </p:nvSpPr>
+        <p:spPr>
+          <a:xfrm>
+            <a:off x="9853835" y="5162718"/>
+            <a:ext cx="1874254" cy="887437"/>
+          </a:xfrm>
+          <a:prstGeom prst="ellipse">
+            <a:avLst/>
+          </a:prstGeom>
+        </p:spPr>
+        <p:style>
+          <a:lnRef idx="2">
+            <a:schemeClr val="accent1">
+              <a:shade val="50000"/>
+            </a:schemeClr>
+          </a:lnRef>
+          <a:fillRef idx="1">
+            <a:schemeClr val="accent1"/>
+          </a:fillRef>
+          <a:effectRef idx="0">
+            <a:schemeClr val="accent1"/>
+          </a:effectRef>
+          <a:fontRef idx="minor">
+            <a:schemeClr val="lt1"/>
+          </a:fontRef>
+        </p:style>
+        <p:txBody>
+          <a:bodyPr rtlCol="0" anchor="ctr"/>
+          <a:lstStyle/>
+          <a:p>
+            <a:pPr algn="ctr"/>
+            <a:endParaRPr lang="it-IT" dirty="0"/>
+          </a:p>
+          <a:p>
+            <a:pPr algn="ctr"/>
+            <a:r>
+              <a:rPr lang="it-IT" dirty="0"/>
+              <a:t>Reach destination (11)</a:t>
+            </a:r>
+          </a:p>
+          <a:p>
+            <a:pPr algn="ctr"/>
+            <a:endParaRPr lang="it-IT" dirty="0"/>
+          </a:p>
+        </p:txBody>
+      </p:sp>
+      <p:cxnSp>
+        <p:nvCxnSpPr>
+          <p:cNvPr id="114" name="Connettore 2 113">
+            <a:extLst>
+              <a:ext uri="{FF2B5EF4-FFF2-40B4-BE49-F238E27FC236}">
+                <a16:creationId xmlns:a16="http://schemas.microsoft.com/office/drawing/2014/main" id="{AC210C52-560F-4F5B-ADBF-F126A49D03A7}"/>
+              </a:ext>
+            </a:extLst>
+          </p:cNvPr>
+          <p:cNvCxnSpPr>
+            <a:stCxn id="63" idx="6"/>
+          </p:cNvCxnSpPr>
+          <p:nvPr/>
+        </p:nvCxnSpPr>
+        <p:spPr>
+          <a:xfrm flipV="1">
+            <a:off x="11637327" y="1480417"/>
+            <a:ext cx="792798" cy="1"/>
+          </a:xfrm>
+          <a:prstGeom prst="straightConnector1">
+            <a:avLst/>
+          </a:prstGeom>
+          <a:ln>
+            <a:tailEnd type="triangle"/>
+          </a:ln>
+        </p:spPr>
+        <p:style>
+          <a:lnRef idx="1">
+            <a:schemeClr val="accent1"/>
+          </a:lnRef>
+          <a:fillRef idx="0">
+            <a:schemeClr val="accent1"/>
+          </a:fillRef>
+          <a:effectRef idx="0">
+            <a:schemeClr val="accent1"/>
+          </a:effectRef>
+          <a:fontRef idx="minor">
+            <a:schemeClr val="tx1"/>
+          </a:fontRef>
+        </p:style>
+      </p:cxnSp>
+      <p:cxnSp>
+        <p:nvCxnSpPr>
+          <p:cNvPr id="116" name="Connettore 2 115">
+            <a:extLst>
+              <a:ext uri="{FF2B5EF4-FFF2-40B4-BE49-F238E27FC236}">
+                <a16:creationId xmlns:a16="http://schemas.microsoft.com/office/drawing/2014/main" id="{04A88B7C-0C0A-4911-AF52-B0ED0ACD1D7A}"/>
+              </a:ext>
+            </a:extLst>
+          </p:cNvPr>
+          <p:cNvCxnSpPr>
+            <a:cxnSpLocks/>
+            <a:endCxn id="3" idx="2"/>
+          </p:cNvCxnSpPr>
+          <p:nvPr/>
+        </p:nvCxnSpPr>
+        <p:spPr>
+          <a:xfrm>
+            <a:off x="52328" y="1433719"/>
+            <a:ext cx="116623" cy="1"/>
+          </a:xfrm>
+          <a:prstGeom prst="straightConnector1">
+            <a:avLst/>
+          </a:prstGeom>
+          <a:ln>
+            <a:tailEnd type="triangle"/>
+          </a:ln>
+        </p:spPr>
+        <p:style>
+          <a:lnRef idx="1">
+            <a:schemeClr val="accent1"/>
+          </a:lnRef>
+          <a:fillRef idx="0">
+            <a:schemeClr val="accent1"/>
+          </a:fillRef>
+          <a:effectRef idx="0">
+            <a:schemeClr val="accent1"/>
+          </a:effectRef>
+          <a:fontRef idx="minor">
+            <a:schemeClr val="tx1"/>
+          </a:fontRef>
+        </p:style>
+      </p:cxnSp>
+      <p:sp>
+        <p:nvSpPr>
+          <p:cNvPr id="122" name="CasellaDiTesto 121">
+            <a:extLst>
+              <a:ext uri="{FF2B5EF4-FFF2-40B4-BE49-F238E27FC236}">
+                <a16:creationId xmlns:a16="http://schemas.microsoft.com/office/drawing/2014/main" id="{6CCF8893-65A3-4E8A-BFE2-9122A3C4883F}"/>
+              </a:ext>
+            </a:extLst>
+          </p:cNvPr>
+          <p:cNvSpPr txBox="1"/>
+          <p:nvPr/>
+        </p:nvSpPr>
+        <p:spPr>
+          <a:xfrm>
+            <a:off x="11628197" y="1273059"/>
+            <a:ext cx="1022950" cy="461665"/>
+          </a:xfrm>
+          <a:prstGeom prst="rect">
+            <a:avLst/>
+          </a:prstGeom>
+          <a:noFill/>
+        </p:spPr>
+        <p:txBody>
+          <a:bodyPr wrap="square" rtlCol="0">
+            <a:spAutoFit/>
+          </a:bodyPr>
+          <a:lstStyle/>
+          <a:p>
+            <a:r>
+              <a:rPr lang="it-IT" sz="1200" dirty="0"/>
+              <a:t>!MA &amp; C9&gt;500</a:t>
+            </a:r>
+          </a:p>
+        </p:txBody>
+      </p:sp>
+      <p:cxnSp>
+        <p:nvCxnSpPr>
+          <p:cNvPr id="123" name="Connettore a gomito 122">
+            <a:extLst>
+              <a:ext uri="{FF2B5EF4-FFF2-40B4-BE49-F238E27FC236}">
+                <a16:creationId xmlns:a16="http://schemas.microsoft.com/office/drawing/2014/main" id="{23885BA4-FC1E-4C22-B1F4-17ED0256F0EA}"/>
+              </a:ext>
+            </a:extLst>
+          </p:cNvPr>
+          <p:cNvCxnSpPr>
+            <a:cxnSpLocks/>
+            <a:stCxn id="103" idx="2"/>
+            <a:endCxn id="103" idx="1"/>
+          </p:cNvCxnSpPr>
+          <p:nvPr/>
+        </p:nvCxnSpPr>
+        <p:spPr>
+          <a:xfrm rot="10800000" flipH="1">
+            <a:off x="9834356" y="2831159"/>
+            <a:ext cx="274478" cy="313757"/>
+          </a:xfrm>
+          <a:prstGeom prst="bentConnector4">
+            <a:avLst>
+              <a:gd name="adj1" fmla="val -83285"/>
+              <a:gd name="adj2" fmla="val 214280"/>
+            </a:avLst>
+          </a:prstGeom>
+          <a:ln>
+            <a:tailEnd type="triangle"/>
+          </a:ln>
+        </p:spPr>
+        <p:style>
+          <a:lnRef idx="1">
+            <a:schemeClr val="accent1"/>
+          </a:lnRef>
+          <a:fillRef idx="0">
+            <a:schemeClr val="accent1"/>
+          </a:fillRef>
+          <a:effectRef idx="0">
+            <a:schemeClr val="accent1"/>
+          </a:effectRef>
+          <a:fontRef idx="minor">
+            <a:schemeClr val="tx1"/>
+          </a:fontRef>
+        </p:style>
+      </p:cxnSp>
+      <p:sp>
+        <p:nvSpPr>
+          <p:cNvPr id="126" name="CasellaDiTesto 125">
+            <a:extLst>
+              <a:ext uri="{FF2B5EF4-FFF2-40B4-BE49-F238E27FC236}">
+                <a16:creationId xmlns:a16="http://schemas.microsoft.com/office/drawing/2014/main" id="{694BB5A3-9ED9-4A6B-8D02-53AEB31B4919}"/>
+              </a:ext>
+            </a:extLst>
+          </p:cNvPr>
+          <p:cNvSpPr txBox="1"/>
+          <p:nvPr/>
+        </p:nvSpPr>
+        <p:spPr>
+          <a:xfrm>
+            <a:off x="9573052" y="2209155"/>
+            <a:ext cx="1408672" cy="307777"/>
+          </a:xfrm>
+          <a:prstGeom prst="rect">
+            <a:avLst/>
+          </a:prstGeom>
+          <a:noFill/>
+        </p:spPr>
+        <p:txBody>
+          <a:bodyPr wrap="square" rtlCol="0">
+            <a:spAutoFit/>
+          </a:bodyPr>
+          <a:lstStyle/>
+          <a:p>
+            <a:r>
+              <a:rPr lang="it-IT" sz="1400" dirty="0"/>
+              <a:t>!NA</a:t>
+            </a:r>
+          </a:p>
+        </p:txBody>
+      </p:sp>
+      <p:cxnSp>
+        <p:nvCxnSpPr>
+          <p:cNvPr id="128" name="Connettore 2 127">
+            <a:extLst>
+              <a:ext uri="{FF2B5EF4-FFF2-40B4-BE49-F238E27FC236}">
+                <a16:creationId xmlns:a16="http://schemas.microsoft.com/office/drawing/2014/main" id="{D149F13A-72AA-4514-B435-76A6D7794918}"/>
+              </a:ext>
+            </a:extLst>
+          </p:cNvPr>
+          <p:cNvCxnSpPr>
+            <a:stCxn id="103" idx="4"/>
+            <a:endCxn id="112" idx="0"/>
+          </p:cNvCxnSpPr>
+          <p:nvPr/>
+        </p:nvCxnSpPr>
+        <p:spPr>
+          <a:xfrm>
+            <a:off x="10771483" y="3588633"/>
+            <a:ext cx="19479" cy="1574085"/>
+          </a:xfrm>
+          <a:prstGeom prst="straightConnector1">
+            <a:avLst/>
+          </a:prstGeom>
+          <a:ln>
+            <a:tailEnd type="triangle"/>
+          </a:ln>
+        </p:spPr>
+        <p:style>
+          <a:lnRef idx="1">
+            <a:schemeClr val="accent1"/>
+          </a:lnRef>
+          <a:fillRef idx="0">
+            <a:schemeClr val="accent1"/>
+          </a:fillRef>
+          <a:effectRef idx="0">
+            <a:schemeClr val="accent1"/>
+          </a:effectRef>
+          <a:fontRef idx="minor">
+            <a:schemeClr val="tx1"/>
+          </a:fontRef>
+        </p:style>
+      </p:cxnSp>
+      <p:sp>
+        <p:nvSpPr>
+          <p:cNvPr id="130" name="CasellaDiTesto 129">
+            <a:extLst>
+              <a:ext uri="{FF2B5EF4-FFF2-40B4-BE49-F238E27FC236}">
+                <a16:creationId xmlns:a16="http://schemas.microsoft.com/office/drawing/2014/main" id="{AB870BA1-C079-4946-A3CB-7CC857823EA7}"/>
+              </a:ext>
+            </a:extLst>
+          </p:cNvPr>
+          <p:cNvSpPr txBox="1"/>
+          <p:nvPr/>
+        </p:nvSpPr>
+        <p:spPr>
+          <a:xfrm rot="5400000">
+            <a:off x="10169971" y="4480101"/>
+            <a:ext cx="1408672" cy="307777"/>
+          </a:xfrm>
+          <a:prstGeom prst="rect">
+            <a:avLst/>
+          </a:prstGeom>
+          <a:noFill/>
+        </p:spPr>
+        <p:txBody>
+          <a:bodyPr wrap="square" rtlCol="0">
+            <a:spAutoFit/>
+          </a:bodyPr>
+          <a:lstStyle/>
+          <a:p>
+            <a:r>
+              <a:rPr lang="it-IT" sz="1400" dirty="0"/>
+              <a:t>NA</a:t>
+            </a:r>
+          </a:p>
+        </p:txBody>
+      </p:sp>
+      <p:cxnSp>
+        <p:nvCxnSpPr>
+          <p:cNvPr id="131" name="Connettore 2 130">
+            <a:extLst>
+              <a:ext uri="{FF2B5EF4-FFF2-40B4-BE49-F238E27FC236}">
+                <a16:creationId xmlns:a16="http://schemas.microsoft.com/office/drawing/2014/main" id="{9D9BD769-361C-4277-A4B2-CA6CC3F4B425}"/>
+              </a:ext>
+            </a:extLst>
+          </p:cNvPr>
+          <p:cNvCxnSpPr>
+            <a:cxnSpLocks/>
+            <a:stCxn id="103" idx="3"/>
+            <a:endCxn id="48" idx="6"/>
+          </p:cNvCxnSpPr>
+          <p:nvPr/>
+        </p:nvCxnSpPr>
+        <p:spPr>
+          <a:xfrm flipH="1">
+            <a:off x="7506263" y="3458671"/>
+            <a:ext cx="2602571" cy="443473"/>
+          </a:xfrm>
+          <a:prstGeom prst="straightConnector1">
+            <a:avLst/>
+          </a:prstGeom>
+          <a:ln>
+            <a:tailEnd type="triangle"/>
+          </a:ln>
+        </p:spPr>
+        <p:style>
+          <a:lnRef idx="1">
+            <a:schemeClr val="accent1"/>
+          </a:lnRef>
+          <a:fillRef idx="0">
+            <a:schemeClr val="accent1"/>
+          </a:fillRef>
+          <a:effectRef idx="0">
+            <a:schemeClr val="accent1"/>
+          </a:effectRef>
+          <a:fontRef idx="minor">
+            <a:schemeClr val="tx1"/>
+          </a:fontRef>
+        </p:style>
+      </p:cxnSp>
+      <p:sp>
+        <p:nvSpPr>
+          <p:cNvPr id="137" name="CasellaDiTesto 136">
+            <a:extLst>
+              <a:ext uri="{FF2B5EF4-FFF2-40B4-BE49-F238E27FC236}">
+                <a16:creationId xmlns:a16="http://schemas.microsoft.com/office/drawing/2014/main" id="{F06F1793-F103-4ED0-9647-4F33AF34CC04}"/>
+              </a:ext>
+            </a:extLst>
+          </p:cNvPr>
+          <p:cNvSpPr txBox="1"/>
+          <p:nvPr/>
+        </p:nvSpPr>
+        <p:spPr>
+          <a:xfrm rot="21038937">
+            <a:off x="8846459" y="3329515"/>
+            <a:ext cx="977388" cy="307777"/>
+          </a:xfrm>
+          <a:prstGeom prst="rect">
+            <a:avLst/>
+          </a:prstGeom>
+          <a:noFill/>
+        </p:spPr>
+        <p:txBody>
+          <a:bodyPr wrap="square" rtlCol="0">
+            <a:spAutoFit/>
+          </a:bodyPr>
+          <a:lstStyle/>
+          <a:p>
+            <a:r>
+              <a:rPr lang="it-IT" sz="1400" dirty="0"/>
+              <a:t> RO</a:t>
+            </a:r>
+          </a:p>
+        </p:txBody>
+      </p:sp>
+      <p:cxnSp>
+        <p:nvCxnSpPr>
+          <p:cNvPr id="139" name="Connettore 2 138">
+            <a:extLst>
+              <a:ext uri="{FF2B5EF4-FFF2-40B4-BE49-F238E27FC236}">
+                <a16:creationId xmlns:a16="http://schemas.microsoft.com/office/drawing/2014/main" id="{68567149-4100-4B0F-8DD1-D6C31AEB2EAB}"/>
+              </a:ext>
+            </a:extLst>
+          </p:cNvPr>
+          <p:cNvCxnSpPr>
+            <a:cxnSpLocks/>
+            <a:stCxn id="112" idx="1"/>
+            <a:endCxn id="48" idx="5"/>
+          </p:cNvCxnSpPr>
+          <p:nvPr/>
+        </p:nvCxnSpPr>
+        <p:spPr>
+          <a:xfrm flipH="1" flipV="1">
+            <a:off x="7250615" y="4215900"/>
+            <a:ext cx="2877698" cy="1076780"/>
+          </a:xfrm>
+          <a:prstGeom prst="straightConnector1">
+            <a:avLst/>
+          </a:prstGeom>
+          <a:ln>
+            <a:tailEnd type="triangle"/>
+          </a:ln>
+        </p:spPr>
+        <p:style>
+          <a:lnRef idx="1">
+            <a:schemeClr val="accent1"/>
+          </a:lnRef>
+          <a:fillRef idx="0">
+            <a:schemeClr val="accent1"/>
+          </a:fillRef>
+          <a:effectRef idx="0">
+            <a:schemeClr val="accent1"/>
+          </a:effectRef>
+          <a:fontRef idx="minor">
+            <a:schemeClr val="tx1"/>
+          </a:fontRef>
+        </p:style>
+      </p:cxnSp>
+      <p:sp>
+        <p:nvSpPr>
+          <p:cNvPr id="142" name="CasellaDiTesto 141">
+            <a:extLst>
+              <a:ext uri="{FF2B5EF4-FFF2-40B4-BE49-F238E27FC236}">
+                <a16:creationId xmlns:a16="http://schemas.microsoft.com/office/drawing/2014/main" id="{ABAF15CA-730D-416D-AF5C-88B9FFD266F2}"/>
+              </a:ext>
+            </a:extLst>
+          </p:cNvPr>
+          <p:cNvSpPr txBox="1"/>
+          <p:nvPr/>
+        </p:nvSpPr>
+        <p:spPr>
+          <a:xfrm rot="3781518">
+            <a:off x="9787355" y="4649774"/>
+            <a:ext cx="977388" cy="307777"/>
+          </a:xfrm>
+          <a:prstGeom prst="rect">
+            <a:avLst/>
+          </a:prstGeom>
+          <a:noFill/>
+        </p:spPr>
+        <p:txBody>
+          <a:bodyPr wrap="square" rtlCol="0">
+            <a:spAutoFit/>
+          </a:bodyPr>
+          <a:lstStyle/>
+          <a:p>
+            <a:r>
+              <a:rPr lang="it-IT" sz="1400" dirty="0"/>
+              <a:t> DR</a:t>
+            </a:r>
+          </a:p>
+        </p:txBody>
+      </p:sp>
+      <p:cxnSp>
+        <p:nvCxnSpPr>
+          <p:cNvPr id="146" name="Connettore a gomito 145">
+            <a:extLst>
+              <a:ext uri="{FF2B5EF4-FFF2-40B4-BE49-F238E27FC236}">
+                <a16:creationId xmlns:a16="http://schemas.microsoft.com/office/drawing/2014/main" id="{967AB0A2-B814-4210-BEBF-EBE6D597F49E}"/>
+              </a:ext>
+            </a:extLst>
+          </p:cNvPr>
+          <p:cNvCxnSpPr>
+            <a:stCxn id="112" idx="5"/>
+            <a:endCxn id="112" idx="4"/>
+          </p:cNvCxnSpPr>
+          <p:nvPr/>
+        </p:nvCxnSpPr>
+        <p:spPr>
+          <a:xfrm rot="5400000">
+            <a:off x="11057306" y="5653850"/>
+            <a:ext cx="129962" cy="662649"/>
+          </a:xfrm>
+          <a:prstGeom prst="bentConnector3">
+            <a:avLst>
+              <a:gd name="adj1" fmla="val 371175"/>
+            </a:avLst>
+          </a:prstGeom>
+          <a:ln>
+            <a:tailEnd type="triangle"/>
+          </a:ln>
+        </p:spPr>
+        <p:style>
+          <a:lnRef idx="1">
+            <a:schemeClr val="accent1"/>
+          </a:lnRef>
+          <a:fillRef idx="0">
+            <a:schemeClr val="accent1"/>
+          </a:fillRef>
+          <a:effectRef idx="0">
+            <a:schemeClr val="accent1"/>
+          </a:effectRef>
+          <a:fontRef idx="minor">
+            <a:schemeClr val="tx1"/>
+          </a:fontRef>
+        </p:style>
+      </p:cxnSp>
+      <p:sp>
+        <p:nvSpPr>
+          <p:cNvPr id="149" name="CasellaDiTesto 148">
+            <a:extLst>
+              <a:ext uri="{FF2B5EF4-FFF2-40B4-BE49-F238E27FC236}">
+                <a16:creationId xmlns:a16="http://schemas.microsoft.com/office/drawing/2014/main" id="{D2C538C1-1386-4086-80D7-25844F1ED7D2}"/>
+              </a:ext>
+            </a:extLst>
+          </p:cNvPr>
+          <p:cNvSpPr txBox="1"/>
+          <p:nvPr/>
+        </p:nvSpPr>
+        <p:spPr>
+          <a:xfrm>
+            <a:off x="10792766" y="6125069"/>
+            <a:ext cx="1408672" cy="307777"/>
+          </a:xfrm>
+          <a:prstGeom prst="rect">
+            <a:avLst/>
+          </a:prstGeom>
+          <a:noFill/>
+        </p:spPr>
+        <p:txBody>
+          <a:bodyPr wrap="square" rtlCol="0">
+            <a:spAutoFit/>
+          </a:bodyPr>
+          <a:lstStyle/>
+          <a:p>
+            <a:r>
+              <a:rPr lang="it-IT" sz="1400" dirty="0"/>
+              <a:t>!DR</a:t>
+            </a:r>
+          </a:p>
+        </p:txBody>
+      </p:sp>
+      <p:cxnSp>
+        <p:nvCxnSpPr>
+          <p:cNvPr id="151" name="Connettore 2 150">
+            <a:extLst>
+              <a:ext uri="{FF2B5EF4-FFF2-40B4-BE49-F238E27FC236}">
+                <a16:creationId xmlns:a16="http://schemas.microsoft.com/office/drawing/2014/main" id="{3F8DFE0D-2A6D-4A09-935F-E92D5336E0EA}"/>
+              </a:ext>
+            </a:extLst>
+          </p:cNvPr>
+          <p:cNvCxnSpPr>
+            <a:cxnSpLocks/>
+          </p:cNvCxnSpPr>
+          <p:nvPr/>
+        </p:nvCxnSpPr>
+        <p:spPr>
+          <a:xfrm flipH="1" flipV="1">
+            <a:off x="8620801" y="1677696"/>
+            <a:ext cx="1842903" cy="3712413"/>
+          </a:xfrm>
+          <a:prstGeom prst="straightConnector1">
+            <a:avLst/>
+          </a:prstGeom>
+          <a:ln>
+            <a:tailEnd type="triangle"/>
+          </a:ln>
+        </p:spPr>
+        <p:style>
+          <a:lnRef idx="1">
+            <a:schemeClr val="accent1"/>
+          </a:lnRef>
+          <a:fillRef idx="0">
+            <a:schemeClr val="accent1"/>
+          </a:fillRef>
+          <a:effectRef idx="0">
+            <a:schemeClr val="accent1"/>
+          </a:effectRef>
+          <a:fontRef idx="minor">
+            <a:schemeClr val="tx1"/>
+          </a:fontRef>
+        </p:style>
+      </p:cxnSp>
+      <p:sp>
+        <p:nvSpPr>
+          <p:cNvPr id="153" name="CasellaDiTesto 152">
+            <a:extLst>
+              <a:ext uri="{FF2B5EF4-FFF2-40B4-BE49-F238E27FC236}">
+                <a16:creationId xmlns:a16="http://schemas.microsoft.com/office/drawing/2014/main" id="{96DBAA2F-1D2E-41EE-A9D5-7E8DA652B890}"/>
+              </a:ext>
+            </a:extLst>
+          </p:cNvPr>
+          <p:cNvSpPr txBox="1"/>
+          <p:nvPr/>
+        </p:nvSpPr>
+        <p:spPr>
+          <a:xfrm rot="1442086">
+            <a:off x="9212449" y="4912633"/>
+            <a:ext cx="977388" cy="307777"/>
+          </a:xfrm>
+          <a:prstGeom prst="rect">
+            <a:avLst/>
+          </a:prstGeom>
+          <a:noFill/>
+        </p:spPr>
+        <p:txBody>
+          <a:bodyPr wrap="square" rtlCol="0">
+            <a:spAutoFit/>
+          </a:bodyPr>
+          <a:lstStyle/>
+          <a:p>
+            <a:r>
+              <a:rPr lang="it-IT" sz="1400" dirty="0"/>
+              <a:t> RO</a:t>
+            </a:r>
+          </a:p>
+        </p:txBody>
+      </p:sp>
+      <p:sp>
+        <p:nvSpPr>
+          <p:cNvPr id="155" name="Ovale 154">
+            <a:extLst>
+              <a:ext uri="{FF2B5EF4-FFF2-40B4-BE49-F238E27FC236}">
+                <a16:creationId xmlns:a16="http://schemas.microsoft.com/office/drawing/2014/main" id="{F5507EAE-639C-4458-A87F-DF71A4259CF7}"/>
+              </a:ext>
+            </a:extLst>
+          </p:cNvPr>
+          <p:cNvSpPr/>
+          <p:nvPr/>
+        </p:nvSpPr>
+        <p:spPr>
+          <a:xfrm>
+            <a:off x="4345830" y="5162717"/>
+            <a:ext cx="1841785" cy="887437"/>
+          </a:xfrm>
+          <a:prstGeom prst="ellipse">
+            <a:avLst/>
+          </a:prstGeom>
+        </p:spPr>
+        <p:style>
+          <a:lnRef idx="2">
+            <a:schemeClr val="accent1">
+              <a:shade val="50000"/>
+            </a:schemeClr>
+          </a:lnRef>
+          <a:fillRef idx="1">
+            <a:schemeClr val="accent1"/>
+          </a:fillRef>
+          <a:effectRef idx="0">
+            <a:schemeClr val="accent1"/>
+          </a:effectRef>
+          <a:fontRef idx="minor">
+            <a:schemeClr val="lt1"/>
+          </a:fontRef>
+        </p:style>
+        <p:txBody>
+          <a:bodyPr rtlCol="0" anchor="ctr"/>
+          <a:lstStyle/>
+          <a:p>
+            <a:pPr algn="ctr"/>
+            <a:endParaRPr lang="it-IT" dirty="0"/>
+          </a:p>
+          <a:p>
+            <a:pPr algn="ctr"/>
+            <a:r>
+              <a:rPr lang="it-IT" dirty="0"/>
+              <a:t>Detach box(13)</a:t>
+            </a:r>
+          </a:p>
+          <a:p>
+            <a:pPr algn="ctr"/>
+            <a:endParaRPr lang="it-IT" dirty="0"/>
+          </a:p>
+        </p:txBody>
+      </p:sp>
+      <p:cxnSp>
+        <p:nvCxnSpPr>
+          <p:cNvPr id="159" name="Connettore a gomito 158">
+            <a:extLst>
+              <a:ext uri="{FF2B5EF4-FFF2-40B4-BE49-F238E27FC236}">
+                <a16:creationId xmlns:a16="http://schemas.microsoft.com/office/drawing/2014/main" id="{37ABAE6D-5914-4F6E-9DE1-746BF2763904}"/>
+              </a:ext>
+            </a:extLst>
+          </p:cNvPr>
+          <p:cNvCxnSpPr>
+            <a:stCxn id="62" idx="4"/>
+            <a:endCxn id="62" idx="5"/>
+          </p:cNvCxnSpPr>
+          <p:nvPr/>
+        </p:nvCxnSpPr>
+        <p:spPr>
+          <a:xfrm rot="5400000" flipH="1" flipV="1">
+            <a:off x="7960512" y="5668515"/>
+            <a:ext cx="129962" cy="651169"/>
+          </a:xfrm>
+          <a:prstGeom prst="bentConnector3">
+            <a:avLst>
+              <a:gd name="adj1" fmla="val -212544"/>
+            </a:avLst>
+          </a:prstGeom>
+          <a:ln>
+            <a:tailEnd type="triangle"/>
+          </a:ln>
+        </p:spPr>
+        <p:style>
+          <a:lnRef idx="1">
+            <a:schemeClr val="accent1"/>
+          </a:lnRef>
+          <a:fillRef idx="0">
+            <a:schemeClr val="accent1"/>
+          </a:fillRef>
+          <a:effectRef idx="0">
+            <a:schemeClr val="accent1"/>
+          </a:effectRef>
+          <a:fontRef idx="minor">
+            <a:schemeClr val="tx1"/>
+          </a:fontRef>
+        </p:style>
+      </p:cxnSp>
+      <p:sp>
+        <p:nvSpPr>
+          <p:cNvPr id="161" name="CasellaDiTesto 160">
+            <a:extLst>
+              <a:ext uri="{FF2B5EF4-FFF2-40B4-BE49-F238E27FC236}">
+                <a16:creationId xmlns:a16="http://schemas.microsoft.com/office/drawing/2014/main" id="{518693C8-3977-43C8-B91D-FCD4A7C4D411}"/>
+              </a:ext>
+            </a:extLst>
+          </p:cNvPr>
+          <p:cNvSpPr txBox="1"/>
+          <p:nvPr/>
+        </p:nvSpPr>
+        <p:spPr>
+          <a:xfrm>
+            <a:off x="7694000" y="6083004"/>
+            <a:ext cx="1408672" cy="307777"/>
+          </a:xfrm>
+          <a:prstGeom prst="rect">
+            <a:avLst/>
+          </a:prstGeom>
+          <a:noFill/>
+        </p:spPr>
+        <p:txBody>
+          <a:bodyPr wrap="square" rtlCol="0">
+            <a:spAutoFit/>
+          </a:bodyPr>
+          <a:lstStyle/>
+          <a:p>
+            <a:r>
+              <a:rPr lang="it-IT" sz="1400" dirty="0"/>
+              <a:t>!AE</a:t>
+            </a:r>
+          </a:p>
+        </p:txBody>
+      </p:sp>
+      <p:cxnSp>
+        <p:nvCxnSpPr>
+          <p:cNvPr id="163" name="Connettore 2 162">
+            <a:extLst>
+              <a:ext uri="{FF2B5EF4-FFF2-40B4-BE49-F238E27FC236}">
+                <a16:creationId xmlns:a16="http://schemas.microsoft.com/office/drawing/2014/main" id="{B67ACDBA-C699-4478-8461-F0EE16CD1D0E}"/>
+              </a:ext>
+            </a:extLst>
+          </p:cNvPr>
+          <p:cNvCxnSpPr>
+            <a:stCxn id="62" idx="2"/>
+            <a:endCxn id="155" idx="6"/>
+          </p:cNvCxnSpPr>
+          <p:nvPr/>
+        </p:nvCxnSpPr>
+        <p:spPr>
+          <a:xfrm flipH="1" flipV="1">
+            <a:off x="6187615" y="5606436"/>
+            <a:ext cx="591401" cy="8927"/>
+          </a:xfrm>
+          <a:prstGeom prst="straightConnector1">
+            <a:avLst/>
+          </a:prstGeom>
+          <a:ln>
+            <a:tailEnd type="triangle"/>
+          </a:ln>
+        </p:spPr>
+        <p:style>
+          <a:lnRef idx="1">
+            <a:schemeClr val="accent1"/>
+          </a:lnRef>
+          <a:fillRef idx="0">
+            <a:schemeClr val="accent1"/>
+          </a:fillRef>
+          <a:effectRef idx="0">
+            <a:schemeClr val="accent1"/>
+          </a:effectRef>
+          <a:fontRef idx="minor">
+            <a:schemeClr val="tx1"/>
+          </a:fontRef>
+        </p:style>
+      </p:cxnSp>
+      <p:sp>
+        <p:nvSpPr>
+          <p:cNvPr id="164" name="CasellaDiTesto 163">
+            <a:extLst>
+              <a:ext uri="{FF2B5EF4-FFF2-40B4-BE49-F238E27FC236}">
+                <a16:creationId xmlns:a16="http://schemas.microsoft.com/office/drawing/2014/main" id="{79D9752F-4AD6-4F06-99E6-2BD2D328B7C5}"/>
+              </a:ext>
+            </a:extLst>
+          </p:cNvPr>
+          <p:cNvSpPr txBox="1"/>
+          <p:nvPr/>
+        </p:nvSpPr>
+        <p:spPr>
+          <a:xfrm>
+            <a:off x="6292069" y="5375106"/>
+            <a:ext cx="1408672" cy="307777"/>
+          </a:xfrm>
+          <a:prstGeom prst="rect">
+            <a:avLst/>
+          </a:prstGeom>
+          <a:noFill/>
+        </p:spPr>
+        <p:txBody>
+          <a:bodyPr wrap="square" rtlCol="0">
+            <a:spAutoFit/>
+          </a:bodyPr>
+          <a:lstStyle/>
+          <a:p>
+            <a:r>
+              <a:rPr lang="it-IT" sz="1400" dirty="0"/>
+              <a:t>AE</a:t>
+            </a:r>
+          </a:p>
+        </p:txBody>
+      </p:sp>
+      <p:sp>
+        <p:nvSpPr>
+          <p:cNvPr id="165" name="Ovale 164">
+            <a:extLst>
+              <a:ext uri="{FF2B5EF4-FFF2-40B4-BE49-F238E27FC236}">
+                <a16:creationId xmlns:a16="http://schemas.microsoft.com/office/drawing/2014/main" id="{DC9EB731-FD5F-4AFE-988D-28F3A9BD2E29}"/>
+              </a:ext>
+            </a:extLst>
+          </p:cNvPr>
+          <p:cNvSpPr/>
+          <p:nvPr/>
+        </p:nvSpPr>
+        <p:spPr>
+          <a:xfrm>
+            <a:off x="1737895" y="4266495"/>
+            <a:ext cx="1841785" cy="887437"/>
+          </a:xfrm>
+          <a:prstGeom prst="ellipse">
+            <a:avLst/>
+          </a:prstGeom>
+        </p:spPr>
+        <p:style>
+          <a:lnRef idx="2">
+            <a:schemeClr val="accent1">
+              <a:shade val="50000"/>
+            </a:schemeClr>
+          </a:lnRef>
+          <a:fillRef idx="1">
+            <a:schemeClr val="accent1"/>
+          </a:fillRef>
+          <a:effectRef idx="0">
+            <a:schemeClr val="accent1"/>
+          </a:effectRef>
+          <a:fontRef idx="minor">
+            <a:schemeClr val="lt1"/>
+          </a:fontRef>
+        </p:style>
+        <p:txBody>
+          <a:bodyPr rtlCol="0" anchor="ctr"/>
+          <a:lstStyle/>
+          <a:p>
+            <a:pPr algn="ctr"/>
+            <a:endParaRPr lang="it-IT" u="sng" dirty="0"/>
+          </a:p>
+          <a:p>
+            <a:pPr algn="ctr"/>
+            <a:r>
+              <a:rPr lang="it-IT" u="sng" dirty="0"/>
+              <a:t>Land on base (13)</a:t>
+            </a:r>
+          </a:p>
+          <a:p>
+            <a:pPr algn="ctr"/>
+            <a:endParaRPr lang="it-IT" u="sng" dirty="0"/>
+          </a:p>
+        </p:txBody>
+      </p:sp>
+      <p:sp>
+        <p:nvSpPr>
+          <p:cNvPr id="166" name="Ovale 165">
+            <a:extLst>
+              <a:ext uri="{FF2B5EF4-FFF2-40B4-BE49-F238E27FC236}">
+                <a16:creationId xmlns:a16="http://schemas.microsoft.com/office/drawing/2014/main" id="{1E723EDE-8478-4825-8E0D-46EE4AD61233}"/>
+              </a:ext>
+            </a:extLst>
+          </p:cNvPr>
+          <p:cNvSpPr/>
+          <p:nvPr/>
+        </p:nvSpPr>
+        <p:spPr>
+          <a:xfrm>
+            <a:off x="3652928" y="3588633"/>
+            <a:ext cx="1841785" cy="887437"/>
+          </a:xfrm>
+          <a:prstGeom prst="ellipse">
+            <a:avLst/>
+          </a:prstGeom>
+          <a:solidFill>
+            <a:srgbClr val="FF0000"/>
+          </a:solidFill>
+        </p:spPr>
+        <p:style>
+          <a:lnRef idx="2">
+            <a:schemeClr val="accent1">
+              <a:shade val="50000"/>
+            </a:schemeClr>
+          </a:lnRef>
+          <a:fillRef idx="1">
+            <a:schemeClr val="accent1"/>
+          </a:fillRef>
+          <a:effectRef idx="0">
+            <a:schemeClr val="accent1"/>
+          </a:effectRef>
+          <a:fontRef idx="minor">
+            <a:schemeClr val="lt1"/>
+          </a:fontRef>
+        </p:style>
+        <p:txBody>
+          <a:bodyPr rtlCol="0" anchor="ctr"/>
+          <a:lstStyle/>
+          <a:p>
+            <a:pPr algn="ctr"/>
+            <a:endParaRPr lang="it-IT" dirty="0"/>
+          </a:p>
+          <a:p>
+            <a:pPr algn="ctr"/>
+            <a:r>
+              <a:rPr lang="it-IT" dirty="0"/>
+              <a:t>Emergency (13)</a:t>
+            </a:r>
+          </a:p>
+          <a:p>
+            <a:pPr algn="ctr"/>
+            <a:endParaRPr lang="it-IT" dirty="0"/>
+          </a:p>
+        </p:txBody>
+      </p:sp>
+      <p:cxnSp>
+        <p:nvCxnSpPr>
+          <p:cNvPr id="168" name="Connettore a gomito 167">
+            <a:extLst>
+              <a:ext uri="{FF2B5EF4-FFF2-40B4-BE49-F238E27FC236}">
+                <a16:creationId xmlns:a16="http://schemas.microsoft.com/office/drawing/2014/main" id="{70EE8E6F-0BC9-4A20-A18F-FBE2F2CE6684}"/>
+              </a:ext>
+            </a:extLst>
+          </p:cNvPr>
+          <p:cNvCxnSpPr>
+            <a:stCxn id="155" idx="5"/>
+            <a:endCxn id="155" idx="4"/>
+          </p:cNvCxnSpPr>
+          <p:nvPr/>
+        </p:nvCxnSpPr>
+        <p:spPr>
+          <a:xfrm rot="5400000">
+            <a:off x="5527327" y="5659589"/>
+            <a:ext cx="129962" cy="651169"/>
+          </a:xfrm>
+          <a:prstGeom prst="bentConnector3">
+            <a:avLst>
+              <a:gd name="adj1" fmla="val 356520"/>
+            </a:avLst>
+          </a:prstGeom>
+          <a:ln>
+            <a:tailEnd type="triangle"/>
+          </a:ln>
+        </p:spPr>
+        <p:style>
+          <a:lnRef idx="1">
+            <a:schemeClr val="accent1"/>
+          </a:lnRef>
+          <a:fillRef idx="0">
+            <a:schemeClr val="accent1"/>
+          </a:fillRef>
+          <a:effectRef idx="0">
+            <a:schemeClr val="accent1"/>
+          </a:effectRef>
+          <a:fontRef idx="minor">
+            <a:schemeClr val="tx1"/>
+          </a:fontRef>
+        </p:style>
+      </p:cxnSp>
+      <p:sp>
+        <p:nvSpPr>
+          <p:cNvPr id="170" name="CasellaDiTesto 169">
+            <a:extLst>
+              <a:ext uri="{FF2B5EF4-FFF2-40B4-BE49-F238E27FC236}">
+                <a16:creationId xmlns:a16="http://schemas.microsoft.com/office/drawing/2014/main" id="{94DF9A22-A3AA-41D7-A01D-B85ED40B7287}"/>
+              </a:ext>
+            </a:extLst>
+          </p:cNvPr>
+          <p:cNvSpPr txBox="1"/>
+          <p:nvPr/>
+        </p:nvSpPr>
+        <p:spPr>
+          <a:xfrm>
+            <a:off x="5266722" y="6132580"/>
+            <a:ext cx="1408672" cy="307777"/>
+          </a:xfrm>
+          <a:prstGeom prst="rect">
+            <a:avLst/>
+          </a:prstGeom>
+          <a:noFill/>
+        </p:spPr>
+        <p:txBody>
+          <a:bodyPr wrap="square" rtlCol="0">
+            <a:spAutoFit/>
+          </a:bodyPr>
+          <a:lstStyle/>
+          <a:p>
+            <a:r>
+              <a:rPr lang="it-IT" sz="1400" dirty="0"/>
+              <a:t>MA</a:t>
+            </a:r>
+          </a:p>
+        </p:txBody>
+      </p:sp>
+      <p:cxnSp>
+        <p:nvCxnSpPr>
+          <p:cNvPr id="173" name="Connettore 2 172">
+            <a:extLst>
+              <a:ext uri="{FF2B5EF4-FFF2-40B4-BE49-F238E27FC236}">
+                <a16:creationId xmlns:a16="http://schemas.microsoft.com/office/drawing/2014/main" id="{4243C0CA-AB10-4C23-B809-A8F5E2A044E2}"/>
+              </a:ext>
+            </a:extLst>
+          </p:cNvPr>
+          <p:cNvCxnSpPr>
+            <a:cxnSpLocks/>
+            <a:stCxn id="155" idx="2"/>
+            <a:endCxn id="25" idx="6"/>
+          </p:cNvCxnSpPr>
+          <p:nvPr/>
+        </p:nvCxnSpPr>
+        <p:spPr>
+          <a:xfrm flipH="1">
+            <a:off x="1804930" y="5606436"/>
+            <a:ext cx="2540900" cy="8926"/>
+          </a:xfrm>
+          <a:prstGeom prst="straightConnector1">
+            <a:avLst/>
+          </a:prstGeom>
+          <a:ln>
+            <a:tailEnd type="triangle"/>
+          </a:ln>
+        </p:spPr>
+        <p:style>
+          <a:lnRef idx="1">
+            <a:schemeClr val="accent1"/>
+          </a:lnRef>
+          <a:fillRef idx="0">
+            <a:schemeClr val="accent1"/>
+          </a:fillRef>
+          <a:effectRef idx="0">
+            <a:schemeClr val="accent1"/>
+          </a:effectRef>
+          <a:fontRef idx="minor">
+            <a:schemeClr val="tx1"/>
+          </a:fontRef>
+        </p:style>
+      </p:cxnSp>
+      <p:cxnSp>
+        <p:nvCxnSpPr>
+          <p:cNvPr id="176" name="Connettore 2 175">
+            <a:extLst>
+              <a:ext uri="{FF2B5EF4-FFF2-40B4-BE49-F238E27FC236}">
+                <a16:creationId xmlns:a16="http://schemas.microsoft.com/office/drawing/2014/main" id="{C6F49A56-B7D9-45BF-B2E6-CFE3C3FCC1C0}"/>
+              </a:ext>
+            </a:extLst>
+          </p:cNvPr>
+          <p:cNvCxnSpPr>
+            <a:cxnSpLocks/>
+            <a:stCxn id="155" idx="0"/>
+            <a:endCxn id="166" idx="4"/>
+          </p:cNvCxnSpPr>
+          <p:nvPr/>
+        </p:nvCxnSpPr>
+        <p:spPr>
+          <a:xfrm flipH="1" flipV="1">
+            <a:off x="4573821" y="4476070"/>
+            <a:ext cx="692902" cy="686647"/>
+          </a:xfrm>
+          <a:prstGeom prst="straightConnector1">
+            <a:avLst/>
+          </a:prstGeom>
+          <a:ln>
+            <a:tailEnd type="triangle"/>
+          </a:ln>
+        </p:spPr>
+        <p:style>
+          <a:lnRef idx="1">
+            <a:schemeClr val="accent1"/>
+          </a:lnRef>
+          <a:fillRef idx="0">
+            <a:schemeClr val="accent1"/>
+          </a:fillRef>
+          <a:effectRef idx="0">
+            <a:schemeClr val="accent1"/>
+          </a:effectRef>
+          <a:fontRef idx="minor">
+            <a:schemeClr val="tx1"/>
+          </a:fontRef>
+        </p:style>
+      </p:cxnSp>
+      <p:sp>
+        <p:nvSpPr>
+          <p:cNvPr id="177" name="CasellaDiTesto 176">
+            <a:extLst>
+              <a:ext uri="{FF2B5EF4-FFF2-40B4-BE49-F238E27FC236}">
+                <a16:creationId xmlns:a16="http://schemas.microsoft.com/office/drawing/2014/main" id="{D7F960C0-918E-421A-A27A-4F0808166548}"/>
+              </a:ext>
+            </a:extLst>
+          </p:cNvPr>
+          <p:cNvSpPr txBox="1"/>
+          <p:nvPr/>
+        </p:nvSpPr>
+        <p:spPr>
+          <a:xfrm>
+            <a:off x="2673669" y="5375105"/>
+            <a:ext cx="1408672" cy="307777"/>
+          </a:xfrm>
+          <a:prstGeom prst="rect">
+            <a:avLst/>
+          </a:prstGeom>
+          <a:noFill/>
+        </p:spPr>
+        <p:txBody>
+          <a:bodyPr wrap="square" rtlCol="0">
+            <a:spAutoFit/>
+          </a:bodyPr>
+          <a:lstStyle/>
+          <a:p>
+            <a:r>
+              <a:rPr lang="it-IT" sz="1400" dirty="0"/>
+              <a:t>!MA &amp; !AN</a:t>
+            </a:r>
+          </a:p>
+        </p:txBody>
+      </p:sp>
+      <p:sp>
+        <p:nvSpPr>
+          <p:cNvPr id="184" name="CasellaDiTesto 183">
+            <a:extLst>
+              <a:ext uri="{FF2B5EF4-FFF2-40B4-BE49-F238E27FC236}">
+                <a16:creationId xmlns:a16="http://schemas.microsoft.com/office/drawing/2014/main" id="{12BE2F83-DBF2-438A-A92E-2966488BD0AB}"/>
+              </a:ext>
+            </a:extLst>
+          </p:cNvPr>
+          <p:cNvSpPr txBox="1"/>
+          <p:nvPr/>
+        </p:nvSpPr>
+        <p:spPr>
+          <a:xfrm rot="2618073">
+            <a:off x="4557092" y="4842415"/>
+            <a:ext cx="1408672" cy="307777"/>
+          </a:xfrm>
+          <a:prstGeom prst="rect">
+            <a:avLst/>
+          </a:prstGeom>
+          <a:noFill/>
+        </p:spPr>
+        <p:txBody>
+          <a:bodyPr wrap="square" rtlCol="0">
+            <a:spAutoFit/>
+          </a:bodyPr>
+          <a:lstStyle/>
+          <a:p>
+            <a:r>
+              <a:rPr lang="it-IT" sz="1400" dirty="0"/>
+              <a:t>!MA &amp; AN</a:t>
+            </a:r>
           </a:p>
         </p:txBody>
       </p:sp>

</xml_diff>

<commit_message>
Controllare stabilize on position e land on base, si scontrano
fare descrizione diagramma  a stati
</commit_message>
<xml_diff>
--- a/docs/diagram.pptx
+++ b/docs/diagram.pptx
@@ -260,7 +260,7 @@
           <a:p>
             <a:fld id="{C3B0D377-F0C3-DB42-9866-B6F08E6D4957}" type="datetimeFigureOut">
               <a:rPr lang="it-IT" smtClean="0"/>
-              <a:t>06/02/2022</a:t>
+              <a:t>07/02/2022</a:t>
             </a:fld>
             <a:endParaRPr lang="it-IT"/>
           </a:p>
@@ -458,7 +458,7 @@
           <a:p>
             <a:fld id="{C3B0D377-F0C3-DB42-9866-B6F08E6D4957}" type="datetimeFigureOut">
               <a:rPr lang="it-IT" smtClean="0"/>
-              <a:t>06/02/2022</a:t>
+              <a:t>07/02/2022</a:t>
             </a:fld>
             <a:endParaRPr lang="it-IT"/>
           </a:p>
@@ -666,7 +666,7 @@
           <a:p>
             <a:fld id="{C3B0D377-F0C3-DB42-9866-B6F08E6D4957}" type="datetimeFigureOut">
               <a:rPr lang="it-IT" smtClean="0"/>
-              <a:t>06/02/2022</a:t>
+              <a:t>07/02/2022</a:t>
             </a:fld>
             <a:endParaRPr lang="it-IT"/>
           </a:p>
@@ -864,7 +864,7 @@
           <a:p>
             <a:fld id="{C3B0D377-F0C3-DB42-9866-B6F08E6D4957}" type="datetimeFigureOut">
               <a:rPr lang="it-IT" smtClean="0"/>
-              <a:t>06/02/2022</a:t>
+              <a:t>07/02/2022</a:t>
             </a:fld>
             <a:endParaRPr lang="it-IT"/>
           </a:p>
@@ -1139,7 +1139,7 @@
           <a:p>
             <a:fld id="{C3B0D377-F0C3-DB42-9866-B6F08E6D4957}" type="datetimeFigureOut">
               <a:rPr lang="it-IT" smtClean="0"/>
-              <a:t>06/02/2022</a:t>
+              <a:t>07/02/2022</a:t>
             </a:fld>
             <a:endParaRPr lang="it-IT"/>
           </a:p>
@@ -1404,7 +1404,7 @@
           <a:p>
             <a:fld id="{C3B0D377-F0C3-DB42-9866-B6F08E6D4957}" type="datetimeFigureOut">
               <a:rPr lang="it-IT" smtClean="0"/>
-              <a:t>06/02/2022</a:t>
+              <a:t>07/02/2022</a:t>
             </a:fld>
             <a:endParaRPr lang="it-IT"/>
           </a:p>
@@ -1816,7 +1816,7 @@
           <a:p>
             <a:fld id="{C3B0D377-F0C3-DB42-9866-B6F08E6D4957}" type="datetimeFigureOut">
               <a:rPr lang="it-IT" smtClean="0"/>
-              <a:t>06/02/2022</a:t>
+              <a:t>07/02/2022</a:t>
             </a:fld>
             <a:endParaRPr lang="it-IT"/>
           </a:p>
@@ -1957,7 +1957,7 @@
           <a:p>
             <a:fld id="{C3B0D377-F0C3-DB42-9866-B6F08E6D4957}" type="datetimeFigureOut">
               <a:rPr lang="it-IT" smtClean="0"/>
-              <a:t>06/02/2022</a:t>
+              <a:t>07/02/2022</a:t>
             </a:fld>
             <a:endParaRPr lang="it-IT"/>
           </a:p>
@@ -2070,7 +2070,7 @@
           <a:p>
             <a:fld id="{C3B0D377-F0C3-DB42-9866-B6F08E6D4957}" type="datetimeFigureOut">
               <a:rPr lang="it-IT" smtClean="0"/>
-              <a:t>06/02/2022</a:t>
+              <a:t>07/02/2022</a:t>
             </a:fld>
             <a:endParaRPr lang="it-IT"/>
           </a:p>
@@ -2381,7 +2381,7 @@
           <a:p>
             <a:fld id="{C3B0D377-F0C3-DB42-9866-B6F08E6D4957}" type="datetimeFigureOut">
               <a:rPr lang="it-IT" smtClean="0"/>
-              <a:t>06/02/2022</a:t>
+              <a:t>07/02/2022</a:t>
             </a:fld>
             <a:endParaRPr lang="it-IT"/>
           </a:p>
@@ -2669,7 +2669,7 @@
           <a:p>
             <a:fld id="{C3B0D377-F0C3-DB42-9866-B6F08E6D4957}" type="datetimeFigureOut">
               <a:rPr lang="it-IT" smtClean="0"/>
-              <a:t>06/02/2022</a:t>
+              <a:t>07/02/2022</a:t>
             </a:fld>
             <a:endParaRPr lang="it-IT"/>
           </a:p>
@@ -2910,7 +2910,7 @@
           <a:p>
             <a:fld id="{C3B0D377-F0C3-DB42-9866-B6F08E6D4957}" type="datetimeFigureOut">
               <a:rPr lang="it-IT" smtClean="0"/>
-              <a:t>06/02/2022</a:t>
+              <a:t>07/02/2022</a:t>
             </a:fld>
             <a:endParaRPr lang="it-IT"/>
           </a:p>
@@ -3378,15 +3378,7 @@
             <a:pPr algn="ctr"/>
             <a:r>
               <a:rPr lang="it-IT" dirty="0"/>
-              <a:t>(</a:t>
-            </a:r>
-            <a:r>
-              <a:rPr lang="it-IT" dirty="0" err="1"/>
-              <a:t>recharge</a:t>
-            </a:r>
-            <a:r>
-              <a:rPr lang="it-IT" dirty="0"/>
-              <a:t>)</a:t>
+              <a:t>(recharge)</a:t>
             </a:r>
           </a:p>
         </p:txBody>
@@ -6121,7 +6113,7 @@
         </p:nvSpPr>
         <p:spPr>
           <a:xfrm>
-            <a:off x="3793787" y="165052"/>
+            <a:off x="3726789" y="-19726"/>
             <a:ext cx="4260715" cy="369332"/>
           </a:xfrm>
           <a:prstGeom prst="rect">
@@ -6379,8 +6371,8 @@
         </p:nvSpPr>
         <p:spPr>
           <a:xfrm>
-            <a:off x="2650638" y="2075743"/>
-            <a:ext cx="1745673" cy="887437"/>
+            <a:off x="2562383" y="2162043"/>
+            <a:ext cx="1530088" cy="712399"/>
           </a:xfrm>
           <a:prstGeom prst="ellipse">
             <a:avLst/>
@@ -6408,7 +6400,7 @@
           <a:p>
             <a:pPr algn="ctr"/>
             <a:r>
-              <a:rPr lang="it-IT" dirty="0"/>
+              <a:rPr lang="it-IT" sz="1400" dirty="0"/>
               <a:t>Recharge battery (3)</a:t>
             </a:r>
           </a:p>
@@ -6424,6 +6416,7 @@
             </a:extLst>
           </p:cNvPr>
           <p:cNvCxnSpPr>
+            <a:cxnSpLocks/>
             <a:stCxn id="3" idx="5"/>
             <a:endCxn id="8" idx="2"/>
           </p:cNvCxnSpPr>
@@ -6432,7 +6425,7 @@
         <p:spPr>
           <a:xfrm>
             <a:off x="1658976" y="1747476"/>
-            <a:ext cx="991662" cy="771986"/>
+            <a:ext cx="903407" cy="770767"/>
           </a:xfrm>
           <a:prstGeom prst="straightConnector1">
             <a:avLst/>
@@ -6470,7 +6463,7 @@
         </p:nvSpPr>
         <p:spPr>
           <a:xfrm>
-            <a:off x="1857982" y="1196115"/>
+            <a:off x="1862894" y="1187319"/>
             <a:ext cx="977388" cy="307777"/>
           </a:xfrm>
           <a:prstGeom prst="rect">
@@ -6799,7 +6792,7 @@
         </p:nvSpPr>
         <p:spPr>
           <a:xfrm>
-            <a:off x="59257" y="5171643"/>
+            <a:off x="98640" y="5189050"/>
             <a:ext cx="1745673" cy="887437"/>
           </a:xfrm>
           <a:prstGeom prst="ellipse">
@@ -6853,14 +6846,14 @@
           </p:cNvPr>
           <p:cNvCxnSpPr>
             <a:cxnSpLocks/>
-            <a:endCxn id="25" idx="0"/>
+            <a:endCxn id="25" idx="1"/>
           </p:cNvCxnSpPr>
           <p:nvPr/>
         </p:nvCxnSpPr>
         <p:spPr>
-          <a:xfrm>
-            <a:off x="746344" y="1794122"/>
-            <a:ext cx="185750" cy="3377521"/>
+          <a:xfrm flipH="1">
+            <a:off x="354288" y="1811529"/>
+            <a:ext cx="431439" cy="3507483"/>
           </a:xfrm>
           <a:prstGeom prst="straightConnector1">
             <a:avLst/>
@@ -6897,8 +6890,8 @@
           <p:nvPr/>
         </p:nvSpPr>
         <p:spPr>
-          <a:xfrm rot="5201319">
-            <a:off x="308994" y="2798978"/>
+          <a:xfrm rot="6219234">
+            <a:off x="162424" y="2777577"/>
             <a:ext cx="1163810" cy="307777"/>
           </a:xfrm>
           <a:prstGeom prst="rect">
@@ -7012,7 +7005,7 @@
         </p:nvSpPr>
         <p:spPr>
           <a:xfrm>
-            <a:off x="4789776" y="1024171"/>
+            <a:off x="4741231" y="1024171"/>
             <a:ext cx="1745673" cy="887437"/>
           </a:xfrm>
           <a:prstGeom prst="ellipse">
@@ -7073,7 +7066,7 @@
         <p:spPr>
           <a:xfrm flipV="1">
             <a:off x="4396312" y="1467890"/>
-            <a:ext cx="393464" cy="1"/>
+            <a:ext cx="344919" cy="1"/>
           </a:xfrm>
           <a:prstGeom prst="straightConnector1">
             <a:avLst/>
@@ -7282,8 +7275,8 @@
         </p:nvCxnSpPr>
         <p:spPr>
           <a:xfrm>
-            <a:off x="6535449" y="1467890"/>
-            <a:ext cx="420120" cy="1"/>
+            <a:off x="6486904" y="1467890"/>
+            <a:ext cx="468665" cy="1"/>
           </a:xfrm>
           <a:prstGeom prst="straightConnector1">
             <a:avLst/>
@@ -7432,7 +7425,7 @@
         </p:nvSpPr>
         <p:spPr>
           <a:xfrm>
-            <a:off x="5760590" y="3458425"/>
+            <a:off x="5671373" y="3500861"/>
             <a:ext cx="1745673" cy="887437"/>
           </a:xfrm>
           <a:prstGeom prst="ellipse">
@@ -7487,14 +7480,13 @@
           <p:cNvCxnSpPr>
             <a:cxnSpLocks/>
             <a:stCxn id="33" idx="4"/>
-            <a:endCxn id="48" idx="1"/>
           </p:cNvCxnSpPr>
           <p:nvPr/>
         </p:nvCxnSpPr>
         <p:spPr>
           <a:xfrm>
-            <a:off x="5662613" y="1911608"/>
-            <a:ext cx="353625" cy="1676779"/>
+            <a:off x="5614068" y="1911608"/>
+            <a:ext cx="486159" cy="1653662"/>
           </a:xfrm>
           <a:prstGeom prst="straightConnector1">
             <a:avLst/>
@@ -7531,8 +7523,8 @@
           <p:nvPr/>
         </p:nvSpPr>
         <p:spPr>
-          <a:xfrm rot="4533724">
-            <a:off x="5435450" y="2491874"/>
+          <a:xfrm rot="4333310">
+            <a:off x="5452422" y="2355782"/>
             <a:ext cx="977388" cy="307777"/>
           </a:xfrm>
           <a:prstGeom prst="rect">
@@ -8108,23 +8100,7 @@
             <a:pPr algn="ctr"/>
             <a:r>
               <a:rPr lang="it-IT" dirty="0"/>
-              <a:t>Reach </a:t>
-            </a:r>
-            <a:r>
-              <a:rPr lang="it-IT" dirty="0" err="1"/>
-              <a:t>nav</a:t>
-            </a:r>
-            <a:r>
-              <a:rPr lang="it-IT" dirty="0"/>
-              <a:t> </a:t>
-            </a:r>
-            <a:r>
-              <a:rPr lang="it-IT" dirty="0" err="1"/>
-              <a:t>altitude</a:t>
-            </a:r>
-            <a:r>
-              <a:rPr lang="it-IT" dirty="0"/>
-              <a:t> (10)</a:t>
+              <a:t>Reach nav altitude (10)</a:t>
             </a:r>
           </a:p>
           <a:p>
@@ -8562,8 +8538,8 @@
         </p:nvCxnSpPr>
         <p:spPr>
           <a:xfrm flipH="1">
-            <a:off x="7506263" y="3458671"/>
-            <a:ext cx="2602571" cy="443473"/>
+            <a:off x="7417046" y="3458671"/>
+            <a:ext cx="2691788" cy="485909"/>
           </a:xfrm>
           <a:prstGeom prst="straightConnector1">
             <a:avLst/>
@@ -8600,8 +8576,8 @@
           <p:nvPr/>
         </p:nvSpPr>
         <p:spPr>
-          <a:xfrm rot="21038937">
-            <a:off x="8846459" y="3329515"/>
+          <a:xfrm rot="21279365">
+            <a:off x="8790726" y="3360533"/>
             <a:ext cx="977388" cy="307777"/>
           </a:xfrm>
           <a:prstGeom prst="rect">
@@ -8640,8 +8616,8 @@
         </p:nvCxnSpPr>
         <p:spPr>
           <a:xfrm flipH="1" flipV="1">
-            <a:off x="7250615" y="4215900"/>
-            <a:ext cx="2877698" cy="1076780"/>
+            <a:off x="7161398" y="4258336"/>
+            <a:ext cx="2966915" cy="1034344"/>
           </a:xfrm>
           <a:prstGeom prst="straightConnector1">
             <a:avLst/>
@@ -8834,7 +8810,7 @@
         </p:nvSpPr>
         <p:spPr>
           <a:xfrm rot="1442086">
-            <a:off x="9212449" y="4912633"/>
+            <a:off x="9042591" y="4831514"/>
             <a:ext cx="977388" cy="307777"/>
           </a:xfrm>
           <a:prstGeom prst="rect">
@@ -9082,7 +9058,7 @@
         </p:nvSpPr>
         <p:spPr>
           <a:xfrm>
-            <a:off x="1737895" y="4266495"/>
+            <a:off x="3256719" y="3244859"/>
             <a:ext cx="1841785" cy="887437"/>
           </a:xfrm>
           <a:prstGeom prst="ellipse">
@@ -9115,73 +9091,13 @@
           <a:p>
             <a:pPr algn="ctr"/>
             <a:r>
-              <a:rPr lang="it-IT" u="sng" dirty="0"/>
-              <a:t>Land on base (13)</a:t>
+              <a:rPr lang="it-IT" dirty="0"/>
+              <a:t>Land on base (14)</a:t>
             </a:r>
           </a:p>
           <a:p>
             <a:pPr algn="ctr"/>
             <a:endParaRPr lang="it-IT" u="sng" dirty="0"/>
-          </a:p>
-        </p:txBody>
-      </p:sp>
-      <p:sp>
-        <p:nvSpPr>
-          <p:cNvPr id="166" name="Ovale 165">
-            <a:extLst>
-              <a:ext uri="{FF2B5EF4-FFF2-40B4-BE49-F238E27FC236}">
-                <a16:creationId xmlns:a16="http://schemas.microsoft.com/office/drawing/2014/main" id="{1E723EDE-8478-4825-8E0D-46EE4AD61233}"/>
-              </a:ext>
-            </a:extLst>
-          </p:cNvPr>
-          <p:cNvSpPr/>
-          <p:nvPr/>
-        </p:nvSpPr>
-        <p:spPr>
-          <a:xfrm>
-            <a:off x="3652928" y="3588633"/>
-            <a:ext cx="1841785" cy="887437"/>
-          </a:xfrm>
-          <a:prstGeom prst="ellipse">
-            <a:avLst/>
-          </a:prstGeom>
-          <a:solidFill>
-            <a:srgbClr val="FF0000"/>
-          </a:solidFill>
-        </p:spPr>
-        <p:style>
-          <a:lnRef idx="2">
-            <a:schemeClr val="accent1">
-              <a:shade val="50000"/>
-            </a:schemeClr>
-          </a:lnRef>
-          <a:fillRef idx="1">
-            <a:schemeClr val="accent1"/>
-          </a:fillRef>
-          <a:effectRef idx="0">
-            <a:schemeClr val="accent1"/>
-          </a:effectRef>
-          <a:fontRef idx="minor">
-            <a:schemeClr val="lt1"/>
-          </a:fontRef>
-        </p:style>
-        <p:txBody>
-          <a:bodyPr rtlCol="0" anchor="ctr"/>
-          <a:lstStyle/>
-          <a:p>
-            <a:pPr algn="ctr"/>
-            <a:endParaRPr lang="it-IT" dirty="0"/>
-          </a:p>
-          <a:p>
-            <a:pPr algn="ctr"/>
-            <a:r>
-              <a:rPr lang="it-IT" dirty="0"/>
-              <a:t>Emergency (13)</a:t>
-            </a:r>
-          </a:p>
-          <a:p>
-            <a:pPr algn="ctr"/>
-            <a:endParaRPr lang="it-IT" dirty="0"/>
           </a:p>
         </p:txBody>
       </p:sp>
@@ -9282,11 +9198,168 @@
         </p:nvCxnSpPr>
         <p:spPr>
           <a:xfrm flipH="1">
-            <a:off x="1804930" y="5606436"/>
-            <a:ext cx="2540900" cy="8926"/>
+            <a:off x="1844313" y="5606436"/>
+            <a:ext cx="2501517" cy="26333"/>
           </a:xfrm>
           <a:prstGeom prst="straightConnector1">
             <a:avLst/>
+          </a:prstGeom>
+          <a:ln>
+            <a:tailEnd type="triangle"/>
+          </a:ln>
+        </p:spPr>
+        <p:style>
+          <a:lnRef idx="1">
+            <a:schemeClr val="accent1"/>
+          </a:lnRef>
+          <a:fillRef idx="0">
+            <a:schemeClr val="accent1"/>
+          </a:fillRef>
+          <a:effectRef idx="0">
+            <a:schemeClr val="accent1"/>
+          </a:effectRef>
+          <a:fontRef idx="minor">
+            <a:schemeClr val="tx1"/>
+          </a:fontRef>
+        </p:style>
+      </p:cxnSp>
+      <p:sp>
+        <p:nvSpPr>
+          <p:cNvPr id="177" name="CasellaDiTesto 176">
+            <a:extLst>
+              <a:ext uri="{FF2B5EF4-FFF2-40B4-BE49-F238E27FC236}">
+                <a16:creationId xmlns:a16="http://schemas.microsoft.com/office/drawing/2014/main" id="{D7F960C0-918E-421A-A27A-4F0808166548}"/>
+              </a:ext>
+            </a:extLst>
+          </p:cNvPr>
+          <p:cNvSpPr txBox="1"/>
+          <p:nvPr/>
+        </p:nvSpPr>
+        <p:spPr>
+          <a:xfrm>
+            <a:off x="2673669" y="5375105"/>
+            <a:ext cx="1408672" cy="307777"/>
+          </a:xfrm>
+          <a:prstGeom prst="rect">
+            <a:avLst/>
+          </a:prstGeom>
+          <a:noFill/>
+        </p:spPr>
+        <p:txBody>
+          <a:bodyPr wrap="square" rtlCol="0">
+            <a:spAutoFit/>
+          </a:bodyPr>
+          <a:lstStyle/>
+          <a:p>
+            <a:r>
+              <a:rPr lang="it-IT" sz="1400" dirty="0"/>
+              <a:t>!MA &amp; !AN</a:t>
+            </a:r>
+          </a:p>
+        </p:txBody>
+      </p:sp>
+      <p:cxnSp>
+        <p:nvCxnSpPr>
+          <p:cNvPr id="10" name="Connettore 2 9">
+            <a:extLst>
+              <a:ext uri="{FF2B5EF4-FFF2-40B4-BE49-F238E27FC236}">
+                <a16:creationId xmlns:a16="http://schemas.microsoft.com/office/drawing/2014/main" id="{48EE2B95-BC87-44DF-A8EB-3714F2FD620F}"/>
+              </a:ext>
+            </a:extLst>
+          </p:cNvPr>
+          <p:cNvCxnSpPr>
+            <a:cxnSpLocks/>
+            <a:stCxn id="25" idx="7"/>
+            <a:endCxn id="48" idx="4"/>
+          </p:cNvCxnSpPr>
+          <p:nvPr/>
+        </p:nvCxnSpPr>
+        <p:spPr>
+          <a:xfrm flipV="1">
+            <a:off x="1588665" y="4388298"/>
+            <a:ext cx="4955545" cy="930714"/>
+          </a:xfrm>
+          <a:prstGeom prst="straightConnector1">
+            <a:avLst/>
+          </a:prstGeom>
+          <a:ln>
+            <a:tailEnd type="triangle"/>
+          </a:ln>
+        </p:spPr>
+        <p:style>
+          <a:lnRef idx="1">
+            <a:schemeClr val="accent1"/>
+          </a:lnRef>
+          <a:fillRef idx="0">
+            <a:schemeClr val="accent1"/>
+          </a:fillRef>
+          <a:effectRef idx="0">
+            <a:schemeClr val="accent1"/>
+          </a:effectRef>
+          <a:fontRef idx="minor">
+            <a:schemeClr val="tx1"/>
+          </a:fontRef>
+        </p:style>
+      </p:cxnSp>
+      <p:sp>
+        <p:nvSpPr>
+          <p:cNvPr id="89" name="CasellaDiTesto 88">
+            <a:extLst>
+              <a:ext uri="{FF2B5EF4-FFF2-40B4-BE49-F238E27FC236}">
+                <a16:creationId xmlns:a16="http://schemas.microsoft.com/office/drawing/2014/main" id="{6679083D-24F9-4E68-92D6-344EC6ECB95F}"/>
+              </a:ext>
+            </a:extLst>
+          </p:cNvPr>
+          <p:cNvSpPr txBox="1"/>
+          <p:nvPr/>
+        </p:nvSpPr>
+        <p:spPr>
+          <a:xfrm rot="20613541">
+            <a:off x="2123535" y="4858797"/>
+            <a:ext cx="977388" cy="307777"/>
+          </a:xfrm>
+          <a:prstGeom prst="rect">
+            <a:avLst/>
+          </a:prstGeom>
+          <a:noFill/>
+        </p:spPr>
+        <p:txBody>
+          <a:bodyPr wrap="square" rtlCol="0">
+            <a:spAutoFit/>
+          </a:bodyPr>
+          <a:lstStyle/>
+          <a:p>
+            <a:r>
+              <a:rPr lang="it-IT" sz="1400" dirty="0"/>
+              <a:t> RO</a:t>
+            </a:r>
+          </a:p>
+        </p:txBody>
+      </p:sp>
+      <p:cxnSp>
+        <p:nvCxnSpPr>
+          <p:cNvPr id="41" name="Connettore a gomito 40">
+            <a:extLst>
+              <a:ext uri="{FF2B5EF4-FFF2-40B4-BE49-F238E27FC236}">
+                <a16:creationId xmlns:a16="http://schemas.microsoft.com/office/drawing/2014/main" id="{F4E389DF-27CF-4652-AEB6-DE279C7AA359}"/>
+              </a:ext>
+            </a:extLst>
+          </p:cNvPr>
+          <p:cNvCxnSpPr>
+            <a:stCxn id="25" idx="3"/>
+            <a:endCxn id="25" idx="4"/>
+          </p:cNvCxnSpPr>
+          <p:nvPr/>
+        </p:nvCxnSpPr>
+        <p:spPr>
+          <a:xfrm rot="16200000" flipH="1">
+            <a:off x="597901" y="5702911"/>
+            <a:ext cx="129962" cy="617189"/>
+          </a:xfrm>
+          <a:prstGeom prst="bentConnector3">
+            <a:avLst>
+              <a:gd name="adj1" fmla="val 275898"/>
+            </a:avLst>
           </a:prstGeom>
           <a:ln>
             <a:tailEnd type="triangle"/>
@@ -9309,24 +9382,24 @@
       </p:cxnSp>
       <p:cxnSp>
         <p:nvCxnSpPr>
-          <p:cNvPr id="176" name="Connettore 2 175">
-            <a:extLst>
-              <a:ext uri="{FF2B5EF4-FFF2-40B4-BE49-F238E27FC236}">
-                <a16:creationId xmlns:a16="http://schemas.microsoft.com/office/drawing/2014/main" id="{C6F49A56-B7D9-45BF-B2E6-CFE3C3FCC1C0}"/>
+          <p:cNvPr id="49" name="Connettore 2 48">
+            <a:extLst>
+              <a:ext uri="{FF2B5EF4-FFF2-40B4-BE49-F238E27FC236}">
+                <a16:creationId xmlns:a16="http://schemas.microsoft.com/office/drawing/2014/main" id="{362966CB-3652-4154-9CFB-C787C26BD37C}"/>
               </a:ext>
             </a:extLst>
           </p:cNvPr>
           <p:cNvCxnSpPr>
             <a:cxnSpLocks/>
-            <a:stCxn id="155" idx="0"/>
-            <a:endCxn id="166" idx="4"/>
+            <a:stCxn id="25" idx="2"/>
+            <a:endCxn id="3" idx="3"/>
           </p:cNvCxnSpPr>
           <p:nvPr/>
         </p:nvCxnSpPr>
         <p:spPr>
-          <a:xfrm flipH="1" flipV="1">
-            <a:off x="4573821" y="4476070"/>
-            <a:ext cx="692902" cy="686647"/>
+          <a:xfrm flipV="1">
+            <a:off x="98640" y="1747476"/>
+            <a:ext cx="325959" cy="3885293"/>
           </a:xfrm>
           <a:prstGeom prst="straightConnector1">
             <a:avLst/>
@@ -9352,10 +9425,10 @@
       </p:cxnSp>
       <p:sp>
         <p:nvSpPr>
-          <p:cNvPr id="177" name="CasellaDiTesto 176">
-            <a:extLst>
-              <a:ext uri="{FF2B5EF4-FFF2-40B4-BE49-F238E27FC236}">
-                <a16:creationId xmlns:a16="http://schemas.microsoft.com/office/drawing/2014/main" id="{D7F960C0-918E-421A-A27A-4F0808166548}"/>
+          <p:cNvPr id="100" name="CasellaDiTesto 99">
+            <a:extLst>
+              <a:ext uri="{FF2B5EF4-FFF2-40B4-BE49-F238E27FC236}">
+                <a16:creationId xmlns:a16="http://schemas.microsoft.com/office/drawing/2014/main" id="{8ACD06E7-38CD-4B9A-BCF5-A73B36FFFB3B}"/>
               </a:ext>
             </a:extLst>
           </p:cNvPr>
@@ -9364,8 +9437,8 @@
         </p:nvSpPr>
         <p:spPr>
           <a:xfrm>
-            <a:off x="2673669" y="5375105"/>
-            <a:ext cx="1408672" cy="307777"/>
+            <a:off x="274232" y="6050156"/>
+            <a:ext cx="977388" cy="307777"/>
           </a:xfrm>
           <a:prstGeom prst="rect">
             <a:avLst/>
@@ -9380,17 +9453,17 @@
           <a:p>
             <a:r>
               <a:rPr lang="it-IT" sz="1400" dirty="0"/>
-              <a:t>!MA &amp; !AN</a:t>
-            </a:r>
-          </a:p>
-        </p:txBody>
-      </p:sp>
-      <p:sp>
-        <p:nvSpPr>
-          <p:cNvPr id="184" name="CasellaDiTesto 183">
-            <a:extLst>
-              <a:ext uri="{FF2B5EF4-FFF2-40B4-BE49-F238E27FC236}">
-                <a16:creationId xmlns:a16="http://schemas.microsoft.com/office/drawing/2014/main" id="{12BE2F83-DBF2-438A-A92E-2966488BD0AB}"/>
+              <a:t> !CR</a:t>
+            </a:r>
+          </a:p>
+        </p:txBody>
+      </p:sp>
+      <p:sp>
+        <p:nvSpPr>
+          <p:cNvPr id="101" name="CasellaDiTesto 100">
+            <a:extLst>
+              <a:ext uri="{FF2B5EF4-FFF2-40B4-BE49-F238E27FC236}">
+                <a16:creationId xmlns:a16="http://schemas.microsoft.com/office/drawing/2014/main" id="{0DB11E7D-D7FF-42C0-9D91-B217505B9F63}"/>
               </a:ext>
             </a:extLst>
           </p:cNvPr>
@@ -9398,9 +9471,9 @@
           <p:nvPr/>
         </p:nvSpPr>
         <p:spPr>
-          <a:xfrm rot="2618073">
-            <a:off x="4557092" y="4842415"/>
-            <a:ext cx="1408672" cy="307777"/>
+          <a:xfrm>
+            <a:off x="-52522" y="3493808"/>
+            <a:ext cx="977388" cy="307777"/>
           </a:xfrm>
           <a:prstGeom prst="rect">
             <a:avLst/>
@@ -9415,7 +9488,1188 @@
           <a:p>
             <a:r>
               <a:rPr lang="it-IT" sz="1400" dirty="0"/>
-              <a:t>!MA &amp; AN</a:t>
+              <a:t> CR</a:t>
+            </a:r>
+          </a:p>
+        </p:txBody>
+      </p:sp>
+      <p:cxnSp>
+        <p:nvCxnSpPr>
+          <p:cNvPr id="60" name="Connettore a gomito 59">
+            <a:extLst>
+              <a:ext uri="{FF2B5EF4-FFF2-40B4-BE49-F238E27FC236}">
+                <a16:creationId xmlns:a16="http://schemas.microsoft.com/office/drawing/2014/main" id="{F4C4FD02-04FD-48F0-9DA7-2CBADC9F3839}"/>
+              </a:ext>
+            </a:extLst>
+          </p:cNvPr>
+          <p:cNvCxnSpPr>
+            <a:stCxn id="15" idx="4"/>
+            <a:endCxn id="165" idx="4"/>
+          </p:cNvCxnSpPr>
+          <p:nvPr/>
+        </p:nvCxnSpPr>
+        <p:spPr>
+          <a:xfrm rot="16200000" flipH="1">
+            <a:off x="3092270" y="3046954"/>
+            <a:ext cx="100262" cy="2070422"/>
+          </a:xfrm>
+          <a:prstGeom prst="bentConnector3">
+            <a:avLst>
+              <a:gd name="adj1" fmla="val 328003"/>
+            </a:avLst>
+          </a:prstGeom>
+          <a:ln>
+            <a:tailEnd type="triangle"/>
+          </a:ln>
+        </p:spPr>
+        <p:style>
+          <a:lnRef idx="1">
+            <a:schemeClr val="accent1"/>
+          </a:lnRef>
+          <a:fillRef idx="0">
+            <a:schemeClr val="accent1"/>
+          </a:fillRef>
+          <a:effectRef idx="0">
+            <a:schemeClr val="accent1"/>
+          </a:effectRef>
+          <a:fontRef idx="minor">
+            <a:schemeClr val="tx1"/>
+          </a:fontRef>
+        </p:style>
+      </p:cxnSp>
+      <p:cxnSp>
+        <p:nvCxnSpPr>
+          <p:cNvPr id="68" name="Connettore a gomito 67">
+            <a:extLst>
+              <a:ext uri="{FF2B5EF4-FFF2-40B4-BE49-F238E27FC236}">
+                <a16:creationId xmlns:a16="http://schemas.microsoft.com/office/drawing/2014/main" id="{137A5495-E668-49BA-8AE3-081ACEB80A77}"/>
+              </a:ext>
+            </a:extLst>
+          </p:cNvPr>
+          <p:cNvCxnSpPr>
+            <a:stCxn id="15" idx="2"/>
+            <a:endCxn id="15" idx="3"/>
+          </p:cNvCxnSpPr>
+          <p:nvPr/>
+        </p:nvCxnSpPr>
+        <p:spPr>
+          <a:xfrm rot="10800000" flipH="1" flipV="1">
+            <a:off x="1062381" y="3452874"/>
+            <a:ext cx="306017" cy="409528"/>
+          </a:xfrm>
+          <a:prstGeom prst="bentConnector4">
+            <a:avLst>
+              <a:gd name="adj1" fmla="val -74702"/>
+              <a:gd name="adj2" fmla="val 197242"/>
+            </a:avLst>
+          </a:prstGeom>
+          <a:ln>
+            <a:tailEnd type="triangle"/>
+          </a:ln>
+        </p:spPr>
+        <p:style>
+          <a:lnRef idx="1">
+            <a:schemeClr val="accent1"/>
+          </a:lnRef>
+          <a:fillRef idx="0">
+            <a:schemeClr val="accent1"/>
+          </a:fillRef>
+          <a:effectRef idx="0">
+            <a:schemeClr val="accent1"/>
+          </a:effectRef>
+          <a:fontRef idx="minor">
+            <a:schemeClr val="tx1"/>
+          </a:fontRef>
+        </p:style>
+      </p:cxnSp>
+      <p:sp>
+        <p:nvSpPr>
+          <p:cNvPr id="118" name="CasellaDiTesto 117">
+            <a:extLst>
+              <a:ext uri="{FF2B5EF4-FFF2-40B4-BE49-F238E27FC236}">
+                <a16:creationId xmlns:a16="http://schemas.microsoft.com/office/drawing/2014/main" id="{B284984D-AEE3-4834-B882-2C173861783F}"/>
+              </a:ext>
+            </a:extLst>
+          </p:cNvPr>
+          <p:cNvSpPr txBox="1"/>
+          <p:nvPr/>
+        </p:nvSpPr>
+        <p:spPr>
+          <a:xfrm>
+            <a:off x="885925" y="3990554"/>
+            <a:ext cx="977388" cy="307777"/>
+          </a:xfrm>
+          <a:prstGeom prst="rect">
+            <a:avLst/>
+          </a:prstGeom>
+          <a:noFill/>
+        </p:spPr>
+        <p:txBody>
+          <a:bodyPr wrap="square" rtlCol="0">
+            <a:spAutoFit/>
+          </a:bodyPr>
+          <a:lstStyle/>
+          <a:p>
+            <a:r>
+              <a:rPr lang="it-IT" sz="1400" dirty="0"/>
+              <a:t>!S</a:t>
+            </a:r>
+          </a:p>
+        </p:txBody>
+      </p:sp>
+      <p:sp>
+        <p:nvSpPr>
+          <p:cNvPr id="119" name="CasellaDiTesto 118">
+            <a:extLst>
+              <a:ext uri="{FF2B5EF4-FFF2-40B4-BE49-F238E27FC236}">
+                <a16:creationId xmlns:a16="http://schemas.microsoft.com/office/drawing/2014/main" id="{9413EC60-791E-4616-BC71-BF03F1BE88DD}"/>
+              </a:ext>
+            </a:extLst>
+          </p:cNvPr>
+          <p:cNvSpPr txBox="1"/>
+          <p:nvPr/>
+        </p:nvSpPr>
+        <p:spPr>
+          <a:xfrm>
+            <a:off x="2673669" y="4099643"/>
+            <a:ext cx="977388" cy="307777"/>
+          </a:xfrm>
+          <a:prstGeom prst="rect">
+            <a:avLst/>
+          </a:prstGeom>
+          <a:noFill/>
+        </p:spPr>
+        <p:txBody>
+          <a:bodyPr wrap="square" rtlCol="0">
+            <a:spAutoFit/>
+          </a:bodyPr>
+          <a:lstStyle/>
+          <a:p>
+            <a:r>
+              <a:rPr lang="it-IT" sz="1400" dirty="0"/>
+              <a:t>S</a:t>
+            </a:r>
+          </a:p>
+        </p:txBody>
+      </p:sp>
+      <p:cxnSp>
+        <p:nvCxnSpPr>
+          <p:cNvPr id="83" name="Connettore a gomito 82">
+            <a:extLst>
+              <a:ext uri="{FF2B5EF4-FFF2-40B4-BE49-F238E27FC236}">
+                <a16:creationId xmlns:a16="http://schemas.microsoft.com/office/drawing/2014/main" id="{CF3FB10B-99FE-4965-9992-4448AEAC3D8E}"/>
+              </a:ext>
+            </a:extLst>
+          </p:cNvPr>
+          <p:cNvCxnSpPr>
+            <a:cxnSpLocks/>
+            <a:stCxn id="165" idx="5"/>
+            <a:endCxn id="165" idx="6"/>
+          </p:cNvCxnSpPr>
+          <p:nvPr/>
+        </p:nvCxnSpPr>
+        <p:spPr>
+          <a:xfrm rot="5400000" flipH="1" flipV="1">
+            <a:off x="4806764" y="3710594"/>
+            <a:ext cx="313756" cy="269723"/>
+          </a:xfrm>
+          <a:prstGeom prst="bentConnector4">
+            <a:avLst>
+              <a:gd name="adj1" fmla="val -27470"/>
+              <a:gd name="adj2" fmla="val 210000"/>
+            </a:avLst>
+          </a:prstGeom>
+          <a:ln>
+            <a:tailEnd type="triangle"/>
+          </a:ln>
+        </p:spPr>
+        <p:style>
+          <a:lnRef idx="1">
+            <a:schemeClr val="accent1"/>
+          </a:lnRef>
+          <a:fillRef idx="0">
+            <a:schemeClr val="accent1"/>
+          </a:fillRef>
+          <a:effectRef idx="0">
+            <a:schemeClr val="accent1"/>
+          </a:effectRef>
+          <a:fontRef idx="minor">
+            <a:schemeClr val="tx1"/>
+          </a:fontRef>
+        </p:style>
+      </p:cxnSp>
+      <p:sp>
+        <p:nvSpPr>
+          <p:cNvPr id="129" name="CasellaDiTesto 128">
+            <a:extLst>
+              <a:ext uri="{FF2B5EF4-FFF2-40B4-BE49-F238E27FC236}">
+                <a16:creationId xmlns:a16="http://schemas.microsoft.com/office/drawing/2014/main" id="{707DD735-2AA5-4B88-84F6-A8AD10A8A919}"/>
+              </a:ext>
+            </a:extLst>
+          </p:cNvPr>
+          <p:cNvSpPr txBox="1"/>
+          <p:nvPr/>
+        </p:nvSpPr>
+        <p:spPr>
+          <a:xfrm>
+            <a:off x="5044150" y="3698479"/>
+            <a:ext cx="977388" cy="307777"/>
+          </a:xfrm>
+          <a:prstGeom prst="rect">
+            <a:avLst/>
+          </a:prstGeom>
+          <a:noFill/>
+        </p:spPr>
+        <p:txBody>
+          <a:bodyPr wrap="square" rtlCol="0">
+            <a:spAutoFit/>
+          </a:bodyPr>
+          <a:lstStyle/>
+          <a:p>
+            <a:r>
+              <a:rPr lang="it-IT" sz="1400" dirty="0"/>
+              <a:t>!AE</a:t>
+            </a:r>
+          </a:p>
+        </p:txBody>
+      </p:sp>
+      <p:sp>
+        <p:nvSpPr>
+          <p:cNvPr id="132" name="CasellaDiTesto 131">
+            <a:extLst>
+              <a:ext uri="{FF2B5EF4-FFF2-40B4-BE49-F238E27FC236}">
+                <a16:creationId xmlns:a16="http://schemas.microsoft.com/office/drawing/2014/main" id="{417562A4-03D5-49B6-AE7F-FD711AD88C91}"/>
+              </a:ext>
+            </a:extLst>
+          </p:cNvPr>
+          <p:cNvSpPr txBox="1"/>
+          <p:nvPr/>
+        </p:nvSpPr>
+        <p:spPr>
+          <a:xfrm>
+            <a:off x="4847438" y="2925991"/>
+            <a:ext cx="977388" cy="307777"/>
+          </a:xfrm>
+          <a:prstGeom prst="rect">
+            <a:avLst/>
+          </a:prstGeom>
+          <a:noFill/>
+        </p:spPr>
+        <p:txBody>
+          <a:bodyPr wrap="square" rtlCol="0">
+            <a:spAutoFit/>
+          </a:bodyPr>
+          <a:lstStyle/>
+          <a:p>
+            <a:r>
+              <a:rPr lang="it-IT" sz="1400" dirty="0"/>
+              <a:t>AE</a:t>
+            </a:r>
+          </a:p>
+        </p:txBody>
+      </p:sp>
+      <p:sp>
+        <p:nvSpPr>
+          <p:cNvPr id="133" name="Ovale 132">
+            <a:extLst>
+              <a:ext uri="{FF2B5EF4-FFF2-40B4-BE49-F238E27FC236}">
+                <a16:creationId xmlns:a16="http://schemas.microsoft.com/office/drawing/2014/main" id="{788A0FB8-C20F-4250-8E80-B7ADB5AACA3D}"/>
+              </a:ext>
+            </a:extLst>
+          </p:cNvPr>
+          <p:cNvSpPr/>
+          <p:nvPr/>
+        </p:nvSpPr>
+        <p:spPr>
+          <a:xfrm>
+            <a:off x="4195656" y="2132582"/>
+            <a:ext cx="1532492" cy="764998"/>
+          </a:xfrm>
+          <a:prstGeom prst="ellipse">
+            <a:avLst/>
+          </a:prstGeom>
+        </p:spPr>
+        <p:style>
+          <a:lnRef idx="2">
+            <a:schemeClr val="accent1">
+              <a:shade val="50000"/>
+            </a:schemeClr>
+          </a:lnRef>
+          <a:fillRef idx="1">
+            <a:schemeClr val="accent1"/>
+          </a:fillRef>
+          <a:effectRef idx="0">
+            <a:schemeClr val="accent1"/>
+          </a:effectRef>
+          <a:fontRef idx="minor">
+            <a:schemeClr val="lt1"/>
+          </a:fontRef>
+        </p:style>
+        <p:txBody>
+          <a:bodyPr rtlCol="0" anchor="ctr"/>
+          <a:lstStyle/>
+          <a:p>
+            <a:pPr algn="ctr"/>
+            <a:r>
+              <a:rPr lang="it-IT" sz="1400" dirty="0"/>
+              <a:t>Go to recharge  battery (15)</a:t>
+            </a:r>
+          </a:p>
+        </p:txBody>
+      </p:sp>
+      <p:cxnSp>
+        <p:nvCxnSpPr>
+          <p:cNvPr id="107" name="Connettore 2 106">
+            <a:extLst>
+              <a:ext uri="{FF2B5EF4-FFF2-40B4-BE49-F238E27FC236}">
+                <a16:creationId xmlns:a16="http://schemas.microsoft.com/office/drawing/2014/main" id="{86693726-AEC4-4641-96EB-1D2A718B6303}"/>
+              </a:ext>
+            </a:extLst>
+          </p:cNvPr>
+          <p:cNvCxnSpPr>
+            <a:stCxn id="165" idx="7"/>
+            <a:endCxn id="133" idx="4"/>
+          </p:cNvCxnSpPr>
+          <p:nvPr/>
+        </p:nvCxnSpPr>
+        <p:spPr>
+          <a:xfrm flipV="1">
+            <a:off x="4828781" y="2897580"/>
+            <a:ext cx="133121" cy="477241"/>
+          </a:xfrm>
+          <a:prstGeom prst="straightConnector1">
+            <a:avLst/>
+          </a:prstGeom>
+          <a:ln>
+            <a:tailEnd type="triangle"/>
+          </a:ln>
+        </p:spPr>
+        <p:style>
+          <a:lnRef idx="1">
+            <a:schemeClr val="accent1"/>
+          </a:lnRef>
+          <a:fillRef idx="0">
+            <a:schemeClr val="accent1"/>
+          </a:fillRef>
+          <a:effectRef idx="0">
+            <a:schemeClr val="accent1"/>
+          </a:effectRef>
+          <a:fontRef idx="minor">
+            <a:schemeClr val="tx1"/>
+          </a:fontRef>
+        </p:style>
+      </p:cxnSp>
+      <p:cxnSp>
+        <p:nvCxnSpPr>
+          <p:cNvPr id="109" name="Connettore 2 108">
+            <a:extLst>
+              <a:ext uri="{FF2B5EF4-FFF2-40B4-BE49-F238E27FC236}">
+                <a16:creationId xmlns:a16="http://schemas.microsoft.com/office/drawing/2014/main" id="{226DBF30-394D-4B14-964A-3F6493335606}"/>
+              </a:ext>
+            </a:extLst>
+          </p:cNvPr>
+          <p:cNvCxnSpPr>
+            <a:stCxn id="133" idx="1"/>
+            <a:endCxn id="8" idx="7"/>
+          </p:cNvCxnSpPr>
+          <p:nvPr/>
+        </p:nvCxnSpPr>
+        <p:spPr>
+          <a:xfrm flipH="1">
+            <a:off x="3868395" y="2244613"/>
+            <a:ext cx="551689" cy="21758"/>
+          </a:xfrm>
+          <a:prstGeom prst="straightConnector1">
+            <a:avLst/>
+          </a:prstGeom>
+          <a:ln>
+            <a:tailEnd type="triangle"/>
+          </a:ln>
+        </p:spPr>
+        <p:style>
+          <a:lnRef idx="1">
+            <a:schemeClr val="accent1"/>
+          </a:lnRef>
+          <a:fillRef idx="0">
+            <a:schemeClr val="accent1"/>
+          </a:fillRef>
+          <a:effectRef idx="0">
+            <a:schemeClr val="accent1"/>
+          </a:effectRef>
+          <a:fontRef idx="minor">
+            <a:schemeClr val="tx1"/>
+          </a:fontRef>
+        </p:style>
+      </p:cxnSp>
+      <p:sp>
+        <p:nvSpPr>
+          <p:cNvPr id="145" name="CasellaDiTesto 144">
+            <a:extLst>
+              <a:ext uri="{FF2B5EF4-FFF2-40B4-BE49-F238E27FC236}">
+                <a16:creationId xmlns:a16="http://schemas.microsoft.com/office/drawing/2014/main" id="{D4FEFD0D-83CB-4B6F-B47C-9A3BD40B2523}"/>
+              </a:ext>
+            </a:extLst>
+          </p:cNvPr>
+          <p:cNvSpPr txBox="1"/>
+          <p:nvPr/>
+        </p:nvSpPr>
+        <p:spPr>
+          <a:xfrm>
+            <a:off x="3815360" y="1955784"/>
+            <a:ext cx="977388" cy="307777"/>
+          </a:xfrm>
+          <a:prstGeom prst="rect">
+            <a:avLst/>
+          </a:prstGeom>
+          <a:noFill/>
+        </p:spPr>
+        <p:txBody>
+          <a:bodyPr wrap="square" rtlCol="0">
+            <a:spAutoFit/>
+          </a:bodyPr>
+          <a:lstStyle/>
+          <a:p>
+            <a:r>
+              <a:rPr lang="it-IT" sz="1400" dirty="0"/>
+              <a:t> RR</a:t>
+            </a:r>
+          </a:p>
+        </p:txBody>
+      </p:sp>
+      <p:cxnSp>
+        <p:nvCxnSpPr>
+          <p:cNvPr id="125" name="Connettore a gomito 124">
+            <a:extLst>
+              <a:ext uri="{FF2B5EF4-FFF2-40B4-BE49-F238E27FC236}">
+                <a16:creationId xmlns:a16="http://schemas.microsoft.com/office/drawing/2014/main" id="{43FF768A-2531-4099-A100-6249CBCD14F4}"/>
+              </a:ext>
+            </a:extLst>
+          </p:cNvPr>
+          <p:cNvCxnSpPr>
+            <a:stCxn id="133" idx="0"/>
+            <a:endCxn id="133" idx="7"/>
+          </p:cNvCxnSpPr>
+          <p:nvPr/>
+        </p:nvCxnSpPr>
+        <p:spPr>
+          <a:xfrm rot="16200000" flipH="1">
+            <a:off x="5176795" y="1917688"/>
+            <a:ext cx="112031" cy="541818"/>
+          </a:xfrm>
+          <a:prstGeom prst="bentConnector3">
+            <a:avLst>
+              <a:gd name="adj1" fmla="val -151953"/>
+            </a:avLst>
+          </a:prstGeom>
+          <a:ln>
+            <a:tailEnd type="triangle"/>
+          </a:ln>
+        </p:spPr>
+        <p:style>
+          <a:lnRef idx="1">
+            <a:schemeClr val="accent1"/>
+          </a:lnRef>
+          <a:fillRef idx="0">
+            <a:schemeClr val="accent1"/>
+          </a:fillRef>
+          <a:effectRef idx="0">
+            <a:schemeClr val="accent1"/>
+          </a:effectRef>
+          <a:fontRef idx="minor">
+            <a:schemeClr val="tx1"/>
+          </a:fontRef>
+        </p:style>
+      </p:cxnSp>
+      <p:sp>
+        <p:nvSpPr>
+          <p:cNvPr id="156" name="CasellaDiTesto 155">
+            <a:extLst>
+              <a:ext uri="{FF2B5EF4-FFF2-40B4-BE49-F238E27FC236}">
+                <a16:creationId xmlns:a16="http://schemas.microsoft.com/office/drawing/2014/main" id="{5558C540-3F25-4097-BEF5-4022DED2D6A9}"/>
+              </a:ext>
+            </a:extLst>
+          </p:cNvPr>
+          <p:cNvSpPr txBox="1"/>
+          <p:nvPr/>
+        </p:nvSpPr>
+        <p:spPr>
+          <a:xfrm>
+            <a:off x="5020816" y="1903326"/>
+            <a:ext cx="977388" cy="307777"/>
+          </a:xfrm>
+          <a:prstGeom prst="rect">
+            <a:avLst/>
+          </a:prstGeom>
+          <a:noFill/>
+        </p:spPr>
+        <p:txBody>
+          <a:bodyPr wrap="square" rtlCol="0">
+            <a:spAutoFit/>
+          </a:bodyPr>
+          <a:lstStyle/>
+          <a:p>
+            <a:r>
+              <a:rPr lang="it-IT" sz="1400" dirty="0"/>
+              <a:t> !RR</a:t>
+            </a:r>
+          </a:p>
+        </p:txBody>
+      </p:sp>
+      <p:cxnSp>
+        <p:nvCxnSpPr>
+          <p:cNvPr id="141" name="Connettore a gomito 140">
+            <a:extLst>
+              <a:ext uri="{FF2B5EF4-FFF2-40B4-BE49-F238E27FC236}">
+                <a16:creationId xmlns:a16="http://schemas.microsoft.com/office/drawing/2014/main" id="{9A959B73-E6F5-411E-BA43-970ECCB3C695}"/>
+              </a:ext>
+            </a:extLst>
+          </p:cNvPr>
+          <p:cNvCxnSpPr>
+            <a:stCxn id="8" idx="4"/>
+            <a:endCxn id="8" idx="5"/>
+          </p:cNvCxnSpPr>
+          <p:nvPr/>
+        </p:nvCxnSpPr>
+        <p:spPr>
+          <a:xfrm rot="5400000" flipH="1" flipV="1">
+            <a:off x="3545747" y="2551794"/>
+            <a:ext cx="104328" cy="540968"/>
+          </a:xfrm>
+          <a:prstGeom prst="bentConnector3">
+            <a:avLst>
+              <a:gd name="adj1" fmla="val -219117"/>
+            </a:avLst>
+          </a:prstGeom>
+          <a:ln>
+            <a:tailEnd type="triangle"/>
+          </a:ln>
+        </p:spPr>
+        <p:style>
+          <a:lnRef idx="1">
+            <a:schemeClr val="accent1"/>
+          </a:lnRef>
+          <a:fillRef idx="0">
+            <a:schemeClr val="accent1"/>
+          </a:fillRef>
+          <a:effectRef idx="0">
+            <a:schemeClr val="accent1"/>
+          </a:effectRef>
+          <a:fontRef idx="minor">
+            <a:schemeClr val="tx1"/>
+          </a:fontRef>
+        </p:style>
+      </p:cxnSp>
+      <p:cxnSp>
+        <p:nvCxnSpPr>
+          <p:cNvPr id="144" name="Connettore 2 143">
+            <a:extLst>
+              <a:ext uri="{FF2B5EF4-FFF2-40B4-BE49-F238E27FC236}">
+                <a16:creationId xmlns:a16="http://schemas.microsoft.com/office/drawing/2014/main" id="{16DC7635-768F-471E-BD64-FB25FFC8075A}"/>
+              </a:ext>
+            </a:extLst>
+          </p:cNvPr>
+          <p:cNvCxnSpPr>
+            <a:cxnSpLocks/>
+            <a:stCxn id="8" idx="0"/>
+          </p:cNvCxnSpPr>
+          <p:nvPr/>
+        </p:nvCxnSpPr>
+        <p:spPr>
+          <a:xfrm flipH="1" flipV="1">
+            <a:off x="1848591" y="1602640"/>
+            <a:ext cx="1478836" cy="559403"/>
+          </a:xfrm>
+          <a:prstGeom prst="straightConnector1">
+            <a:avLst/>
+          </a:prstGeom>
+          <a:ln>
+            <a:tailEnd type="triangle"/>
+          </a:ln>
+        </p:spPr>
+        <p:style>
+          <a:lnRef idx="1">
+            <a:schemeClr val="accent1"/>
+          </a:lnRef>
+          <a:fillRef idx="0">
+            <a:schemeClr val="accent1"/>
+          </a:fillRef>
+          <a:effectRef idx="0">
+            <a:schemeClr val="accent1"/>
+          </a:effectRef>
+          <a:fontRef idx="minor">
+            <a:schemeClr val="tx1"/>
+          </a:fontRef>
+        </p:style>
+      </p:cxnSp>
+      <p:sp>
+        <p:nvSpPr>
+          <p:cNvPr id="167" name="CasellaDiTesto 166">
+            <a:extLst>
+              <a:ext uri="{FF2B5EF4-FFF2-40B4-BE49-F238E27FC236}">
+                <a16:creationId xmlns:a16="http://schemas.microsoft.com/office/drawing/2014/main" id="{4FEFDD70-19E8-4687-9A6C-1F4C2C977115}"/>
+              </a:ext>
+            </a:extLst>
+          </p:cNvPr>
+          <p:cNvSpPr txBox="1"/>
+          <p:nvPr/>
+        </p:nvSpPr>
+        <p:spPr>
+          <a:xfrm>
+            <a:off x="3305287" y="2857398"/>
+            <a:ext cx="977388" cy="307777"/>
+          </a:xfrm>
+          <a:prstGeom prst="rect">
+            <a:avLst/>
+          </a:prstGeom>
+          <a:noFill/>
+        </p:spPr>
+        <p:txBody>
+          <a:bodyPr wrap="square" rtlCol="0">
+            <a:spAutoFit/>
+          </a:bodyPr>
+          <a:lstStyle/>
+          <a:p>
+            <a:r>
+              <a:rPr lang="it-IT" sz="1400" dirty="0"/>
+              <a:t> !CB</a:t>
+            </a:r>
+          </a:p>
+        </p:txBody>
+      </p:sp>
+      <p:sp>
+        <p:nvSpPr>
+          <p:cNvPr id="169" name="CasellaDiTesto 168">
+            <a:extLst>
+              <a:ext uri="{FF2B5EF4-FFF2-40B4-BE49-F238E27FC236}">
+                <a16:creationId xmlns:a16="http://schemas.microsoft.com/office/drawing/2014/main" id="{93914489-675F-4F55-91EE-B22B7B94F99E}"/>
+              </a:ext>
+            </a:extLst>
+          </p:cNvPr>
+          <p:cNvSpPr txBox="1"/>
+          <p:nvPr/>
+        </p:nvSpPr>
+        <p:spPr>
+          <a:xfrm>
+            <a:off x="2592084" y="1919611"/>
+            <a:ext cx="977388" cy="307777"/>
+          </a:xfrm>
+          <a:prstGeom prst="rect">
+            <a:avLst/>
+          </a:prstGeom>
+          <a:noFill/>
+        </p:spPr>
+        <p:txBody>
+          <a:bodyPr wrap="square" rtlCol="0">
+            <a:spAutoFit/>
+          </a:bodyPr>
+          <a:lstStyle/>
+          <a:p>
+            <a:r>
+              <a:rPr lang="it-IT" sz="1400" dirty="0"/>
+              <a:t> CB</a:t>
+            </a:r>
+          </a:p>
+        </p:txBody>
+      </p:sp>
+      <p:cxnSp>
+        <p:nvCxnSpPr>
+          <p:cNvPr id="182" name="Connettore a gomito 181">
+            <a:extLst>
+              <a:ext uri="{FF2B5EF4-FFF2-40B4-BE49-F238E27FC236}">
+                <a16:creationId xmlns:a16="http://schemas.microsoft.com/office/drawing/2014/main" id="{7EAEA4FD-87CF-4DD4-A226-C30D2D993201}"/>
+              </a:ext>
+            </a:extLst>
+          </p:cNvPr>
+          <p:cNvCxnSpPr>
+            <a:stCxn id="48" idx="4"/>
+            <a:endCxn id="48" idx="5"/>
+          </p:cNvCxnSpPr>
+          <p:nvPr/>
+        </p:nvCxnSpPr>
+        <p:spPr>
+          <a:xfrm rot="5400000" flipH="1" flipV="1">
+            <a:off x="6787823" y="4014723"/>
+            <a:ext cx="129962" cy="617188"/>
+          </a:xfrm>
+          <a:prstGeom prst="bentConnector3">
+            <a:avLst>
+              <a:gd name="adj1" fmla="val -175898"/>
+            </a:avLst>
+          </a:prstGeom>
+          <a:ln>
+            <a:tailEnd type="triangle"/>
+          </a:ln>
+        </p:spPr>
+        <p:style>
+          <a:lnRef idx="1">
+            <a:schemeClr val="accent1"/>
+          </a:lnRef>
+          <a:fillRef idx="0">
+            <a:schemeClr val="accent1"/>
+          </a:fillRef>
+          <a:effectRef idx="0">
+            <a:schemeClr val="accent1"/>
+          </a:effectRef>
+          <a:fontRef idx="minor">
+            <a:schemeClr val="tx1"/>
+          </a:fontRef>
+        </p:style>
+      </p:cxnSp>
+      <p:sp>
+        <p:nvSpPr>
+          <p:cNvPr id="206" name="CasellaDiTesto 205">
+            <a:extLst>
+              <a:ext uri="{FF2B5EF4-FFF2-40B4-BE49-F238E27FC236}">
+                <a16:creationId xmlns:a16="http://schemas.microsoft.com/office/drawing/2014/main" id="{EAECE7B6-6BF4-4082-B25F-A420669CDE93}"/>
+              </a:ext>
+            </a:extLst>
+          </p:cNvPr>
+          <p:cNvSpPr txBox="1"/>
+          <p:nvPr/>
+        </p:nvSpPr>
+        <p:spPr>
+          <a:xfrm rot="4764260">
+            <a:off x="5911926" y="2180027"/>
+            <a:ext cx="977388" cy="307777"/>
+          </a:xfrm>
+          <a:prstGeom prst="rect">
+            <a:avLst/>
+          </a:prstGeom>
+          <a:noFill/>
+        </p:spPr>
+        <p:txBody>
+          <a:bodyPr wrap="square" rtlCol="0">
+            <a:spAutoFit/>
+          </a:bodyPr>
+          <a:lstStyle/>
+          <a:p>
+            <a:r>
+              <a:rPr lang="it-IT" sz="1400" dirty="0"/>
+              <a:t> !RO &amp; 6</a:t>
+            </a:r>
+          </a:p>
+        </p:txBody>
+      </p:sp>
+      <p:sp>
+        <p:nvSpPr>
+          <p:cNvPr id="207" name="CasellaDiTesto 206">
+            <a:extLst>
+              <a:ext uri="{FF2B5EF4-FFF2-40B4-BE49-F238E27FC236}">
+                <a16:creationId xmlns:a16="http://schemas.microsoft.com/office/drawing/2014/main" id="{9CD6AAE1-DFB8-401E-92C4-644EEE27A49D}"/>
+              </a:ext>
+            </a:extLst>
+          </p:cNvPr>
+          <p:cNvSpPr txBox="1"/>
+          <p:nvPr/>
+        </p:nvSpPr>
+        <p:spPr>
+          <a:xfrm rot="21361740">
+            <a:off x="6544346" y="4373739"/>
+            <a:ext cx="977388" cy="307777"/>
+          </a:xfrm>
+          <a:prstGeom prst="rect">
+            <a:avLst/>
+          </a:prstGeom>
+          <a:noFill/>
+        </p:spPr>
+        <p:txBody>
+          <a:bodyPr wrap="square" rtlCol="0">
+            <a:spAutoFit/>
+          </a:bodyPr>
+          <a:lstStyle/>
+          <a:p>
+            <a:r>
+              <a:rPr lang="it-IT" sz="1400" dirty="0"/>
+              <a:t> RO</a:t>
+            </a:r>
+          </a:p>
+        </p:txBody>
+      </p:sp>
+      <p:cxnSp>
+        <p:nvCxnSpPr>
+          <p:cNvPr id="209" name="Connettore 2 208">
+            <a:extLst>
+              <a:ext uri="{FF2B5EF4-FFF2-40B4-BE49-F238E27FC236}">
+                <a16:creationId xmlns:a16="http://schemas.microsoft.com/office/drawing/2014/main" id="{4604F36F-B1EF-4D06-B3EC-82A8AC241B39}"/>
+              </a:ext>
+            </a:extLst>
+          </p:cNvPr>
+          <p:cNvCxnSpPr>
+            <a:stCxn id="48" idx="0"/>
+            <a:endCxn id="33" idx="5"/>
+          </p:cNvCxnSpPr>
+          <p:nvPr/>
+        </p:nvCxnSpPr>
+        <p:spPr>
+          <a:xfrm flipH="1" flipV="1">
+            <a:off x="6231256" y="1781646"/>
+            <a:ext cx="312954" cy="1719215"/>
+          </a:xfrm>
+          <a:prstGeom prst="straightConnector1">
+            <a:avLst/>
+          </a:prstGeom>
+          <a:ln>
+            <a:tailEnd type="triangle"/>
+          </a:ln>
+        </p:spPr>
+        <p:style>
+          <a:lnRef idx="1">
+            <a:schemeClr val="accent1"/>
+          </a:lnRef>
+          <a:fillRef idx="0">
+            <a:schemeClr val="accent1"/>
+          </a:fillRef>
+          <a:effectRef idx="0">
+            <a:schemeClr val="accent1"/>
+          </a:effectRef>
+          <a:fontRef idx="minor">
+            <a:schemeClr val="tx1"/>
+          </a:fontRef>
+        </p:style>
+      </p:cxnSp>
+      <p:cxnSp>
+        <p:nvCxnSpPr>
+          <p:cNvPr id="211" name="Connettore 2 210">
+            <a:extLst>
+              <a:ext uri="{FF2B5EF4-FFF2-40B4-BE49-F238E27FC236}">
+                <a16:creationId xmlns:a16="http://schemas.microsoft.com/office/drawing/2014/main" id="{C2CF9CBC-6DE4-434F-9E02-575B360D9F27}"/>
+              </a:ext>
+            </a:extLst>
+          </p:cNvPr>
+          <p:cNvCxnSpPr>
+            <a:stCxn id="48" idx="3"/>
+            <a:endCxn id="25" idx="0"/>
+          </p:cNvCxnSpPr>
+          <p:nvPr/>
+        </p:nvCxnSpPr>
+        <p:spPr>
+          <a:xfrm flipH="1">
+            <a:off x="971477" y="4258336"/>
+            <a:ext cx="4955544" cy="930714"/>
+          </a:xfrm>
+          <a:prstGeom prst="straightConnector1">
+            <a:avLst/>
+          </a:prstGeom>
+          <a:ln>
+            <a:tailEnd type="triangle"/>
+          </a:ln>
+        </p:spPr>
+        <p:style>
+          <a:lnRef idx="1">
+            <a:schemeClr val="accent1"/>
+          </a:lnRef>
+          <a:fillRef idx="0">
+            <a:schemeClr val="accent1"/>
+          </a:fillRef>
+          <a:effectRef idx="0">
+            <a:schemeClr val="accent1"/>
+          </a:effectRef>
+          <a:fontRef idx="minor">
+            <a:schemeClr val="tx1"/>
+          </a:fontRef>
+        </p:style>
+      </p:cxnSp>
+      <p:sp>
+        <p:nvSpPr>
+          <p:cNvPr id="212" name="CasellaDiTesto 211">
+            <a:extLst>
+              <a:ext uri="{FF2B5EF4-FFF2-40B4-BE49-F238E27FC236}">
+                <a16:creationId xmlns:a16="http://schemas.microsoft.com/office/drawing/2014/main" id="{71E4AD08-7811-4437-821E-018F8A6732F2}"/>
+              </a:ext>
+            </a:extLst>
+          </p:cNvPr>
+          <p:cNvSpPr txBox="1"/>
+          <p:nvPr/>
+        </p:nvSpPr>
+        <p:spPr>
+          <a:xfrm rot="21149181">
+            <a:off x="4257011" y="4270116"/>
+            <a:ext cx="977388" cy="307777"/>
+          </a:xfrm>
+          <a:prstGeom prst="rect">
+            <a:avLst/>
+          </a:prstGeom>
+          <a:noFill/>
+        </p:spPr>
+        <p:txBody>
+          <a:bodyPr wrap="square" rtlCol="0">
+            <a:spAutoFit/>
+          </a:bodyPr>
+          <a:lstStyle/>
+          <a:p>
+            <a:r>
+              <a:rPr lang="it-IT" sz="1400" dirty="0"/>
+              <a:t> !RO &amp; 5</a:t>
+            </a:r>
+          </a:p>
+        </p:txBody>
+      </p:sp>
+      <p:cxnSp>
+        <p:nvCxnSpPr>
+          <p:cNvPr id="219" name="Connettore 2 218">
+            <a:extLst>
+              <a:ext uri="{FF2B5EF4-FFF2-40B4-BE49-F238E27FC236}">
+                <a16:creationId xmlns:a16="http://schemas.microsoft.com/office/drawing/2014/main" id="{8E2F9349-1E7C-411C-B0FB-DEFFA6A2D32A}"/>
+              </a:ext>
+            </a:extLst>
+          </p:cNvPr>
+          <p:cNvCxnSpPr>
+            <a:stCxn id="48" idx="5"/>
+            <a:endCxn id="103" idx="4"/>
+          </p:cNvCxnSpPr>
+          <p:nvPr/>
+        </p:nvCxnSpPr>
+        <p:spPr>
+          <a:xfrm flipV="1">
+            <a:off x="7161398" y="3588633"/>
+            <a:ext cx="3610085" cy="669703"/>
+          </a:xfrm>
+          <a:prstGeom prst="straightConnector1">
+            <a:avLst/>
+          </a:prstGeom>
+          <a:ln>
+            <a:tailEnd type="triangle"/>
+          </a:ln>
+        </p:spPr>
+        <p:style>
+          <a:lnRef idx="1">
+            <a:schemeClr val="accent1"/>
+          </a:lnRef>
+          <a:fillRef idx="0">
+            <a:schemeClr val="accent1"/>
+          </a:fillRef>
+          <a:effectRef idx="0">
+            <a:schemeClr val="accent1"/>
+          </a:effectRef>
+          <a:fontRef idx="minor">
+            <a:schemeClr val="tx1"/>
+          </a:fontRef>
+        </p:style>
+      </p:cxnSp>
+      <p:sp>
+        <p:nvSpPr>
+          <p:cNvPr id="220" name="CasellaDiTesto 219">
+            <a:extLst>
+              <a:ext uri="{FF2B5EF4-FFF2-40B4-BE49-F238E27FC236}">
+                <a16:creationId xmlns:a16="http://schemas.microsoft.com/office/drawing/2014/main" id="{81ED46AF-D39D-4851-9001-0893D6E83CD3}"/>
+              </a:ext>
+            </a:extLst>
+          </p:cNvPr>
+          <p:cNvSpPr txBox="1"/>
+          <p:nvPr/>
+        </p:nvSpPr>
+        <p:spPr>
+          <a:xfrm rot="20991032">
+            <a:off x="8403037" y="3889290"/>
+            <a:ext cx="977388" cy="307777"/>
+          </a:xfrm>
+          <a:prstGeom prst="rect">
+            <a:avLst/>
+          </a:prstGeom>
+          <a:noFill/>
+        </p:spPr>
+        <p:txBody>
+          <a:bodyPr wrap="square" rtlCol="0">
+            <a:spAutoFit/>
+          </a:bodyPr>
+          <a:lstStyle/>
+          <a:p>
+            <a:r>
+              <a:rPr lang="it-IT" sz="1400" dirty="0"/>
+              <a:t> !RO &amp; 10</a:t>
+            </a:r>
+          </a:p>
+        </p:txBody>
+      </p:sp>
+      <p:cxnSp>
+        <p:nvCxnSpPr>
+          <p:cNvPr id="222" name="Connettore 2 221">
+            <a:extLst>
+              <a:ext uri="{FF2B5EF4-FFF2-40B4-BE49-F238E27FC236}">
+                <a16:creationId xmlns:a16="http://schemas.microsoft.com/office/drawing/2014/main" id="{91E67879-690D-44D5-879B-5E91F94B1282}"/>
+              </a:ext>
+            </a:extLst>
+          </p:cNvPr>
+          <p:cNvCxnSpPr>
+            <a:stCxn id="48" idx="5"/>
+            <a:endCxn id="112" idx="2"/>
+          </p:cNvCxnSpPr>
+          <p:nvPr/>
+        </p:nvCxnSpPr>
+        <p:spPr>
+          <a:xfrm>
+            <a:off x="7161398" y="4258336"/>
+            <a:ext cx="2692437" cy="1348101"/>
+          </a:xfrm>
+          <a:prstGeom prst="straightConnector1">
+            <a:avLst/>
+          </a:prstGeom>
+          <a:ln>
+            <a:tailEnd type="triangle"/>
+          </a:ln>
+        </p:spPr>
+        <p:style>
+          <a:lnRef idx="1">
+            <a:schemeClr val="accent1"/>
+          </a:lnRef>
+          <a:fillRef idx="0">
+            <a:schemeClr val="accent1"/>
+          </a:fillRef>
+          <a:effectRef idx="0">
+            <a:schemeClr val="accent1"/>
+          </a:effectRef>
+          <a:fontRef idx="minor">
+            <a:schemeClr val="tx1"/>
+          </a:fontRef>
+        </p:style>
+      </p:cxnSp>
+      <p:sp>
+        <p:nvSpPr>
+          <p:cNvPr id="223" name="CasellaDiTesto 222">
+            <a:extLst>
+              <a:ext uri="{FF2B5EF4-FFF2-40B4-BE49-F238E27FC236}">
+                <a16:creationId xmlns:a16="http://schemas.microsoft.com/office/drawing/2014/main" id="{EA8852C8-A777-4A37-8CB9-835385E0C152}"/>
+              </a:ext>
+            </a:extLst>
+          </p:cNvPr>
+          <p:cNvSpPr txBox="1"/>
+          <p:nvPr/>
+        </p:nvSpPr>
+        <p:spPr>
+          <a:xfrm rot="1666090">
+            <a:off x="8721440" y="5038222"/>
+            <a:ext cx="977388" cy="307777"/>
+          </a:xfrm>
+          <a:prstGeom prst="rect">
+            <a:avLst/>
+          </a:prstGeom>
+          <a:noFill/>
+        </p:spPr>
+        <p:txBody>
+          <a:bodyPr wrap="square" rtlCol="0">
+            <a:spAutoFit/>
+          </a:bodyPr>
+          <a:lstStyle/>
+          <a:p>
+            <a:r>
+              <a:rPr lang="it-IT" sz="1400" dirty="0"/>
+              <a:t> !RO &amp; 11</a:t>
+            </a:r>
+          </a:p>
+        </p:txBody>
+      </p:sp>
+      <p:cxnSp>
+        <p:nvCxnSpPr>
+          <p:cNvPr id="238" name="Connettore a gomito 237">
+            <a:extLst>
+              <a:ext uri="{FF2B5EF4-FFF2-40B4-BE49-F238E27FC236}">
+                <a16:creationId xmlns:a16="http://schemas.microsoft.com/office/drawing/2014/main" id="{A4621118-5464-4824-9621-131943F3EC3B}"/>
+              </a:ext>
+            </a:extLst>
+          </p:cNvPr>
+          <p:cNvCxnSpPr>
+            <a:cxnSpLocks/>
+            <a:stCxn id="4" idx="7"/>
+            <a:endCxn id="48" idx="0"/>
+          </p:cNvCxnSpPr>
+          <p:nvPr/>
+        </p:nvCxnSpPr>
+        <p:spPr>
+          <a:xfrm rot="16200000" flipH="1">
+            <a:off x="4169073" y="1125724"/>
+            <a:ext cx="2346727" cy="2403546"/>
+          </a:xfrm>
+          <a:prstGeom prst="bentConnector3">
+            <a:avLst>
+              <a:gd name="adj1" fmla="val -26471"/>
+            </a:avLst>
+          </a:prstGeom>
+          <a:ln>
+            <a:headEnd type="triangle"/>
+            <a:tailEnd type="triangle"/>
+          </a:ln>
+        </p:spPr>
+        <p:style>
+          <a:lnRef idx="1">
+            <a:schemeClr val="accent1"/>
+          </a:lnRef>
+          <a:fillRef idx="0">
+            <a:schemeClr val="accent1"/>
+          </a:fillRef>
+          <a:effectRef idx="0">
+            <a:schemeClr val="accent1"/>
+          </a:effectRef>
+          <a:fontRef idx="minor">
+            <a:schemeClr val="tx1"/>
+          </a:fontRef>
+        </p:style>
+      </p:cxnSp>
+      <p:sp>
+        <p:nvSpPr>
+          <p:cNvPr id="242" name="CasellaDiTesto 241">
+            <a:extLst>
+              <a:ext uri="{FF2B5EF4-FFF2-40B4-BE49-F238E27FC236}">
+                <a16:creationId xmlns:a16="http://schemas.microsoft.com/office/drawing/2014/main" id="{79E8DA5D-707A-43CE-B33C-8649B4AEBBA7}"/>
+              </a:ext>
+            </a:extLst>
+          </p:cNvPr>
+          <p:cNvSpPr txBox="1"/>
+          <p:nvPr/>
+        </p:nvSpPr>
+        <p:spPr>
+          <a:xfrm>
+            <a:off x="4285394" y="291625"/>
+            <a:ext cx="977388" cy="307777"/>
+          </a:xfrm>
+          <a:prstGeom prst="rect">
+            <a:avLst/>
+          </a:prstGeom>
+          <a:noFill/>
+        </p:spPr>
+        <p:txBody>
+          <a:bodyPr wrap="square" rtlCol="0">
+            <a:spAutoFit/>
+          </a:bodyPr>
+          <a:lstStyle/>
+          <a:p>
+            <a:r>
+              <a:rPr lang="it-IT" sz="1400" dirty="0"/>
+              <a:t> RO</a:t>
+            </a:r>
+          </a:p>
+        </p:txBody>
+      </p:sp>
+      <p:sp>
+        <p:nvSpPr>
+          <p:cNvPr id="245" name="CasellaDiTesto 244">
+            <a:extLst>
+              <a:ext uri="{FF2B5EF4-FFF2-40B4-BE49-F238E27FC236}">
+                <a16:creationId xmlns:a16="http://schemas.microsoft.com/office/drawing/2014/main" id="{4A863133-0674-48A8-B4D8-2199D1B7210A}"/>
+              </a:ext>
+            </a:extLst>
+          </p:cNvPr>
+          <p:cNvSpPr txBox="1"/>
+          <p:nvPr/>
+        </p:nvSpPr>
+        <p:spPr>
+          <a:xfrm rot="5400000">
+            <a:off x="6210625" y="2008566"/>
+            <a:ext cx="977388" cy="307777"/>
+          </a:xfrm>
+          <a:prstGeom prst="rect">
+            <a:avLst/>
+          </a:prstGeom>
+          <a:noFill/>
+        </p:spPr>
+        <p:txBody>
+          <a:bodyPr wrap="square" rtlCol="0">
+            <a:spAutoFit/>
+          </a:bodyPr>
+          <a:lstStyle/>
+          <a:p>
+            <a:r>
+              <a:rPr lang="it-IT" sz="1400" dirty="0"/>
+              <a:t> !RO &amp; 2</a:t>
             </a:r>
           </a:p>
         </p:txBody>

</xml_diff>

<commit_message>
Ultime modifiche da fare agli state diagram
</commit_message>
<xml_diff>
--- a/docs/diagram.pptx
+++ b/docs/diagram.pptx
@@ -6,7 +6,10 @@
   </p:sldMasterIdLst>
   <p:sldIdLst>
     <p:sldId id="256" r:id="rId2"/>
-    <p:sldId id="257" r:id="rId3"/>
+    <p:sldId id="260" r:id="rId3"/>
+    <p:sldId id="257" r:id="rId4"/>
+    <p:sldId id="258" r:id="rId5"/>
+    <p:sldId id="259" r:id="rId6"/>
   </p:sldIdLst>
   <p:sldSz cx="12192000" cy="6858000"/>
   <p:notesSz cx="6858000" cy="9144000"/>
@@ -6104,6 +6107,220 @@
           <p:cNvPr id="2" name="CasellaDiTesto 1">
             <a:extLst>
               <a:ext uri="{FF2B5EF4-FFF2-40B4-BE49-F238E27FC236}">
+                <a16:creationId xmlns:a16="http://schemas.microsoft.com/office/drawing/2014/main" id="{37933243-1984-4DFF-82CD-62391E35C16C}"/>
+              </a:ext>
+            </a:extLst>
+          </p:cNvPr>
+          <p:cNvSpPr txBox="1"/>
+          <p:nvPr/>
+        </p:nvSpPr>
+        <p:spPr>
+          <a:xfrm>
+            <a:off x="4432570" y="97277"/>
+            <a:ext cx="2645532" cy="369332"/>
+          </a:xfrm>
+          <a:prstGeom prst="rect">
+            <a:avLst/>
+          </a:prstGeom>
+          <a:noFill/>
+        </p:spPr>
+        <p:txBody>
+          <a:bodyPr wrap="none" rtlCol="0">
+            <a:spAutoFit/>
+          </a:bodyPr>
+          <a:lstStyle/>
+          <a:p>
+            <a:r>
+              <a:rPr lang="it-IT" dirty="0"/>
+              <a:t>Legenda diagrammi a stati</a:t>
+            </a:r>
+          </a:p>
+        </p:txBody>
+      </p:sp>
+      <p:sp>
+        <p:nvSpPr>
+          <p:cNvPr id="3" name="CasellaDiTesto 2">
+            <a:extLst>
+              <a:ext uri="{FF2B5EF4-FFF2-40B4-BE49-F238E27FC236}">
+                <a16:creationId xmlns:a16="http://schemas.microsoft.com/office/drawing/2014/main" id="{FFDCC193-DF42-42FC-99D1-BBA1338D942A}"/>
+              </a:ext>
+            </a:extLst>
+          </p:cNvPr>
+          <p:cNvSpPr txBox="1"/>
+          <p:nvPr/>
+        </p:nvSpPr>
+        <p:spPr>
+          <a:xfrm>
+            <a:off x="201038" y="593386"/>
+            <a:ext cx="11789924" cy="6186309"/>
+          </a:xfrm>
+          <a:prstGeom prst="rect">
+            <a:avLst/>
+          </a:prstGeom>
+          <a:noFill/>
+        </p:spPr>
+        <p:txBody>
+          <a:bodyPr wrap="square" rtlCol="0">
+            <a:spAutoFit/>
+          </a:bodyPr>
+          <a:lstStyle/>
+          <a:p>
+            <a:r>
+              <a:rPr lang="it-IT" dirty="0"/>
+              <a:t>TAC: in tutti gli altri casi</a:t>
+            </a:r>
+          </a:p>
+          <a:p>
+            <a:r>
+              <a:rPr lang="it-IT" dirty="0"/>
+              <a:t>O: presente un nuovo ordine da effettuare</a:t>
+            </a:r>
+          </a:p>
+          <a:p>
+            <a:r>
+              <a:rPr lang="it-IT" dirty="0"/>
+              <a:t>CB: batteria carica</a:t>
+            </a:r>
+          </a:p>
+          <a:p>
+            <a:r>
+              <a:rPr lang="it-IT" dirty="0"/>
+              <a:t>QR: quota raggiunta</a:t>
+            </a:r>
+          </a:p>
+          <a:p>
+            <a:r>
+              <a:rPr lang="it-IT" dirty="0"/>
+              <a:t>BR: base raggiunta</a:t>
+            </a:r>
+          </a:p>
+          <a:p>
+            <a:r>
+              <a:rPr lang="it-IT" dirty="0"/>
+              <a:t>S: stabilizzato</a:t>
+            </a:r>
+          </a:p>
+          <a:p>
+            <a:r>
+              <a:rPr lang="it-IT" dirty="0"/>
+              <a:t>MA: magnete attivo(pacco preso)</a:t>
+            </a:r>
+          </a:p>
+          <a:p>
+            <a:r>
+              <a:rPr lang="it-IT" dirty="0"/>
+              <a:t>DR: destinazione raggiunta</a:t>
+            </a:r>
+          </a:p>
+          <a:p>
+            <a:r>
+              <a:rPr lang="it-IT" dirty="0"/>
+              <a:t>RO: ostacolo rilevato</a:t>
+            </a:r>
+          </a:p>
+          <a:p>
+            <a:r>
+              <a:rPr lang="it-IT" dirty="0"/>
+              <a:t>AE: atterraggio eseguito</a:t>
+            </a:r>
+          </a:p>
+          <a:p>
+            <a:r>
+              <a:rPr lang="it-IT" dirty="0"/>
+              <a:t>AN: anomalia rilevata</a:t>
+            </a:r>
+          </a:p>
+          <a:p>
+            <a:r>
+              <a:rPr lang="it-IT" dirty="0"/>
+              <a:t>PR: pacco raggiunto </a:t>
+            </a:r>
+          </a:p>
+          <a:p>
+            <a:r>
+              <a:rPr lang="it-IT" dirty="0"/>
+              <a:t>RR: stazione ricarica raggiunta</a:t>
+            </a:r>
+          </a:p>
+          <a:p>
+            <a:r>
+              <a:rPr lang="it-IT" dirty="0"/>
+              <a:t>SA: spostati avanti</a:t>
+            </a:r>
+          </a:p>
+          <a:p>
+            <a:r>
+              <a:rPr lang="it-IT" dirty="0"/>
+              <a:t>1: si proveniva dallo stato 1 (vale per qualsiasi numero)</a:t>
+            </a:r>
+          </a:p>
+          <a:p>
+            <a:r>
+              <a:rPr lang="it-IT" dirty="0"/>
+              <a:t>&amp;: operatore booleano «and»</a:t>
+            </a:r>
+          </a:p>
+          <a:p>
+            <a:r>
+              <a:rPr lang="it-IT" dirty="0"/>
+              <a:t>!: operatore booleano «not»</a:t>
+            </a:r>
+          </a:p>
+          <a:p>
+            <a:endParaRPr lang="it-IT" dirty="0"/>
+          </a:p>
+          <a:p>
+            <a:r>
+              <a:rPr lang="it-IT" dirty="0"/>
+              <a:t>Esempio:</a:t>
+            </a:r>
+          </a:p>
+          <a:p>
+            <a:r>
+              <a:rPr lang="it-IT" sz="1800" dirty="0"/>
+              <a:t>O &amp; !CB &amp; !5 = è presente un nuovo ordine da effettuare, la batteria non è carica e non si proviene dallo stato 5, ovvero da go back home, in questo caso il drone deve andare allo stato recharge battery</a:t>
+            </a:r>
+          </a:p>
+          <a:p>
+            <a:endParaRPr lang="it-IT" dirty="0"/>
+          </a:p>
+        </p:txBody>
+      </p:sp>
+    </p:spTree>
+    <p:extLst>
+      <p:ext uri="{BB962C8B-B14F-4D97-AF65-F5344CB8AC3E}">
+        <p14:creationId xmlns:p14="http://schemas.microsoft.com/office/powerpoint/2010/main" val="512803625"/>
+      </p:ext>
+    </p:extLst>
+  </p:cSld>
+  <p:clrMapOvr>
+    <a:masterClrMapping/>
+  </p:clrMapOvr>
+</p:sld>
+</file>
+
+<file path=ppt/slides/slide3.xml><?xml version="1.0" encoding="utf-8"?>
+<p:sld xmlns:a="http://schemas.openxmlformats.org/drawingml/2006/main" xmlns:r="http://schemas.openxmlformats.org/officeDocument/2006/relationships" xmlns:p="http://schemas.openxmlformats.org/presentationml/2006/main">
+  <p:cSld>
+    <p:spTree>
+      <p:nvGrpSpPr>
+        <p:cNvPr id="1" name=""/>
+        <p:cNvGrpSpPr/>
+        <p:nvPr/>
+      </p:nvGrpSpPr>
+      <p:grpSpPr>
+        <a:xfrm>
+          <a:off x="0" y="0"/>
+          <a:ext cx="0" cy="0"/>
+          <a:chOff x="0" y="0"/>
+          <a:chExt cx="0" cy="0"/>
+        </a:xfrm>
+      </p:grpSpPr>
+      <p:sp>
+        <p:nvSpPr>
+          <p:cNvPr id="2" name="CasellaDiTesto 1">
+            <a:extLst>
+              <a:ext uri="{FF2B5EF4-FFF2-40B4-BE49-F238E27FC236}">
                 <a16:creationId xmlns:a16="http://schemas.microsoft.com/office/drawing/2014/main" id="{BA3DA572-6DB1-43A6-85DD-912F1F618AD3}"/>
               </a:ext>
             </a:extLst>
@@ -6907,7 +7124,7 @@
           <a:p>
             <a:r>
               <a:rPr lang="it-IT" sz="1400" dirty="0"/>
-              <a:t>!O &amp; ?</a:t>
+              <a:t>!O &amp; 9</a:t>
             </a:r>
           </a:p>
         </p:txBody>
@@ -7330,7 +7547,7 @@
           <a:p>
             <a:r>
               <a:rPr lang="it-IT" sz="1400" dirty="0"/>
-              <a:t> BR</a:t>
+              <a:t> PR</a:t>
             </a:r>
           </a:p>
         </p:txBody>
@@ -7406,7 +7623,7 @@
           <a:p>
             <a:r>
               <a:rPr lang="it-IT" sz="1400" dirty="0"/>
-              <a:t>!BR</a:t>
+              <a:t>!PR</a:t>
             </a:r>
           </a:p>
         </p:txBody>
@@ -7812,7 +8029,7 @@
           <a:p>
             <a:r>
               <a:rPr lang="it-IT" sz="1400" dirty="0"/>
-              <a:t> S &amp; ? </a:t>
+              <a:t> S &amp; 16 </a:t>
             </a:r>
           </a:p>
         </p:txBody>
@@ -7874,8 +8091,8 @@
         </p:nvSpPr>
         <p:spPr>
           <a:xfrm rot="5628672">
-            <a:off x="7954868" y="2980380"/>
-            <a:ext cx="1156012" cy="307777"/>
+            <a:off x="7832485" y="2809292"/>
+            <a:ext cx="1382414" cy="307777"/>
           </a:xfrm>
           <a:prstGeom prst="rect">
             <a:avLst/>
@@ -7890,7 +8107,7 @@
           <a:p>
             <a:r>
               <a:rPr lang="it-IT" sz="1400" dirty="0"/>
-              <a:t> S &amp; !? &amp; MA </a:t>
+              <a:t> S &amp; !16 &amp; MA </a:t>
             </a:r>
           </a:p>
         </p:txBody>
@@ -7967,7 +8184,7 @@
           <a:p>
             <a:r>
               <a:rPr lang="it-IT" sz="1400" dirty="0"/>
-              <a:t> S &amp; !? &amp; !MA </a:t>
+              <a:t> S &amp; !16 &amp; !MA </a:t>
             </a:r>
           </a:p>
         </p:txBody>
@@ -8438,7 +8655,7 @@
           <a:p>
             <a:r>
               <a:rPr lang="it-IT" sz="1400" dirty="0"/>
-              <a:t>!NA</a:t>
+              <a:t>!QR</a:t>
             </a:r>
           </a:p>
         </p:txBody>
@@ -8515,7 +8732,7 @@
           <a:p>
             <a:r>
               <a:rPr lang="it-IT" sz="1400" dirty="0"/>
-              <a:t>NA</a:t>
+              <a:t>QR</a:t>
             </a:r>
           </a:p>
         </p:txBody>
@@ -9453,7 +9670,7 @@
           <a:p>
             <a:r>
               <a:rPr lang="it-IT" sz="1400" dirty="0"/>
-              <a:t> !CR</a:t>
+              <a:t> !BR</a:t>
             </a:r>
           </a:p>
         </p:txBody>
@@ -9488,7 +9705,7 @@
           <a:p>
             <a:r>
               <a:rPr lang="it-IT" sz="1400" dirty="0"/>
-              <a:t> CR</a:t>
+              <a:t> BR</a:t>
             </a:r>
           </a:p>
         </p:txBody>
@@ -10678,6 +10895,1348 @@
     <p:extLst>
       <p:ext uri="{BB962C8B-B14F-4D97-AF65-F5344CB8AC3E}">
         <p14:creationId xmlns:p14="http://schemas.microsoft.com/office/powerpoint/2010/main" val="2151255226"/>
+      </p:ext>
+    </p:extLst>
+  </p:cSld>
+  <p:clrMapOvr>
+    <a:masterClrMapping/>
+  </p:clrMapOvr>
+</p:sld>
+</file>
+
+<file path=ppt/slides/slide4.xml><?xml version="1.0" encoding="utf-8"?>
+<p:sld xmlns:a="http://schemas.openxmlformats.org/drawingml/2006/main" xmlns:r="http://schemas.openxmlformats.org/officeDocument/2006/relationships" xmlns:p="http://schemas.openxmlformats.org/presentationml/2006/main">
+  <p:cSld>
+    <p:spTree>
+      <p:nvGrpSpPr>
+        <p:cNvPr id="1" name=""/>
+        <p:cNvGrpSpPr/>
+        <p:nvPr/>
+      </p:nvGrpSpPr>
+      <p:grpSpPr>
+        <a:xfrm>
+          <a:off x="0" y="0"/>
+          <a:ext cx="0" cy="0"/>
+          <a:chOff x="0" y="0"/>
+          <a:chExt cx="0" cy="0"/>
+        </a:xfrm>
+      </p:grpSpPr>
+      <p:sp>
+        <p:nvSpPr>
+          <p:cNvPr id="2" name="CasellaDiTesto 1">
+            <a:extLst>
+              <a:ext uri="{FF2B5EF4-FFF2-40B4-BE49-F238E27FC236}">
+                <a16:creationId xmlns:a16="http://schemas.microsoft.com/office/drawing/2014/main" id="{8E1550F9-5966-4493-8328-4CE0BD360C91}"/>
+              </a:ext>
+            </a:extLst>
+          </p:cNvPr>
+          <p:cNvSpPr txBox="1"/>
+          <p:nvPr/>
+        </p:nvSpPr>
+        <p:spPr>
+          <a:xfrm>
+            <a:off x="3726789" y="-19726"/>
+            <a:ext cx="4260715" cy="369332"/>
+          </a:xfrm>
+          <a:prstGeom prst="rect">
+            <a:avLst/>
+          </a:prstGeom>
+          <a:noFill/>
+        </p:spPr>
+        <p:txBody>
+          <a:bodyPr wrap="square" rtlCol="0">
+            <a:spAutoFit/>
+          </a:bodyPr>
+          <a:lstStyle/>
+          <a:p>
+            <a:r>
+              <a:rPr lang="it-IT" dirty="0"/>
+              <a:t>Diagramma a stati: «Verifica Anomalia»</a:t>
+            </a:r>
+          </a:p>
+        </p:txBody>
+      </p:sp>
+      <p:sp>
+        <p:nvSpPr>
+          <p:cNvPr id="3" name="Ovale 2">
+            <a:extLst>
+              <a:ext uri="{FF2B5EF4-FFF2-40B4-BE49-F238E27FC236}">
+                <a16:creationId xmlns:a16="http://schemas.microsoft.com/office/drawing/2014/main" id="{CE2A1B95-9137-43BD-87B4-34288C99D6F9}"/>
+              </a:ext>
+            </a:extLst>
+          </p:cNvPr>
+          <p:cNvSpPr/>
+          <p:nvPr/>
+        </p:nvSpPr>
+        <p:spPr>
+          <a:xfrm>
+            <a:off x="2393718" y="818038"/>
+            <a:ext cx="2079234" cy="1105199"/>
+          </a:xfrm>
+          <a:prstGeom prst="ellipse">
+            <a:avLst/>
+          </a:prstGeom>
+          <a:solidFill>
+            <a:srgbClr val="C00000"/>
+          </a:solidFill>
+        </p:spPr>
+        <p:style>
+          <a:lnRef idx="2">
+            <a:schemeClr val="accent1">
+              <a:shade val="50000"/>
+            </a:schemeClr>
+          </a:lnRef>
+          <a:fillRef idx="1">
+            <a:schemeClr val="accent1"/>
+          </a:fillRef>
+          <a:effectRef idx="0">
+            <a:schemeClr val="accent1"/>
+          </a:effectRef>
+          <a:fontRef idx="minor">
+            <a:schemeClr val="lt1"/>
+          </a:fontRef>
+        </p:style>
+        <p:txBody>
+          <a:bodyPr rtlCol="0" anchor="ctr"/>
+          <a:lstStyle/>
+          <a:p>
+            <a:pPr algn="ctr"/>
+            <a:endParaRPr lang="it-IT" dirty="0"/>
+          </a:p>
+          <a:p>
+            <a:pPr algn="ctr"/>
+            <a:r>
+              <a:rPr lang="it-IT" dirty="0"/>
+              <a:t>Drone anomaly detected (16)</a:t>
+            </a:r>
+          </a:p>
+          <a:p>
+            <a:pPr algn="ctr"/>
+            <a:endParaRPr lang="it-IT" dirty="0"/>
+          </a:p>
+        </p:txBody>
+      </p:sp>
+      <p:sp>
+        <p:nvSpPr>
+          <p:cNvPr id="4" name="Ovale 3">
+            <a:extLst>
+              <a:ext uri="{FF2B5EF4-FFF2-40B4-BE49-F238E27FC236}">
+                <a16:creationId xmlns:a16="http://schemas.microsoft.com/office/drawing/2014/main" id="{817F4DF6-A744-48BE-8CFD-B9E4F66A413B}"/>
+              </a:ext>
+            </a:extLst>
+          </p:cNvPr>
+          <p:cNvSpPr/>
+          <p:nvPr/>
+        </p:nvSpPr>
+        <p:spPr>
+          <a:xfrm>
+            <a:off x="6654383" y="787902"/>
+            <a:ext cx="2079234" cy="1105199"/>
+          </a:xfrm>
+          <a:prstGeom prst="ellipse">
+            <a:avLst/>
+          </a:prstGeom>
+          <a:solidFill>
+            <a:srgbClr val="C00000"/>
+          </a:solidFill>
+        </p:spPr>
+        <p:style>
+          <a:lnRef idx="2">
+            <a:schemeClr val="accent1">
+              <a:shade val="50000"/>
+            </a:schemeClr>
+          </a:lnRef>
+          <a:fillRef idx="1">
+            <a:schemeClr val="accent1"/>
+          </a:fillRef>
+          <a:effectRef idx="0">
+            <a:schemeClr val="accent1"/>
+          </a:effectRef>
+          <a:fontRef idx="minor">
+            <a:schemeClr val="lt1"/>
+          </a:fontRef>
+        </p:style>
+        <p:txBody>
+          <a:bodyPr rtlCol="0" anchor="ctr"/>
+          <a:lstStyle/>
+          <a:p>
+            <a:pPr algn="ctr"/>
+            <a:endParaRPr lang="it-IT" dirty="0"/>
+          </a:p>
+          <a:p>
+            <a:pPr algn="ctr"/>
+            <a:r>
+              <a:rPr lang="it-IT" dirty="0"/>
+              <a:t>Deactivate</a:t>
+            </a:r>
+          </a:p>
+          <a:p>
+            <a:pPr algn="ctr"/>
+            <a:r>
+              <a:rPr lang="it-IT" dirty="0"/>
+              <a:t>(18)</a:t>
+            </a:r>
+          </a:p>
+          <a:p>
+            <a:pPr algn="ctr"/>
+            <a:endParaRPr lang="it-IT" dirty="0"/>
+          </a:p>
+        </p:txBody>
+      </p:sp>
+      <p:sp>
+        <p:nvSpPr>
+          <p:cNvPr id="5" name="Ovale 4">
+            <a:extLst>
+              <a:ext uri="{FF2B5EF4-FFF2-40B4-BE49-F238E27FC236}">
+                <a16:creationId xmlns:a16="http://schemas.microsoft.com/office/drawing/2014/main" id="{EFD28BB9-C92F-425C-A638-C89B56AAF6F6}"/>
+              </a:ext>
+            </a:extLst>
+          </p:cNvPr>
+          <p:cNvSpPr/>
+          <p:nvPr/>
+        </p:nvSpPr>
+        <p:spPr>
+          <a:xfrm>
+            <a:off x="5120333" y="2687435"/>
+            <a:ext cx="2079234" cy="1105199"/>
+          </a:xfrm>
+          <a:prstGeom prst="ellipse">
+            <a:avLst/>
+          </a:prstGeom>
+          <a:solidFill>
+            <a:srgbClr val="C00000"/>
+          </a:solidFill>
+        </p:spPr>
+        <p:style>
+          <a:lnRef idx="2">
+            <a:schemeClr val="accent1">
+              <a:shade val="50000"/>
+            </a:schemeClr>
+          </a:lnRef>
+          <a:fillRef idx="1">
+            <a:schemeClr val="accent1"/>
+          </a:fillRef>
+          <a:effectRef idx="0">
+            <a:schemeClr val="accent1"/>
+          </a:effectRef>
+          <a:fontRef idx="minor">
+            <a:schemeClr val="lt1"/>
+          </a:fontRef>
+        </p:style>
+        <p:txBody>
+          <a:bodyPr rtlCol="0" anchor="ctr"/>
+          <a:lstStyle/>
+          <a:p>
+            <a:pPr algn="ctr"/>
+            <a:endParaRPr lang="it-IT" dirty="0"/>
+          </a:p>
+          <a:p>
+            <a:pPr algn="ctr"/>
+            <a:r>
+              <a:rPr lang="it-IT" dirty="0"/>
+              <a:t>Emergency shutdown (17)</a:t>
+            </a:r>
+          </a:p>
+          <a:p>
+            <a:pPr algn="ctr"/>
+            <a:endParaRPr lang="it-IT" dirty="0"/>
+          </a:p>
+        </p:txBody>
+      </p:sp>
+      <p:cxnSp>
+        <p:nvCxnSpPr>
+          <p:cNvPr id="7" name="Connettore a gomito 6">
+            <a:extLst>
+              <a:ext uri="{FF2B5EF4-FFF2-40B4-BE49-F238E27FC236}">
+                <a16:creationId xmlns:a16="http://schemas.microsoft.com/office/drawing/2014/main" id="{8F87A0DB-5CBB-403E-A287-7D16647A2099}"/>
+              </a:ext>
+            </a:extLst>
+          </p:cNvPr>
+          <p:cNvCxnSpPr>
+            <a:stCxn id="3" idx="1"/>
+            <a:endCxn id="3" idx="0"/>
+          </p:cNvCxnSpPr>
+          <p:nvPr/>
+        </p:nvCxnSpPr>
+        <p:spPr>
+          <a:xfrm rot="5400000" flipH="1" flipV="1">
+            <a:off x="2984849" y="531405"/>
+            <a:ext cx="161853" cy="735120"/>
+          </a:xfrm>
+          <a:prstGeom prst="bentConnector3">
+            <a:avLst>
+              <a:gd name="adj1" fmla="val 241239"/>
+            </a:avLst>
+          </a:prstGeom>
+          <a:ln>
+            <a:tailEnd type="triangle"/>
+          </a:ln>
+        </p:spPr>
+        <p:style>
+          <a:lnRef idx="1">
+            <a:schemeClr val="accent1"/>
+          </a:lnRef>
+          <a:fillRef idx="0">
+            <a:schemeClr val="accent1"/>
+          </a:fillRef>
+          <a:effectRef idx="0">
+            <a:schemeClr val="accent1"/>
+          </a:effectRef>
+          <a:fontRef idx="minor">
+            <a:schemeClr val="tx1"/>
+          </a:fontRef>
+        </p:style>
+      </p:cxnSp>
+      <p:sp>
+        <p:nvSpPr>
+          <p:cNvPr id="8" name="CasellaDiTesto 7">
+            <a:extLst>
+              <a:ext uri="{FF2B5EF4-FFF2-40B4-BE49-F238E27FC236}">
+                <a16:creationId xmlns:a16="http://schemas.microsoft.com/office/drawing/2014/main" id="{07CF447F-C779-46B4-81A3-58A2EAD42D85}"/>
+              </a:ext>
+            </a:extLst>
+          </p:cNvPr>
+          <p:cNvSpPr txBox="1"/>
+          <p:nvPr/>
+        </p:nvSpPr>
+        <p:spPr>
+          <a:xfrm>
+            <a:off x="2841455" y="523755"/>
+            <a:ext cx="479618" cy="369332"/>
+          </a:xfrm>
+          <a:prstGeom prst="rect">
+            <a:avLst/>
+          </a:prstGeom>
+          <a:noFill/>
+        </p:spPr>
+        <p:txBody>
+          <a:bodyPr wrap="none" rtlCol="0">
+            <a:spAutoFit/>
+          </a:bodyPr>
+          <a:lstStyle/>
+          <a:p>
+            <a:r>
+              <a:rPr lang="it-IT" dirty="0"/>
+              <a:t>!</a:t>
+            </a:r>
+            <a:r>
+              <a:rPr lang="it-IT" sz="1400" dirty="0"/>
+              <a:t>AN</a:t>
+            </a:r>
+          </a:p>
+        </p:txBody>
+      </p:sp>
+      <p:sp>
+        <p:nvSpPr>
+          <p:cNvPr id="9" name="Ovale 8">
+            <a:extLst>
+              <a:ext uri="{FF2B5EF4-FFF2-40B4-BE49-F238E27FC236}">
+                <a16:creationId xmlns:a16="http://schemas.microsoft.com/office/drawing/2014/main" id="{55C8C66A-9959-45E1-AD7A-63AB5067B5A8}"/>
+              </a:ext>
+            </a:extLst>
+          </p:cNvPr>
+          <p:cNvSpPr/>
+          <p:nvPr/>
+        </p:nvSpPr>
+        <p:spPr>
+          <a:xfrm>
+            <a:off x="2602849" y="4723494"/>
+            <a:ext cx="1745673" cy="887437"/>
+          </a:xfrm>
+          <a:prstGeom prst="ellipse">
+            <a:avLst/>
+          </a:prstGeom>
+        </p:spPr>
+        <p:style>
+          <a:lnRef idx="2">
+            <a:schemeClr val="accent1">
+              <a:shade val="50000"/>
+            </a:schemeClr>
+          </a:lnRef>
+          <a:fillRef idx="1">
+            <a:schemeClr val="accent1"/>
+          </a:fillRef>
+          <a:effectRef idx="0">
+            <a:schemeClr val="accent1"/>
+          </a:effectRef>
+          <a:fontRef idx="minor">
+            <a:schemeClr val="lt1"/>
+          </a:fontRef>
+        </p:style>
+        <p:txBody>
+          <a:bodyPr rtlCol="0" anchor="ctr"/>
+          <a:lstStyle/>
+          <a:p>
+            <a:pPr algn="ctr"/>
+            <a:endParaRPr lang="it-IT" dirty="0"/>
+          </a:p>
+          <a:p>
+            <a:pPr algn="ctr"/>
+            <a:r>
+              <a:rPr lang="it-IT" dirty="0"/>
+              <a:t>Stabilize on position (7)</a:t>
+            </a:r>
+          </a:p>
+          <a:p>
+            <a:pPr algn="ctr"/>
+            <a:endParaRPr lang="it-IT" dirty="0"/>
+          </a:p>
+        </p:txBody>
+      </p:sp>
+      <p:cxnSp>
+        <p:nvCxnSpPr>
+          <p:cNvPr id="12" name="Connettore 2 11">
+            <a:extLst>
+              <a:ext uri="{FF2B5EF4-FFF2-40B4-BE49-F238E27FC236}">
+                <a16:creationId xmlns:a16="http://schemas.microsoft.com/office/drawing/2014/main" id="{4E3F51F4-2BC8-4C04-83E1-9D162D1D6496}"/>
+              </a:ext>
+            </a:extLst>
+          </p:cNvPr>
+          <p:cNvCxnSpPr>
+            <a:stCxn id="3" idx="4"/>
+            <a:endCxn id="9" idx="0"/>
+          </p:cNvCxnSpPr>
+          <p:nvPr/>
+        </p:nvCxnSpPr>
+        <p:spPr>
+          <a:xfrm>
+            <a:off x="3433335" y="1923237"/>
+            <a:ext cx="42351" cy="2800257"/>
+          </a:xfrm>
+          <a:prstGeom prst="straightConnector1">
+            <a:avLst/>
+          </a:prstGeom>
+          <a:ln>
+            <a:tailEnd type="triangle"/>
+          </a:ln>
+        </p:spPr>
+        <p:style>
+          <a:lnRef idx="1">
+            <a:schemeClr val="accent1"/>
+          </a:lnRef>
+          <a:fillRef idx="0">
+            <a:schemeClr val="accent1"/>
+          </a:fillRef>
+          <a:effectRef idx="0">
+            <a:schemeClr val="accent1"/>
+          </a:effectRef>
+          <a:fontRef idx="minor">
+            <a:schemeClr val="tx1"/>
+          </a:fontRef>
+        </p:style>
+      </p:cxnSp>
+      <p:sp>
+        <p:nvSpPr>
+          <p:cNvPr id="16" name="CasellaDiTesto 15">
+            <a:extLst>
+              <a:ext uri="{FF2B5EF4-FFF2-40B4-BE49-F238E27FC236}">
+                <a16:creationId xmlns:a16="http://schemas.microsoft.com/office/drawing/2014/main" id="{D51E5C96-E308-4600-9E28-53E8F02AC980}"/>
+              </a:ext>
+            </a:extLst>
+          </p:cNvPr>
+          <p:cNvSpPr txBox="1"/>
+          <p:nvPr/>
+        </p:nvSpPr>
+        <p:spPr>
+          <a:xfrm>
+            <a:off x="3383591" y="2756170"/>
+            <a:ext cx="404278" cy="307777"/>
+          </a:xfrm>
+          <a:prstGeom prst="rect">
+            <a:avLst/>
+          </a:prstGeom>
+          <a:noFill/>
+        </p:spPr>
+        <p:txBody>
+          <a:bodyPr wrap="none" rtlCol="0">
+            <a:spAutoFit/>
+          </a:bodyPr>
+          <a:lstStyle/>
+          <a:p>
+            <a:r>
+              <a:rPr lang="it-IT" sz="1400" dirty="0"/>
+              <a:t>AN</a:t>
+            </a:r>
+          </a:p>
+        </p:txBody>
+      </p:sp>
+      <p:sp>
+        <p:nvSpPr>
+          <p:cNvPr id="17" name="Ovale 16">
+            <a:extLst>
+              <a:ext uri="{FF2B5EF4-FFF2-40B4-BE49-F238E27FC236}">
+                <a16:creationId xmlns:a16="http://schemas.microsoft.com/office/drawing/2014/main" id="{C32996DA-E17B-47F2-8C6D-2934D6ADE106}"/>
+              </a:ext>
+            </a:extLst>
+          </p:cNvPr>
+          <p:cNvSpPr/>
+          <p:nvPr/>
+        </p:nvSpPr>
+        <p:spPr>
+          <a:xfrm>
+            <a:off x="5941366" y="4711193"/>
+            <a:ext cx="1841785" cy="887437"/>
+          </a:xfrm>
+          <a:prstGeom prst="ellipse">
+            <a:avLst/>
+          </a:prstGeom>
+        </p:spPr>
+        <p:style>
+          <a:lnRef idx="2">
+            <a:schemeClr val="accent1">
+              <a:shade val="50000"/>
+            </a:schemeClr>
+          </a:lnRef>
+          <a:fillRef idx="1">
+            <a:schemeClr val="accent1"/>
+          </a:fillRef>
+          <a:effectRef idx="0">
+            <a:schemeClr val="accent1"/>
+          </a:effectRef>
+          <a:fontRef idx="minor">
+            <a:schemeClr val="lt1"/>
+          </a:fontRef>
+        </p:style>
+        <p:txBody>
+          <a:bodyPr rtlCol="0" anchor="ctr"/>
+          <a:lstStyle/>
+          <a:p>
+            <a:pPr algn="ctr"/>
+            <a:endParaRPr lang="it-IT" dirty="0"/>
+          </a:p>
+          <a:p>
+            <a:pPr algn="ctr"/>
+            <a:r>
+              <a:rPr lang="it-IT" dirty="0"/>
+              <a:t>Land on delivery station (12)</a:t>
+            </a:r>
+          </a:p>
+          <a:p>
+            <a:pPr algn="ctr"/>
+            <a:endParaRPr lang="it-IT" dirty="0"/>
+          </a:p>
+        </p:txBody>
+      </p:sp>
+      <p:cxnSp>
+        <p:nvCxnSpPr>
+          <p:cNvPr id="18" name="Connettore 2 17">
+            <a:extLst>
+              <a:ext uri="{FF2B5EF4-FFF2-40B4-BE49-F238E27FC236}">
+                <a16:creationId xmlns:a16="http://schemas.microsoft.com/office/drawing/2014/main" id="{B5577110-1E5F-4802-BCF7-D3B5892DFD1B}"/>
+              </a:ext>
+            </a:extLst>
+          </p:cNvPr>
+          <p:cNvCxnSpPr>
+            <a:cxnSpLocks/>
+            <a:stCxn id="9" idx="6"/>
+            <a:endCxn id="17" idx="2"/>
+          </p:cNvCxnSpPr>
+          <p:nvPr/>
+        </p:nvCxnSpPr>
+        <p:spPr>
+          <a:xfrm flipV="1">
+            <a:off x="4348522" y="5154912"/>
+            <a:ext cx="1592844" cy="12301"/>
+          </a:xfrm>
+          <a:prstGeom prst="straightConnector1">
+            <a:avLst/>
+          </a:prstGeom>
+          <a:ln>
+            <a:tailEnd type="triangle"/>
+          </a:ln>
+        </p:spPr>
+        <p:style>
+          <a:lnRef idx="1">
+            <a:schemeClr val="accent1"/>
+          </a:lnRef>
+          <a:fillRef idx="0">
+            <a:schemeClr val="accent1"/>
+          </a:fillRef>
+          <a:effectRef idx="0">
+            <a:schemeClr val="accent1"/>
+          </a:effectRef>
+          <a:fontRef idx="minor">
+            <a:schemeClr val="tx1"/>
+          </a:fontRef>
+        </p:style>
+      </p:cxnSp>
+      <p:sp>
+        <p:nvSpPr>
+          <p:cNvPr id="22" name="CasellaDiTesto 21">
+            <a:extLst>
+              <a:ext uri="{FF2B5EF4-FFF2-40B4-BE49-F238E27FC236}">
+                <a16:creationId xmlns:a16="http://schemas.microsoft.com/office/drawing/2014/main" id="{5964CCEA-78E0-4888-8AB7-DE64D8990244}"/>
+              </a:ext>
+            </a:extLst>
+          </p:cNvPr>
+          <p:cNvSpPr txBox="1"/>
+          <p:nvPr/>
+        </p:nvSpPr>
+        <p:spPr>
+          <a:xfrm>
+            <a:off x="4785119" y="4923757"/>
+            <a:ext cx="977388" cy="307777"/>
+          </a:xfrm>
+          <a:prstGeom prst="rect">
+            <a:avLst/>
+          </a:prstGeom>
+          <a:noFill/>
+        </p:spPr>
+        <p:txBody>
+          <a:bodyPr wrap="square" rtlCol="0">
+            <a:spAutoFit/>
+          </a:bodyPr>
+          <a:lstStyle/>
+          <a:p>
+            <a:r>
+              <a:rPr lang="it-IT" sz="1400" dirty="0"/>
+              <a:t> S &amp; 16 </a:t>
+            </a:r>
+          </a:p>
+        </p:txBody>
+      </p:sp>
+      <p:cxnSp>
+        <p:nvCxnSpPr>
+          <p:cNvPr id="23" name="Connettore a gomito 22">
+            <a:extLst>
+              <a:ext uri="{FF2B5EF4-FFF2-40B4-BE49-F238E27FC236}">
+                <a16:creationId xmlns:a16="http://schemas.microsoft.com/office/drawing/2014/main" id="{27CBBC2E-F714-4987-8650-7D3E7C764D2A}"/>
+              </a:ext>
+            </a:extLst>
+          </p:cNvPr>
+          <p:cNvCxnSpPr>
+            <a:cxnSpLocks/>
+            <a:stCxn id="9" idx="3"/>
+            <a:endCxn id="9" idx="4"/>
+          </p:cNvCxnSpPr>
+          <p:nvPr/>
+        </p:nvCxnSpPr>
+        <p:spPr>
+          <a:xfrm rot="16200000" flipH="1">
+            <a:off x="3102110" y="5237355"/>
+            <a:ext cx="129962" cy="617189"/>
+          </a:xfrm>
+          <a:prstGeom prst="bentConnector3">
+            <a:avLst>
+              <a:gd name="adj1" fmla="val 275898"/>
+            </a:avLst>
+          </a:prstGeom>
+          <a:ln>
+            <a:tailEnd type="triangle"/>
+          </a:ln>
+        </p:spPr>
+        <p:style>
+          <a:lnRef idx="1">
+            <a:schemeClr val="accent1"/>
+          </a:lnRef>
+          <a:fillRef idx="0">
+            <a:schemeClr val="accent1"/>
+          </a:fillRef>
+          <a:effectRef idx="0">
+            <a:schemeClr val="accent1"/>
+          </a:effectRef>
+          <a:fontRef idx="minor">
+            <a:schemeClr val="tx1"/>
+          </a:fontRef>
+        </p:style>
+      </p:cxnSp>
+      <p:sp>
+        <p:nvSpPr>
+          <p:cNvPr id="26" name="CasellaDiTesto 25">
+            <a:extLst>
+              <a:ext uri="{FF2B5EF4-FFF2-40B4-BE49-F238E27FC236}">
+                <a16:creationId xmlns:a16="http://schemas.microsoft.com/office/drawing/2014/main" id="{FCAC2CF0-A239-4D44-BC6F-ECEC056F87E0}"/>
+              </a:ext>
+            </a:extLst>
+          </p:cNvPr>
+          <p:cNvSpPr txBox="1"/>
+          <p:nvPr/>
+        </p:nvSpPr>
+        <p:spPr>
+          <a:xfrm>
+            <a:off x="2832379" y="5592449"/>
+            <a:ext cx="977388" cy="307777"/>
+          </a:xfrm>
+          <a:prstGeom prst="rect">
+            <a:avLst/>
+          </a:prstGeom>
+          <a:noFill/>
+        </p:spPr>
+        <p:txBody>
+          <a:bodyPr wrap="square" rtlCol="0">
+            <a:spAutoFit/>
+          </a:bodyPr>
+          <a:lstStyle/>
+          <a:p>
+            <a:r>
+              <a:rPr lang="it-IT" sz="1400" dirty="0"/>
+              <a:t>!S</a:t>
+            </a:r>
+          </a:p>
+        </p:txBody>
+      </p:sp>
+      <p:sp>
+        <p:nvSpPr>
+          <p:cNvPr id="27" name="CasellaDiTesto 26">
+            <a:extLst>
+              <a:ext uri="{FF2B5EF4-FFF2-40B4-BE49-F238E27FC236}">
+                <a16:creationId xmlns:a16="http://schemas.microsoft.com/office/drawing/2014/main" id="{4C95AB4F-446E-46A1-842F-30EFFAD9897C}"/>
+              </a:ext>
+            </a:extLst>
+          </p:cNvPr>
+          <p:cNvSpPr txBox="1"/>
+          <p:nvPr/>
+        </p:nvSpPr>
+        <p:spPr>
+          <a:xfrm>
+            <a:off x="6989664" y="5567768"/>
+            <a:ext cx="1408672" cy="307777"/>
+          </a:xfrm>
+          <a:prstGeom prst="rect">
+            <a:avLst/>
+          </a:prstGeom>
+          <a:noFill/>
+        </p:spPr>
+        <p:txBody>
+          <a:bodyPr wrap="square" rtlCol="0">
+            <a:spAutoFit/>
+          </a:bodyPr>
+          <a:lstStyle/>
+          <a:p>
+            <a:r>
+              <a:rPr lang="it-IT" sz="1400" dirty="0"/>
+              <a:t>!AE</a:t>
+            </a:r>
+          </a:p>
+        </p:txBody>
+      </p:sp>
+      <p:cxnSp>
+        <p:nvCxnSpPr>
+          <p:cNvPr id="28" name="Connettore a gomito 27">
+            <a:extLst>
+              <a:ext uri="{FF2B5EF4-FFF2-40B4-BE49-F238E27FC236}">
+                <a16:creationId xmlns:a16="http://schemas.microsoft.com/office/drawing/2014/main" id="{ED44CCD6-1226-4695-A1F5-8B1F4EC43FF5}"/>
+              </a:ext>
+            </a:extLst>
+          </p:cNvPr>
+          <p:cNvCxnSpPr>
+            <a:cxnSpLocks/>
+            <a:stCxn id="17" idx="4"/>
+            <a:endCxn id="17" idx="5"/>
+          </p:cNvCxnSpPr>
+          <p:nvPr/>
+        </p:nvCxnSpPr>
+        <p:spPr>
+          <a:xfrm rot="5400000" flipH="1" flipV="1">
+            <a:off x="7122862" y="5208064"/>
+            <a:ext cx="129962" cy="651169"/>
+          </a:xfrm>
+          <a:prstGeom prst="bentConnector3">
+            <a:avLst>
+              <a:gd name="adj1" fmla="val -175898"/>
+            </a:avLst>
+          </a:prstGeom>
+          <a:ln>
+            <a:tailEnd type="triangle"/>
+          </a:ln>
+        </p:spPr>
+        <p:style>
+          <a:lnRef idx="1">
+            <a:schemeClr val="accent1"/>
+          </a:lnRef>
+          <a:fillRef idx="0">
+            <a:schemeClr val="accent1"/>
+          </a:fillRef>
+          <a:effectRef idx="0">
+            <a:schemeClr val="accent1"/>
+          </a:effectRef>
+          <a:fontRef idx="minor">
+            <a:schemeClr val="tx1"/>
+          </a:fontRef>
+        </p:style>
+      </p:cxnSp>
+      <p:sp>
+        <p:nvSpPr>
+          <p:cNvPr id="29" name="Ovale 28">
+            <a:extLst>
+              <a:ext uri="{FF2B5EF4-FFF2-40B4-BE49-F238E27FC236}">
+                <a16:creationId xmlns:a16="http://schemas.microsoft.com/office/drawing/2014/main" id="{9C1D413F-A61A-4245-9798-AFF357187313}"/>
+              </a:ext>
+            </a:extLst>
+          </p:cNvPr>
+          <p:cNvSpPr/>
+          <p:nvPr/>
+        </p:nvSpPr>
+        <p:spPr>
+          <a:xfrm>
+            <a:off x="8284220" y="3737695"/>
+            <a:ext cx="1841785" cy="887437"/>
+          </a:xfrm>
+          <a:prstGeom prst="ellipse">
+            <a:avLst/>
+          </a:prstGeom>
+        </p:spPr>
+        <p:style>
+          <a:lnRef idx="2">
+            <a:schemeClr val="accent1">
+              <a:shade val="50000"/>
+            </a:schemeClr>
+          </a:lnRef>
+          <a:fillRef idx="1">
+            <a:schemeClr val="accent1"/>
+          </a:fillRef>
+          <a:effectRef idx="0">
+            <a:schemeClr val="accent1"/>
+          </a:effectRef>
+          <a:fontRef idx="minor">
+            <a:schemeClr val="lt1"/>
+          </a:fontRef>
+        </p:style>
+        <p:txBody>
+          <a:bodyPr rtlCol="0" anchor="ctr"/>
+          <a:lstStyle/>
+          <a:p>
+            <a:pPr algn="ctr"/>
+            <a:endParaRPr lang="it-IT" dirty="0"/>
+          </a:p>
+          <a:p>
+            <a:pPr algn="ctr"/>
+            <a:r>
+              <a:rPr lang="it-IT" dirty="0"/>
+              <a:t>Detach box(13)</a:t>
+            </a:r>
+          </a:p>
+          <a:p>
+            <a:pPr algn="ctr"/>
+            <a:endParaRPr lang="it-IT" dirty="0"/>
+          </a:p>
+        </p:txBody>
+      </p:sp>
+      <p:sp>
+        <p:nvSpPr>
+          <p:cNvPr id="30" name="CasellaDiTesto 29">
+            <a:extLst>
+              <a:ext uri="{FF2B5EF4-FFF2-40B4-BE49-F238E27FC236}">
+                <a16:creationId xmlns:a16="http://schemas.microsoft.com/office/drawing/2014/main" id="{91D223F5-437E-44C2-892F-617AD6757DD3}"/>
+              </a:ext>
+            </a:extLst>
+          </p:cNvPr>
+          <p:cNvSpPr txBox="1"/>
+          <p:nvPr/>
+        </p:nvSpPr>
+        <p:spPr>
+          <a:xfrm>
+            <a:off x="8350492" y="4859436"/>
+            <a:ext cx="1408672" cy="307777"/>
+          </a:xfrm>
+          <a:prstGeom prst="rect">
+            <a:avLst/>
+          </a:prstGeom>
+          <a:noFill/>
+        </p:spPr>
+        <p:txBody>
+          <a:bodyPr wrap="square" rtlCol="0">
+            <a:spAutoFit/>
+          </a:bodyPr>
+          <a:lstStyle/>
+          <a:p>
+            <a:r>
+              <a:rPr lang="it-IT" sz="1400" dirty="0"/>
+              <a:t>AE</a:t>
+            </a:r>
+          </a:p>
+        </p:txBody>
+      </p:sp>
+      <p:cxnSp>
+        <p:nvCxnSpPr>
+          <p:cNvPr id="32" name="Connettore 2 31">
+            <a:extLst>
+              <a:ext uri="{FF2B5EF4-FFF2-40B4-BE49-F238E27FC236}">
+                <a16:creationId xmlns:a16="http://schemas.microsoft.com/office/drawing/2014/main" id="{5D8081D6-F29B-43C6-B2AE-48F319F2983C}"/>
+              </a:ext>
+            </a:extLst>
+          </p:cNvPr>
+          <p:cNvCxnSpPr>
+            <a:cxnSpLocks/>
+            <a:stCxn id="17" idx="6"/>
+            <a:endCxn id="29" idx="4"/>
+          </p:cNvCxnSpPr>
+          <p:nvPr/>
+        </p:nvCxnSpPr>
+        <p:spPr>
+          <a:xfrm flipV="1">
+            <a:off x="7783151" y="4625132"/>
+            <a:ext cx="1421962" cy="529780"/>
+          </a:xfrm>
+          <a:prstGeom prst="straightConnector1">
+            <a:avLst/>
+          </a:prstGeom>
+          <a:ln>
+            <a:tailEnd type="triangle"/>
+          </a:ln>
+        </p:spPr>
+        <p:style>
+          <a:lnRef idx="1">
+            <a:schemeClr val="accent1"/>
+          </a:lnRef>
+          <a:fillRef idx="0">
+            <a:schemeClr val="accent1"/>
+          </a:fillRef>
+          <a:effectRef idx="0">
+            <a:schemeClr val="accent1"/>
+          </a:effectRef>
+          <a:fontRef idx="minor">
+            <a:schemeClr val="tx1"/>
+          </a:fontRef>
+        </p:style>
+      </p:cxnSp>
+      <p:cxnSp>
+        <p:nvCxnSpPr>
+          <p:cNvPr id="34" name="Connettore a gomito 33">
+            <a:extLst>
+              <a:ext uri="{FF2B5EF4-FFF2-40B4-BE49-F238E27FC236}">
+                <a16:creationId xmlns:a16="http://schemas.microsoft.com/office/drawing/2014/main" id="{BD29380B-C162-49C2-8309-065F560C912B}"/>
+              </a:ext>
+            </a:extLst>
+          </p:cNvPr>
+          <p:cNvCxnSpPr>
+            <a:stCxn id="29" idx="5"/>
+            <a:endCxn id="29" idx="6"/>
+          </p:cNvCxnSpPr>
+          <p:nvPr/>
+        </p:nvCxnSpPr>
+        <p:spPr>
+          <a:xfrm rot="5400000" flipH="1" flipV="1">
+            <a:off x="9834265" y="4203430"/>
+            <a:ext cx="313756" cy="269723"/>
+          </a:xfrm>
+          <a:prstGeom prst="bentConnector4">
+            <a:avLst>
+              <a:gd name="adj1" fmla="val -114281"/>
+              <a:gd name="adj2" fmla="val 184754"/>
+            </a:avLst>
+          </a:prstGeom>
+          <a:ln>
+            <a:tailEnd type="triangle"/>
+          </a:ln>
+        </p:spPr>
+        <p:style>
+          <a:lnRef idx="1">
+            <a:schemeClr val="accent1"/>
+          </a:lnRef>
+          <a:fillRef idx="0">
+            <a:schemeClr val="accent1"/>
+          </a:fillRef>
+          <a:effectRef idx="0">
+            <a:schemeClr val="accent1"/>
+          </a:effectRef>
+          <a:fontRef idx="minor">
+            <a:schemeClr val="tx1"/>
+          </a:fontRef>
+        </p:style>
+      </p:cxnSp>
+      <p:sp>
+        <p:nvSpPr>
+          <p:cNvPr id="35" name="CasellaDiTesto 34">
+            <a:extLst>
+              <a:ext uri="{FF2B5EF4-FFF2-40B4-BE49-F238E27FC236}">
+                <a16:creationId xmlns:a16="http://schemas.microsoft.com/office/drawing/2014/main" id="{C1A43007-04BE-4222-9223-890359D71D57}"/>
+              </a:ext>
+            </a:extLst>
+          </p:cNvPr>
+          <p:cNvSpPr txBox="1"/>
+          <p:nvPr/>
+        </p:nvSpPr>
+        <p:spPr>
+          <a:xfrm>
+            <a:off x="9856281" y="4572468"/>
+            <a:ext cx="1408672" cy="307777"/>
+          </a:xfrm>
+          <a:prstGeom prst="rect">
+            <a:avLst/>
+          </a:prstGeom>
+          <a:noFill/>
+        </p:spPr>
+        <p:txBody>
+          <a:bodyPr wrap="square" rtlCol="0">
+            <a:spAutoFit/>
+          </a:bodyPr>
+          <a:lstStyle/>
+          <a:p>
+            <a:r>
+              <a:rPr lang="it-IT" sz="1400" dirty="0"/>
+              <a:t>MA</a:t>
+            </a:r>
+          </a:p>
+        </p:txBody>
+      </p:sp>
+      <p:cxnSp>
+        <p:nvCxnSpPr>
+          <p:cNvPr id="37" name="Connettore 2 36">
+            <a:extLst>
+              <a:ext uri="{FF2B5EF4-FFF2-40B4-BE49-F238E27FC236}">
+                <a16:creationId xmlns:a16="http://schemas.microsoft.com/office/drawing/2014/main" id="{5AF3A091-3486-4EBA-84CB-073F165EED20}"/>
+              </a:ext>
+            </a:extLst>
+          </p:cNvPr>
+          <p:cNvCxnSpPr>
+            <a:cxnSpLocks/>
+            <a:stCxn id="29" idx="1"/>
+            <a:endCxn id="5" idx="6"/>
+          </p:cNvCxnSpPr>
+          <p:nvPr/>
+        </p:nvCxnSpPr>
+        <p:spPr>
+          <a:xfrm flipH="1" flipV="1">
+            <a:off x="7199567" y="3240035"/>
+            <a:ext cx="1354376" cy="627622"/>
+          </a:xfrm>
+          <a:prstGeom prst="straightConnector1">
+            <a:avLst/>
+          </a:prstGeom>
+          <a:ln>
+            <a:tailEnd type="triangle"/>
+          </a:ln>
+        </p:spPr>
+        <p:style>
+          <a:lnRef idx="1">
+            <a:schemeClr val="accent1"/>
+          </a:lnRef>
+          <a:fillRef idx="0">
+            <a:schemeClr val="accent1"/>
+          </a:fillRef>
+          <a:effectRef idx="0">
+            <a:schemeClr val="accent1"/>
+          </a:effectRef>
+          <a:fontRef idx="minor">
+            <a:schemeClr val="tx1"/>
+          </a:fontRef>
+        </p:style>
+      </p:cxnSp>
+      <p:sp>
+        <p:nvSpPr>
+          <p:cNvPr id="42" name="CasellaDiTesto 41">
+            <a:extLst>
+              <a:ext uri="{FF2B5EF4-FFF2-40B4-BE49-F238E27FC236}">
+                <a16:creationId xmlns:a16="http://schemas.microsoft.com/office/drawing/2014/main" id="{BDF5476B-9B84-47BB-B7CE-03BEE63A1BDC}"/>
+              </a:ext>
+            </a:extLst>
+          </p:cNvPr>
+          <p:cNvSpPr txBox="1"/>
+          <p:nvPr/>
+        </p:nvSpPr>
+        <p:spPr>
+          <a:xfrm rot="1363642">
+            <a:off x="7579885" y="3491986"/>
+            <a:ext cx="1408672" cy="307777"/>
+          </a:xfrm>
+          <a:prstGeom prst="rect">
+            <a:avLst/>
+          </a:prstGeom>
+          <a:noFill/>
+        </p:spPr>
+        <p:txBody>
+          <a:bodyPr wrap="square" rtlCol="0">
+            <a:spAutoFit/>
+          </a:bodyPr>
+          <a:lstStyle/>
+          <a:p>
+            <a:r>
+              <a:rPr lang="it-IT" sz="1400" dirty="0"/>
+              <a:t>!MA &amp; AN</a:t>
+            </a:r>
+          </a:p>
+        </p:txBody>
+      </p:sp>
+      <p:cxnSp>
+        <p:nvCxnSpPr>
+          <p:cNvPr id="45" name="Connettore a gomito 44">
+            <a:extLst>
+              <a:ext uri="{FF2B5EF4-FFF2-40B4-BE49-F238E27FC236}">
+                <a16:creationId xmlns:a16="http://schemas.microsoft.com/office/drawing/2014/main" id="{8A4ED4D5-713F-4149-A2BF-0A40C73E9CC3}"/>
+              </a:ext>
+            </a:extLst>
+          </p:cNvPr>
+          <p:cNvCxnSpPr>
+            <a:stCxn id="5" idx="4"/>
+            <a:endCxn id="5" idx="3"/>
+          </p:cNvCxnSpPr>
+          <p:nvPr/>
+        </p:nvCxnSpPr>
+        <p:spPr>
+          <a:xfrm rot="5400000" flipH="1">
+            <a:off x="5711463" y="3344148"/>
+            <a:ext cx="161853" cy="735120"/>
+          </a:xfrm>
+          <a:prstGeom prst="bentConnector3">
+            <a:avLst>
+              <a:gd name="adj1" fmla="val -141239"/>
+            </a:avLst>
+          </a:prstGeom>
+          <a:ln>
+            <a:tailEnd type="triangle"/>
+          </a:ln>
+        </p:spPr>
+        <p:style>
+          <a:lnRef idx="1">
+            <a:schemeClr val="accent1"/>
+          </a:lnRef>
+          <a:fillRef idx="0">
+            <a:schemeClr val="accent1"/>
+          </a:fillRef>
+          <a:effectRef idx="0">
+            <a:schemeClr val="accent1"/>
+          </a:effectRef>
+          <a:fontRef idx="minor">
+            <a:schemeClr val="tx1"/>
+          </a:fontRef>
+        </p:style>
+      </p:cxnSp>
+      <p:sp>
+        <p:nvSpPr>
+          <p:cNvPr id="46" name="CasellaDiTesto 45">
+            <a:extLst>
+              <a:ext uri="{FF2B5EF4-FFF2-40B4-BE49-F238E27FC236}">
+                <a16:creationId xmlns:a16="http://schemas.microsoft.com/office/drawing/2014/main" id="{5D0057C7-3B26-4ED4-AAAC-AA087C863309}"/>
+              </a:ext>
+            </a:extLst>
+          </p:cNvPr>
+          <p:cNvSpPr txBox="1"/>
+          <p:nvPr/>
+        </p:nvSpPr>
+        <p:spPr>
+          <a:xfrm>
+            <a:off x="5517712" y="3792635"/>
+            <a:ext cx="1408672" cy="307777"/>
+          </a:xfrm>
+          <a:prstGeom prst="rect">
+            <a:avLst/>
+          </a:prstGeom>
+          <a:noFill/>
+        </p:spPr>
+        <p:txBody>
+          <a:bodyPr wrap="square" rtlCol="0">
+            <a:spAutoFit/>
+          </a:bodyPr>
+          <a:lstStyle/>
+          <a:p>
+            <a:r>
+              <a:rPr lang="it-IT" sz="1400" dirty="0"/>
+              <a:t>!SA</a:t>
+            </a:r>
+          </a:p>
+        </p:txBody>
+      </p:sp>
+      <p:cxnSp>
+        <p:nvCxnSpPr>
+          <p:cNvPr id="48" name="Connettore 2 47">
+            <a:extLst>
+              <a:ext uri="{FF2B5EF4-FFF2-40B4-BE49-F238E27FC236}">
+                <a16:creationId xmlns:a16="http://schemas.microsoft.com/office/drawing/2014/main" id="{9DA764DD-CDBD-426C-821A-80704FDCEA49}"/>
+              </a:ext>
+            </a:extLst>
+          </p:cNvPr>
+          <p:cNvCxnSpPr>
+            <a:cxnSpLocks/>
+            <a:stCxn id="5" idx="0"/>
+            <a:endCxn id="4" idx="3"/>
+          </p:cNvCxnSpPr>
+          <p:nvPr/>
+        </p:nvCxnSpPr>
+        <p:spPr>
+          <a:xfrm flipV="1">
+            <a:off x="6159950" y="1731248"/>
+            <a:ext cx="798930" cy="956187"/>
+          </a:xfrm>
+          <a:prstGeom prst="straightConnector1">
+            <a:avLst/>
+          </a:prstGeom>
+          <a:ln>
+            <a:tailEnd type="triangle"/>
+          </a:ln>
+        </p:spPr>
+        <p:style>
+          <a:lnRef idx="1">
+            <a:schemeClr val="accent1"/>
+          </a:lnRef>
+          <a:fillRef idx="0">
+            <a:schemeClr val="accent1"/>
+          </a:fillRef>
+          <a:effectRef idx="0">
+            <a:schemeClr val="accent1"/>
+          </a:effectRef>
+          <a:fontRef idx="minor">
+            <a:schemeClr val="tx1"/>
+          </a:fontRef>
+        </p:style>
+      </p:cxnSp>
+      <p:sp>
+        <p:nvSpPr>
+          <p:cNvPr id="69" name="CasellaDiTesto 68">
+            <a:extLst>
+              <a:ext uri="{FF2B5EF4-FFF2-40B4-BE49-F238E27FC236}">
+                <a16:creationId xmlns:a16="http://schemas.microsoft.com/office/drawing/2014/main" id="{9D51A5C9-6AC6-4F8C-8545-E5690A0048EF}"/>
+              </a:ext>
+            </a:extLst>
+          </p:cNvPr>
+          <p:cNvSpPr txBox="1"/>
+          <p:nvPr/>
+        </p:nvSpPr>
+        <p:spPr>
+          <a:xfrm>
+            <a:off x="6075220" y="2055453"/>
+            <a:ext cx="1408672" cy="307777"/>
+          </a:xfrm>
+          <a:prstGeom prst="rect">
+            <a:avLst/>
+          </a:prstGeom>
+          <a:noFill/>
+        </p:spPr>
+        <p:txBody>
+          <a:bodyPr wrap="square" rtlCol="0">
+            <a:spAutoFit/>
+          </a:bodyPr>
+          <a:lstStyle/>
+          <a:p>
+            <a:r>
+              <a:rPr lang="it-IT" sz="1400" dirty="0"/>
+              <a:t>SA</a:t>
+            </a:r>
+          </a:p>
+        </p:txBody>
+      </p:sp>
+    </p:spTree>
+    <p:extLst>
+      <p:ext uri="{BB962C8B-B14F-4D97-AF65-F5344CB8AC3E}">
+        <p14:creationId xmlns:p14="http://schemas.microsoft.com/office/powerpoint/2010/main" val="1003280993"/>
+      </p:ext>
+    </p:extLst>
+  </p:cSld>
+  <p:clrMapOvr>
+    <a:masterClrMapping/>
+  </p:clrMapOvr>
+</p:sld>
+</file>
+
+<file path=ppt/slides/slide5.xml><?xml version="1.0" encoding="utf-8"?>
+<p:sld xmlns:a="http://schemas.openxmlformats.org/drawingml/2006/main" xmlns:r="http://schemas.openxmlformats.org/officeDocument/2006/relationships" xmlns:p="http://schemas.openxmlformats.org/presentationml/2006/main">
+  <p:cSld>
+    <p:spTree>
+      <p:nvGrpSpPr>
+        <p:cNvPr id="1" name=""/>
+        <p:cNvGrpSpPr/>
+        <p:nvPr/>
+      </p:nvGrpSpPr>
+      <p:grpSpPr>
+        <a:xfrm>
+          <a:off x="0" y="0"/>
+          <a:ext cx="0" cy="0"/>
+          <a:chOff x="0" y="0"/>
+          <a:chExt cx="0" cy="0"/>
+        </a:xfrm>
+      </p:grpSpPr>
+      <p:sp>
+        <p:nvSpPr>
+          <p:cNvPr id="2" name="CasellaDiTesto 1">
+            <a:extLst>
+              <a:ext uri="{FF2B5EF4-FFF2-40B4-BE49-F238E27FC236}">
+                <a16:creationId xmlns:a16="http://schemas.microsoft.com/office/drawing/2014/main" id="{D0E072EF-58F8-41F8-AAA5-52E53F1FA688}"/>
+              </a:ext>
+            </a:extLst>
+          </p:cNvPr>
+          <p:cNvSpPr txBox="1"/>
+          <p:nvPr/>
+        </p:nvSpPr>
+        <p:spPr>
+          <a:xfrm>
+            <a:off x="3726789" y="-19726"/>
+            <a:ext cx="4260715" cy="369332"/>
+          </a:xfrm>
+          <a:prstGeom prst="rect">
+            <a:avLst/>
+          </a:prstGeom>
+          <a:noFill/>
+        </p:spPr>
+        <p:txBody>
+          <a:bodyPr wrap="square" rtlCol="0">
+            <a:spAutoFit/>
+          </a:bodyPr>
+          <a:lstStyle/>
+          <a:p>
+            <a:r>
+              <a:rPr lang="it-IT" dirty="0"/>
+              <a:t>Diagramma a stati: «Contesa Ordini»</a:t>
+            </a:r>
+          </a:p>
+        </p:txBody>
+      </p:sp>
+      <p:sp>
+        <p:nvSpPr>
+          <p:cNvPr id="3" name="Ovale 2">
+            <a:extLst>
+              <a:ext uri="{FF2B5EF4-FFF2-40B4-BE49-F238E27FC236}">
+                <a16:creationId xmlns:a16="http://schemas.microsoft.com/office/drawing/2014/main" id="{54B9BDFB-5ADF-49B2-B77B-8BA8C60EF0BC}"/>
+              </a:ext>
+            </a:extLst>
+          </p:cNvPr>
+          <p:cNvSpPr/>
+          <p:nvPr/>
+        </p:nvSpPr>
+        <p:spPr>
+          <a:xfrm>
+            <a:off x="1907335" y="2092361"/>
+            <a:ext cx="2079234" cy="1105199"/>
+          </a:xfrm>
+          <a:prstGeom prst="ellipse">
+            <a:avLst/>
+          </a:prstGeom>
+          <a:solidFill>
+            <a:schemeClr val="tx1">
+              <a:lumMod val="95000"/>
+              <a:lumOff val="5000"/>
+            </a:schemeClr>
+          </a:solidFill>
+        </p:spPr>
+        <p:style>
+          <a:lnRef idx="2">
+            <a:schemeClr val="accent1">
+              <a:shade val="50000"/>
+            </a:schemeClr>
+          </a:lnRef>
+          <a:fillRef idx="1">
+            <a:schemeClr val="accent1"/>
+          </a:fillRef>
+          <a:effectRef idx="0">
+            <a:schemeClr val="accent1"/>
+          </a:effectRef>
+          <a:fontRef idx="minor">
+            <a:schemeClr val="lt1"/>
+          </a:fontRef>
+        </p:style>
+        <p:txBody>
+          <a:bodyPr rtlCol="0" anchor="ctr"/>
+          <a:lstStyle/>
+          <a:p>
+            <a:pPr algn="ctr"/>
+            <a:endParaRPr lang="it-IT" dirty="0"/>
+          </a:p>
+          <a:p>
+            <a:pPr algn="ctr"/>
+            <a:r>
+              <a:rPr lang="it-IT" dirty="0"/>
+              <a:t>Updating orders </a:t>
+            </a:r>
+          </a:p>
+          <a:p>
+            <a:pPr algn="ctr"/>
+            <a:endParaRPr lang="it-IT" dirty="0"/>
+          </a:p>
+        </p:txBody>
+      </p:sp>
+    </p:spTree>
+    <p:extLst>
+      <p:ext uri="{BB962C8B-B14F-4D97-AF65-F5344CB8AC3E}">
+        <p14:creationId xmlns:p14="http://schemas.microsoft.com/office/powerpoint/2010/main" val="3795300798"/>
       </p:ext>
     </p:extLst>
   </p:cSld>

</xml_diff>

<commit_message>
Diagramma  a stati modificato
</commit_message>
<xml_diff>
--- a/docs/diagram.pptx
+++ b/docs/diagram.pptx
@@ -261,7 +261,7 @@
           <a:p>
             <a:fld id="{C3B0D377-F0C3-DB42-9866-B6F08E6D4957}" type="datetimeFigureOut">
               <a:rPr lang="it-IT" smtClean="0"/>
-              <a:t>07/02/2022</a:t>
+              <a:t>08/02/2022</a:t>
             </a:fld>
             <a:endParaRPr lang="it-IT"/>
           </a:p>
@@ -459,7 +459,7 @@
           <a:p>
             <a:fld id="{C3B0D377-F0C3-DB42-9866-B6F08E6D4957}" type="datetimeFigureOut">
               <a:rPr lang="it-IT" smtClean="0"/>
-              <a:t>07/02/2022</a:t>
+              <a:t>08/02/2022</a:t>
             </a:fld>
             <a:endParaRPr lang="it-IT"/>
           </a:p>
@@ -667,7 +667,7 @@
           <a:p>
             <a:fld id="{C3B0D377-F0C3-DB42-9866-B6F08E6D4957}" type="datetimeFigureOut">
               <a:rPr lang="it-IT" smtClean="0"/>
-              <a:t>07/02/2022</a:t>
+              <a:t>08/02/2022</a:t>
             </a:fld>
             <a:endParaRPr lang="it-IT"/>
           </a:p>
@@ -865,7 +865,7 @@
           <a:p>
             <a:fld id="{C3B0D377-F0C3-DB42-9866-B6F08E6D4957}" type="datetimeFigureOut">
               <a:rPr lang="it-IT" smtClean="0"/>
-              <a:t>07/02/2022</a:t>
+              <a:t>08/02/2022</a:t>
             </a:fld>
             <a:endParaRPr lang="it-IT"/>
           </a:p>
@@ -1140,7 +1140,7 @@
           <a:p>
             <a:fld id="{C3B0D377-F0C3-DB42-9866-B6F08E6D4957}" type="datetimeFigureOut">
               <a:rPr lang="it-IT" smtClean="0"/>
-              <a:t>07/02/2022</a:t>
+              <a:t>08/02/2022</a:t>
             </a:fld>
             <a:endParaRPr lang="it-IT"/>
           </a:p>
@@ -1405,7 +1405,7 @@
           <a:p>
             <a:fld id="{C3B0D377-F0C3-DB42-9866-B6F08E6D4957}" type="datetimeFigureOut">
               <a:rPr lang="it-IT" smtClean="0"/>
-              <a:t>07/02/2022</a:t>
+              <a:t>08/02/2022</a:t>
             </a:fld>
             <a:endParaRPr lang="it-IT"/>
           </a:p>
@@ -1817,7 +1817,7 @@
           <a:p>
             <a:fld id="{C3B0D377-F0C3-DB42-9866-B6F08E6D4957}" type="datetimeFigureOut">
               <a:rPr lang="it-IT" smtClean="0"/>
-              <a:t>07/02/2022</a:t>
+              <a:t>08/02/2022</a:t>
             </a:fld>
             <a:endParaRPr lang="it-IT"/>
           </a:p>
@@ -1958,7 +1958,7 @@
           <a:p>
             <a:fld id="{C3B0D377-F0C3-DB42-9866-B6F08E6D4957}" type="datetimeFigureOut">
               <a:rPr lang="it-IT" smtClean="0"/>
-              <a:t>07/02/2022</a:t>
+              <a:t>08/02/2022</a:t>
             </a:fld>
             <a:endParaRPr lang="it-IT"/>
           </a:p>
@@ -2071,7 +2071,7 @@
           <a:p>
             <a:fld id="{C3B0D377-F0C3-DB42-9866-B6F08E6D4957}" type="datetimeFigureOut">
               <a:rPr lang="it-IT" smtClean="0"/>
-              <a:t>07/02/2022</a:t>
+              <a:t>08/02/2022</a:t>
             </a:fld>
             <a:endParaRPr lang="it-IT"/>
           </a:p>
@@ -2382,7 +2382,7 @@
           <a:p>
             <a:fld id="{C3B0D377-F0C3-DB42-9866-B6F08E6D4957}" type="datetimeFigureOut">
               <a:rPr lang="it-IT" smtClean="0"/>
-              <a:t>07/02/2022</a:t>
+              <a:t>08/02/2022</a:t>
             </a:fld>
             <a:endParaRPr lang="it-IT"/>
           </a:p>
@@ -2670,7 +2670,7 @@
           <a:p>
             <a:fld id="{C3B0D377-F0C3-DB42-9866-B6F08E6D4957}" type="datetimeFigureOut">
               <a:rPr lang="it-IT" smtClean="0"/>
-              <a:t>07/02/2022</a:t>
+              <a:t>08/02/2022</a:t>
             </a:fld>
             <a:endParaRPr lang="it-IT"/>
           </a:p>
@@ -2911,7 +2911,7 @@
           <a:p>
             <a:fld id="{C3B0D377-F0C3-DB42-9866-B6F08E6D4957}" type="datetimeFigureOut">
               <a:rPr lang="it-IT" smtClean="0"/>
-              <a:t>07/02/2022</a:t>
+              <a:t>08/02/2022</a:t>
             </a:fld>
             <a:endParaRPr lang="it-IT"/>
           </a:p>
@@ -3378,7 +3378,7 @@
         <p:spPr>
           <a:xfrm>
             <a:off x="201038" y="389105"/>
-            <a:ext cx="11789924" cy="6524863"/>
+            <a:ext cx="11789924" cy="6601807"/>
           </a:xfrm>
           <a:prstGeom prst="rect">
             <a:avLst/>
@@ -3392,154 +3392,188 @@
           <a:lstStyle/>
           <a:p>
             <a:r>
-              <a:rPr lang="it-IT" sz="1600" dirty="0"/>
+              <a:rPr lang="it-IT" sz="1500" dirty="0"/>
               <a:t>TAC: in tutti gli altri casi</a:t>
             </a:r>
           </a:p>
           <a:p>
             <a:r>
-              <a:rPr lang="it-IT" sz="1600" dirty="0"/>
+              <a:rPr lang="it-IT" sz="1500" dirty="0"/>
               <a:t>O: presente un nuovo ordine da effettuare</a:t>
             </a:r>
           </a:p>
           <a:p>
             <a:r>
-              <a:rPr lang="it-IT" sz="1600" dirty="0"/>
+              <a:rPr lang="it-IT" sz="1500" dirty="0"/>
               <a:t>CB: batteria carica</a:t>
             </a:r>
           </a:p>
           <a:p>
             <a:r>
-              <a:rPr lang="it-IT" sz="1600" dirty="0"/>
+              <a:rPr lang="it-IT" sz="1500" dirty="0"/>
               <a:t>QR: quota raggiunta</a:t>
             </a:r>
           </a:p>
           <a:p>
             <a:r>
-              <a:rPr lang="it-IT" sz="1600" dirty="0"/>
+              <a:rPr lang="it-IT" sz="1500" dirty="0"/>
               <a:t>BR: base raggiunta</a:t>
             </a:r>
           </a:p>
           <a:p>
             <a:r>
-              <a:rPr lang="it-IT" sz="1600" dirty="0"/>
+              <a:rPr lang="it-IT" sz="1500" dirty="0"/>
               <a:t>S: stabilizzato</a:t>
             </a:r>
           </a:p>
           <a:p>
             <a:r>
-              <a:rPr lang="it-IT" sz="1600" dirty="0"/>
+              <a:rPr lang="it-IT" sz="1500" dirty="0"/>
               <a:t>MA: magnete attivo(pacco preso)</a:t>
             </a:r>
           </a:p>
           <a:p>
             <a:r>
-              <a:rPr lang="it-IT" sz="1600" dirty="0"/>
+              <a:rPr lang="it-IT" sz="1500" dirty="0"/>
               <a:t>DR: destinazione raggiunta</a:t>
             </a:r>
           </a:p>
           <a:p>
             <a:r>
-              <a:rPr lang="it-IT" sz="1600" dirty="0"/>
+              <a:rPr lang="it-IT" sz="1500" dirty="0"/>
               <a:t>RO: ostacolo rilevato</a:t>
             </a:r>
           </a:p>
           <a:p>
             <a:r>
-              <a:rPr lang="it-IT" sz="1600" dirty="0"/>
+              <a:rPr lang="it-IT" sz="1500" dirty="0"/>
               <a:t>AE: atterraggio eseguito</a:t>
             </a:r>
           </a:p>
           <a:p>
             <a:r>
-              <a:rPr lang="it-IT" sz="1600" dirty="0"/>
+              <a:rPr lang="it-IT" sz="1500" dirty="0"/>
               <a:t>AN: anomalia rilevata</a:t>
             </a:r>
           </a:p>
           <a:p>
             <a:r>
-              <a:rPr lang="it-IT" sz="1600" dirty="0"/>
+              <a:rPr lang="it-IT" sz="1500" dirty="0"/>
               <a:t>PR: pacco raggiunto </a:t>
             </a:r>
           </a:p>
           <a:p>
             <a:r>
-              <a:rPr lang="it-IT" sz="1600" dirty="0"/>
+              <a:rPr lang="it-IT" sz="1500" dirty="0"/>
               <a:t>RR: stazione ricarica raggiunta</a:t>
             </a:r>
           </a:p>
           <a:p>
             <a:r>
-              <a:rPr lang="it-IT" sz="1600" dirty="0"/>
+              <a:rPr lang="it-IT" sz="1500" dirty="0"/>
               <a:t>SA: spostati avanti</a:t>
             </a:r>
           </a:p>
           <a:p>
             <a:r>
-              <a:rPr lang="it-IT" sz="1600" dirty="0"/>
+              <a:rPr lang="it-IT" sz="1500" dirty="0"/>
               <a:t>C9: contatore dello stato 9(serve per permanere un certo lasso di tempo nello stato)</a:t>
             </a:r>
           </a:p>
           <a:p>
             <a:r>
-              <a:rPr lang="it-IT" sz="1600" dirty="0"/>
+              <a:rPr lang="it-IT" sz="1500" dirty="0"/>
               <a:t>C8: contatore dello stato 8</a:t>
             </a:r>
           </a:p>
           <a:p>
             <a:r>
-              <a:rPr lang="it-IT" sz="1600" dirty="0"/>
+              <a:rPr lang="it-IT" sz="1500" dirty="0"/>
+              <a:t>C19: contatore dello stato 19</a:t>
+            </a:r>
+          </a:p>
+          <a:p>
+            <a:r>
+              <a:rPr lang="it-IT" sz="1500" dirty="0"/>
+              <a:t>-6: si proveniva da uno stato che proveniva dallo stato 6(vale per qualsiasi numero)</a:t>
+            </a:r>
+          </a:p>
+          <a:p>
+            <a:r>
+              <a:rPr lang="it-IT" sz="1500" dirty="0"/>
               <a:t>1: si proveniva dallo stato 1 (vale per qualsiasi numero)</a:t>
             </a:r>
           </a:p>
           <a:p>
             <a:r>
-              <a:rPr lang="it-IT" sz="1600" dirty="0"/>
+              <a:rPr lang="it-IT" sz="1500" dirty="0"/>
+              <a:t>!1 : non si proveniva dalla stato 1(vale per qualsiasi numero)</a:t>
+            </a:r>
+          </a:p>
+          <a:p>
+            <a:r>
+              <a:rPr lang="it-IT" sz="1500" dirty="0"/>
               <a:t>&amp;: operatore booleano «and»</a:t>
             </a:r>
           </a:p>
           <a:p>
             <a:r>
-              <a:rPr lang="it-IT" sz="1600" dirty="0"/>
+              <a:rPr lang="it-IT" sz="1500" dirty="0"/>
               <a:t>!: operatore booleano «not»</a:t>
             </a:r>
           </a:p>
           <a:p>
             <a:r>
-              <a:rPr lang="it-IT" sz="1600" dirty="0"/>
+              <a:rPr lang="it-IT" sz="1500" dirty="0"/>
               <a:t>or : operatore booleano «or»</a:t>
             </a:r>
           </a:p>
           <a:p>
-            <a:endParaRPr lang="it-IT" sz="1600" dirty="0"/>
-          </a:p>
-          <a:p>
-            <a:endParaRPr lang="it-IT" sz="1600" dirty="0"/>
-          </a:p>
-          <a:p>
-            <a:r>
-              <a:rPr lang="it-IT" sz="1600" dirty="0"/>
+            <a:r>
+              <a:rPr lang="it-IT" sz="1500" dirty="0"/>
+              <a:t>ta: tempo attesa</a:t>
+            </a:r>
+          </a:p>
+          <a:p>
+            <a:r>
+              <a:rPr lang="it-IT" sz="1500" b="1" dirty="0"/>
               <a:t>Esempio:</a:t>
             </a:r>
           </a:p>
           <a:p>
             <a:r>
-              <a:rPr lang="it-IT" sz="1600" dirty="0"/>
+              <a:rPr lang="it-IT" sz="1500" b="1" i="1" dirty="0"/>
               <a:t>O &amp; !CB &amp; !5   </a:t>
             </a:r>
             <a:r>
-              <a:rPr lang="it-IT" sz="1600" dirty="0">
+              <a:rPr lang="it-IT" sz="1500" dirty="0">
                 <a:sym typeface="Wingdings" panose="05000000000000000000" pitchFamily="2" charset="2"/>
               </a:rPr>
               <a:t></a:t>
             </a:r>
             <a:r>
-              <a:rPr lang="it-IT" sz="1600" dirty="0"/>
+              <a:rPr lang="it-IT" sz="1500" dirty="0"/>
               <a:t> è presente un nuovo ordine da effettuare, la batteria non è carica e non si proviene dallo stato 5, ovvero da go back home, in questo caso il drone deve andare allo stato recharge battery.</a:t>
             </a:r>
           </a:p>
           <a:p>
-            <a:endParaRPr lang="it-IT" dirty="0"/>
+            <a:r>
+              <a:rPr lang="it-IT" sz="1500" b="1" i="1" dirty="0"/>
+              <a:t>!RO &amp; -6 </a:t>
+            </a:r>
+            <a:r>
+              <a:rPr lang="it-IT" sz="1500" b="1" i="1" dirty="0">
+                <a:sym typeface="Wingdings" panose="05000000000000000000" pitchFamily="2" charset="2"/>
+              </a:rPr>
+              <a:t>  </a:t>
+            </a:r>
+            <a:r>
+              <a:rPr lang="it-IT" sz="1500" dirty="0">
+                <a:sym typeface="Wingdings" panose="05000000000000000000" pitchFamily="2" charset="2"/>
+              </a:rPr>
+              <a:t>non si è rilevato nessun ostacolo e si proveniva dallo stato avoid obstacles che a sua volta proveniva dallo stato 6</a:t>
+            </a:r>
+            <a:endParaRPr lang="it-IT" sz="1500" b="1" i="1" dirty="0"/>
           </a:p>
         </p:txBody>
       </p:sp>
@@ -3809,8 +3843,8 @@
           <p:nvPr/>
         </p:nvSpPr>
         <p:spPr>
-          <a:xfrm rot="2118385">
-            <a:off x="1672405" y="1929661"/>
+          <a:xfrm rot="2653489">
+            <a:off x="1487661" y="1911364"/>
             <a:ext cx="1163810" cy="307777"/>
           </a:xfrm>
           <a:prstGeom prst="rect">
@@ -3845,7 +3879,7 @@
         </p:nvSpPr>
         <p:spPr>
           <a:xfrm>
-            <a:off x="2562383" y="2162043"/>
+            <a:off x="2376477" y="2162043"/>
             <a:ext cx="1530088" cy="712399"/>
           </a:xfrm>
           <a:prstGeom prst="ellipse">
@@ -3899,7 +3933,7 @@
         <p:spPr>
           <a:xfrm>
             <a:off x="1658976" y="1747476"/>
-            <a:ext cx="903407" cy="770767"/>
+            <a:ext cx="717501" cy="770767"/>
           </a:xfrm>
           <a:prstGeom prst="straightConnector1">
             <a:avLst/>
@@ -4788,7 +4822,7 @@
         </p:nvSpPr>
         <p:spPr>
           <a:xfrm>
-            <a:off x="6466875" y="1242637"/>
+            <a:off x="6524746" y="1234083"/>
             <a:ext cx="977388" cy="307777"/>
           </a:xfrm>
           <a:prstGeom prst="rect">
@@ -4899,7 +4933,7 @@
         </p:nvSpPr>
         <p:spPr>
           <a:xfrm>
-            <a:off x="5671373" y="3500861"/>
+            <a:off x="5755559" y="3906926"/>
             <a:ext cx="1745673" cy="887437"/>
           </a:xfrm>
           <a:prstGeom prst="ellipse">
@@ -4954,13 +4988,14 @@
           <p:cNvCxnSpPr>
             <a:cxnSpLocks/>
             <a:stCxn id="33" idx="4"/>
+            <a:endCxn id="48" idx="2"/>
           </p:cNvCxnSpPr>
           <p:nvPr/>
         </p:nvCxnSpPr>
         <p:spPr>
           <a:xfrm>
             <a:off x="5614068" y="1911608"/>
-            <a:ext cx="486159" cy="1653662"/>
+            <a:ext cx="141491" cy="2439037"/>
           </a:xfrm>
           <a:prstGeom prst="straightConnector1">
             <a:avLst/>
@@ -4997,8 +5032,8 @@
           <p:nvPr/>
         </p:nvSpPr>
         <p:spPr>
-          <a:xfrm rot="4333310">
-            <a:off x="5452422" y="2355782"/>
+          <a:xfrm rot="4874124">
+            <a:off x="5279546" y="2188617"/>
             <a:ext cx="977388" cy="307777"/>
           </a:xfrm>
           <a:prstGeom prst="rect">
@@ -5929,8 +5964,8 @@
         </p:nvCxnSpPr>
         <p:spPr>
           <a:xfrm flipH="1">
-            <a:off x="7417046" y="3458671"/>
-            <a:ext cx="2691788" cy="485909"/>
+            <a:off x="7501232" y="3458671"/>
+            <a:ext cx="2607602" cy="891974"/>
           </a:xfrm>
           <a:prstGeom prst="straightConnector1">
             <a:avLst/>
@@ -5968,7 +6003,7 @@
         </p:nvSpPr>
         <p:spPr>
           <a:xfrm rot="21279365">
-            <a:off x="8790726" y="3360533"/>
+            <a:off x="8790727" y="3534688"/>
             <a:ext cx="977388" cy="307777"/>
           </a:xfrm>
           <a:prstGeom prst="rect">
@@ -6007,8 +6042,8 @@
         </p:nvCxnSpPr>
         <p:spPr>
           <a:xfrm flipH="1" flipV="1">
-            <a:off x="7161398" y="4258336"/>
-            <a:ext cx="2966915" cy="1034344"/>
+            <a:off x="7245584" y="4664401"/>
+            <a:ext cx="2882729" cy="628279"/>
           </a:xfrm>
           <a:prstGeom prst="straightConnector1">
             <a:avLst/>
@@ -6201,7 +6236,7 @@
         </p:nvSpPr>
         <p:spPr>
           <a:xfrm rot="1442086">
-            <a:off x="9042591" y="4831514"/>
+            <a:off x="9169063" y="4980060"/>
             <a:ext cx="977388" cy="307777"/>
           </a:xfrm>
           <a:prstGeom prst="rect">
@@ -6449,7 +6484,7 @@
         </p:nvSpPr>
         <p:spPr>
           <a:xfrm>
-            <a:off x="3256719" y="3244859"/>
+            <a:off x="3217899" y="3234646"/>
             <a:ext cx="1841785" cy="887437"/>
           </a:xfrm>
           <a:prstGeom prst="ellipse">
@@ -6667,8 +6702,8 @@
         </p:nvCxnSpPr>
         <p:spPr>
           <a:xfrm flipV="1">
-            <a:off x="1588665" y="4388298"/>
-            <a:ext cx="4955545" cy="930714"/>
+            <a:off x="1588665" y="4794363"/>
+            <a:ext cx="5039731" cy="524649"/>
           </a:xfrm>
           <a:prstGeom prst="straightConnector1">
             <a:avLst/>
@@ -6705,8 +6740,8 @@
           <p:nvPr/>
         </p:nvSpPr>
         <p:spPr>
-          <a:xfrm rot="20613541">
-            <a:off x="2123535" y="4858797"/>
+          <a:xfrm rot="20939386">
+            <a:off x="2229712" y="4961443"/>
             <a:ext cx="977388" cy="307777"/>
           </a:xfrm>
           <a:prstGeom prst="rect">
@@ -6901,12 +6936,12 @@
         </p:nvCxnSpPr>
         <p:spPr>
           <a:xfrm rot="16200000" flipH="1">
-            <a:off x="3092270" y="3046954"/>
-            <a:ext cx="100262" cy="2070422"/>
+            <a:off x="3077967" y="3061257"/>
+            <a:ext cx="90049" cy="2031602"/>
           </a:xfrm>
           <a:prstGeom prst="bentConnector3">
             <a:avLst>
-              <a:gd name="adj1" fmla="val 328003"/>
+              <a:gd name="adj1" fmla="val 353862"/>
             </a:avLst>
           </a:prstGeom>
           <a:ln>
@@ -7061,13 +7096,13 @@
         </p:nvCxnSpPr>
         <p:spPr>
           <a:xfrm rot="5400000" flipH="1" flipV="1">
-            <a:off x="4806764" y="3710594"/>
+            <a:off x="4767944" y="3700381"/>
             <a:ext cx="313756" cy="269723"/>
           </a:xfrm>
           <a:prstGeom prst="bentConnector4">
             <a:avLst>
-              <a:gd name="adj1" fmla="val -27470"/>
-              <a:gd name="adj2" fmla="val 210000"/>
+              <a:gd name="adj1" fmla="val -114281"/>
+              <a:gd name="adj2" fmla="val 184754"/>
             </a:avLst>
           </a:prstGeom>
           <a:ln>
@@ -7103,7 +7138,7 @@
         </p:nvSpPr>
         <p:spPr>
           <a:xfrm>
-            <a:off x="5044150" y="3698479"/>
+            <a:off x="4966078" y="3747472"/>
             <a:ext cx="977388" cy="307777"/>
           </a:xfrm>
           <a:prstGeom prst="rect">
@@ -7173,7 +7208,7 @@
         </p:nvSpPr>
         <p:spPr>
           <a:xfrm>
-            <a:off x="4195656" y="2132582"/>
+            <a:off x="4031493" y="2132582"/>
             <a:ext cx="1532492" cy="764998"/>
           </a:xfrm>
           <a:prstGeom prst="ellipse">
@@ -7225,8 +7260,8 @@
         </p:nvCxnSpPr>
         <p:spPr>
           <a:xfrm flipV="1">
-            <a:off x="4828781" y="2897580"/>
-            <a:ext cx="133121" cy="477241"/>
+            <a:off x="4789961" y="2897580"/>
+            <a:ext cx="7778" cy="467028"/>
           </a:xfrm>
           <a:prstGeom prst="straightConnector1">
             <a:avLst/>
@@ -7267,8 +7302,8 @@
         </p:nvCxnSpPr>
         <p:spPr>
           <a:xfrm flipH="1">
-            <a:off x="3868395" y="2244613"/>
-            <a:ext cx="551689" cy="21758"/>
+            <a:off x="3682489" y="2244613"/>
+            <a:ext cx="573432" cy="21758"/>
           </a:xfrm>
           <a:prstGeom prst="straightConnector1">
             <a:avLst/>
@@ -7344,12 +7379,12 @@
         </p:nvCxnSpPr>
         <p:spPr>
           <a:xfrm rot="16200000" flipH="1">
-            <a:off x="5176795" y="1917688"/>
+            <a:off x="5012632" y="1917688"/>
             <a:ext cx="112031" cy="541818"/>
           </a:xfrm>
           <a:prstGeom prst="bentConnector3">
             <a:avLst>
-              <a:gd name="adj1" fmla="val -151953"/>
+              <a:gd name="adj1" fmla="val -204051"/>
             </a:avLst>
           </a:prstGeom>
           <a:ln>
@@ -7423,7 +7458,7 @@
         </p:nvCxnSpPr>
         <p:spPr>
           <a:xfrm rot="5400000" flipH="1" flipV="1">
-            <a:off x="3545747" y="2551794"/>
+            <a:off x="3359841" y="2551794"/>
             <a:ext cx="104328" cy="540968"/>
           </a:xfrm>
           <a:prstGeom prst="bentConnector3">
@@ -7467,7 +7502,7 @@
         </p:nvCxnSpPr>
         <p:spPr>
           <a:xfrm flipH="1" flipV="1">
-            <a:off x="1848591" y="1602640"/>
+            <a:off x="1662685" y="1602640"/>
             <a:ext cx="1478836" cy="559403"/>
           </a:xfrm>
           <a:prstGeom prst="straightConnector1">
@@ -7506,7 +7541,7 @@
         </p:nvSpPr>
         <p:spPr>
           <a:xfrm>
-            <a:off x="3305287" y="2857398"/>
+            <a:off x="3229613" y="2847194"/>
             <a:ext cx="977388" cy="307777"/>
           </a:xfrm>
           <a:prstGeom prst="rect">
@@ -7541,7 +7576,7 @@
         </p:nvSpPr>
         <p:spPr>
           <a:xfrm>
-            <a:off x="2592084" y="1919611"/>
+            <a:off x="2515506" y="1822702"/>
             <a:ext cx="977388" cy="307777"/>
           </a:xfrm>
           <a:prstGeom prst="rect">
@@ -7572,14 +7607,13 @@
             </a:extLst>
           </p:cNvPr>
           <p:cNvCxnSpPr>
-            <a:stCxn id="48" idx="4"/>
-            <a:endCxn id="48" idx="5"/>
+            <a:cxnSpLocks/>
           </p:cNvCxnSpPr>
           <p:nvPr/>
         </p:nvCxnSpPr>
         <p:spPr>
           <a:xfrm rot="5400000" flipH="1" flipV="1">
-            <a:off x="6787823" y="4014723"/>
+            <a:off x="6890807" y="4420788"/>
             <a:ext cx="129962" cy="617188"/>
           </a:xfrm>
           <a:prstGeom prst="bentConnector3">
@@ -7619,9 +7653,9 @@
           <p:nvPr/>
         </p:nvSpPr>
         <p:spPr>
-          <a:xfrm rot="4764260">
-            <a:off x="5911926" y="2180027"/>
-            <a:ext cx="977388" cy="307777"/>
+          <a:xfrm rot="4633298">
+            <a:off x="5496125" y="3650953"/>
+            <a:ext cx="1625650" cy="307777"/>
           </a:xfrm>
           <a:prstGeom prst="rect">
             <a:avLst/>
@@ -7636,7 +7670,11 @@
           <a:p>
             <a:r>
               <a:rPr lang="it-IT" sz="1400" dirty="0"/>
-              <a:t> !RO &amp; 6</a:t>
+              <a:t> </a:t>
+            </a:r>
+            <a:r>
+              <a:rPr lang="it-IT" sz="1200" dirty="0"/>
+              <a:t>!RO &amp; (6 or 7)</a:t>
             </a:r>
           </a:p>
         </p:txBody>
@@ -7655,7 +7693,7 @@
         </p:nvSpPr>
         <p:spPr>
           <a:xfrm>
-            <a:off x="5813319" y="4545506"/>
+            <a:off x="6843274" y="4734965"/>
             <a:ext cx="1356329" cy="307777"/>
           </a:xfrm>
           <a:prstGeom prst="rect">
@@ -7671,7 +7709,7 @@
           <a:p>
             <a:r>
               <a:rPr lang="it-IT" sz="1400" dirty="0"/>
-              <a:t> RO or C8&lt;50</a:t>
+              <a:t> RO </a:t>
             </a:r>
           </a:p>
         </p:txBody>
@@ -7686,15 +7724,15 @@
             </a:extLst>
           </p:cNvPr>
           <p:cNvCxnSpPr>
-            <a:stCxn id="48" idx="0"/>
-            <a:endCxn id="33" idx="5"/>
+            <a:cxnSpLocks/>
+            <a:endCxn id="120" idx="4"/>
           </p:cNvCxnSpPr>
           <p:nvPr/>
         </p:nvCxnSpPr>
         <p:spPr>
           <a:xfrm flipH="1" flipV="1">
-            <a:off x="6231256" y="1781646"/>
-            <a:ext cx="312954" cy="1719215"/>
+            <a:off x="6303729" y="3111263"/>
+            <a:ext cx="130389" cy="920770"/>
           </a:xfrm>
           <a:prstGeom prst="straightConnector1">
             <a:avLst/>
@@ -7735,8 +7773,8 @@
         </p:nvCxnSpPr>
         <p:spPr>
           <a:xfrm flipH="1">
-            <a:off x="971477" y="4258336"/>
-            <a:ext cx="4955544" cy="930714"/>
+            <a:off x="971477" y="4664401"/>
+            <a:ext cx="5039730" cy="524649"/>
           </a:xfrm>
           <a:prstGeom prst="straightConnector1">
             <a:avLst/>
@@ -7774,7 +7812,7 @@
         </p:nvSpPr>
         <p:spPr>
           <a:xfrm rot="21149181">
-            <a:off x="4257011" y="4270116"/>
+            <a:off x="3254898" y="4669293"/>
             <a:ext cx="977388" cy="307777"/>
           </a:xfrm>
           <a:prstGeom prst="rect">
@@ -7812,8 +7850,8 @@
         </p:nvCxnSpPr>
         <p:spPr>
           <a:xfrm flipV="1">
-            <a:off x="7161398" y="3588633"/>
-            <a:ext cx="3610085" cy="669703"/>
+            <a:off x="7245584" y="3588633"/>
+            <a:ext cx="3525899" cy="1075768"/>
           </a:xfrm>
           <a:prstGeom prst="straightConnector1">
             <a:avLst/>
@@ -7850,8 +7888,8 @@
           <p:nvPr/>
         </p:nvSpPr>
         <p:spPr>
-          <a:xfrm rot="20991032">
-            <a:off x="8403037" y="3889290"/>
+          <a:xfrm rot="20208128">
+            <a:off x="8707418" y="4011551"/>
             <a:ext cx="977388" cy="307777"/>
           </a:xfrm>
           <a:prstGeom prst="rect">
@@ -7889,8 +7927,8 @@
         </p:nvCxnSpPr>
         <p:spPr>
           <a:xfrm>
-            <a:off x="7161398" y="4258336"/>
-            <a:ext cx="2692437" cy="1348101"/>
+            <a:off x="7245584" y="4664401"/>
+            <a:ext cx="2608251" cy="942036"/>
           </a:xfrm>
           <a:prstGeom prst="straightConnector1">
             <a:avLst/>
@@ -7927,8 +7965,8 @@
           <p:nvPr/>
         </p:nvSpPr>
         <p:spPr>
-          <a:xfrm rot="1666090">
-            <a:off x="8721440" y="5038222"/>
+          <a:xfrm rot="1473257">
+            <a:off x="8770535" y="5348940"/>
             <a:ext cx="977388" cy="307777"/>
           </a:xfrm>
           <a:prstGeom prst="rect">
@@ -7960,19 +7998,17 @@
           </p:cNvPr>
           <p:cNvCxnSpPr>
             <a:cxnSpLocks/>
-            <a:stCxn id="4" idx="7"/>
-            <a:endCxn id="48" idx="0"/>
           </p:cNvCxnSpPr>
           <p:nvPr/>
         </p:nvCxnSpPr>
         <p:spPr>
           <a:xfrm rot="16200000" flipH="1">
-            <a:off x="4169073" y="1125724"/>
-            <a:ext cx="2346727" cy="2403546"/>
+            <a:off x="3971463" y="1266217"/>
+            <a:ext cx="2752792" cy="2487732"/>
           </a:xfrm>
           <a:prstGeom prst="bentConnector3">
             <a:avLst>
-              <a:gd name="adj1" fmla="val -26471"/>
+              <a:gd name="adj1" fmla="val -13025"/>
             </a:avLst>
           </a:prstGeom>
           <a:ln>
@@ -8044,7 +8080,7 @@
         </p:nvSpPr>
         <p:spPr>
           <a:xfrm rot="5400000">
-            <a:off x="6210625" y="2008566"/>
+            <a:off x="6222424" y="834469"/>
             <a:ext cx="977388" cy="307777"/>
           </a:xfrm>
           <a:prstGeom prst="rect">
@@ -8081,9 +8117,9 @@
           <p:nvPr/>
         </p:nvCxnSpPr>
         <p:spPr>
-          <a:xfrm flipH="1">
-            <a:off x="7161398" y="1781647"/>
-            <a:ext cx="49819" cy="1849176"/>
+          <a:xfrm>
+            <a:off x="7211217" y="1781647"/>
+            <a:ext cx="34367" cy="2255241"/>
           </a:xfrm>
           <a:prstGeom prst="straightConnector1">
             <a:avLst/>
@@ -8118,13 +8154,14 @@
           </p:cNvPr>
           <p:cNvCxnSpPr>
             <a:cxnSpLocks/>
+            <a:stCxn id="48" idx="0"/>
           </p:cNvCxnSpPr>
           <p:nvPr/>
         </p:nvCxnSpPr>
         <p:spPr>
           <a:xfrm flipV="1">
-            <a:off x="6779016" y="1677696"/>
-            <a:ext cx="273537" cy="1910937"/>
+            <a:off x="6628396" y="1788261"/>
+            <a:ext cx="539047" cy="2118665"/>
           </a:xfrm>
           <a:prstGeom prst="straightConnector1">
             <a:avLst/>
@@ -8158,14 +8195,16 @@
             </a:extLst>
           </p:cNvPr>
           <p:cNvCxnSpPr>
+            <a:cxnSpLocks/>
             <a:stCxn id="63" idx="3"/>
+            <a:endCxn id="48" idx="7"/>
           </p:cNvCxnSpPr>
           <p:nvPr/>
         </p:nvCxnSpPr>
         <p:spPr>
           <a:xfrm flipH="1">
-            <a:off x="7339711" y="1794174"/>
-            <a:ext cx="2807591" cy="1918982"/>
+            <a:off x="7245584" y="1794174"/>
+            <a:ext cx="2901718" cy="2242714"/>
           </a:xfrm>
           <a:prstGeom prst="straightConnector1">
             <a:avLst/>
@@ -8201,13 +8240,14 @@
           <p:cNvCxnSpPr>
             <a:cxnSpLocks/>
             <a:stCxn id="62" idx="1"/>
+            <a:endCxn id="48" idx="4"/>
           </p:cNvCxnSpPr>
           <p:nvPr/>
         </p:nvCxnSpPr>
         <p:spPr>
           <a:xfrm flipH="1" flipV="1">
-            <a:off x="6955569" y="4340265"/>
-            <a:ext cx="93170" cy="961341"/>
+            <a:off x="6628396" y="4794363"/>
+            <a:ext cx="420343" cy="507243"/>
           </a:xfrm>
           <a:prstGeom prst="straightConnector1">
             <a:avLst/>
@@ -8245,7 +8285,7 @@
         </p:nvSpPr>
         <p:spPr>
           <a:xfrm rot="21361740">
-            <a:off x="6920919" y="4907461"/>
+            <a:off x="6862692" y="5014571"/>
             <a:ext cx="977388" cy="307777"/>
           </a:xfrm>
           <a:prstGeom prst="rect">
@@ -8349,8 +8389,8 @@
           <p:nvPr/>
         </p:nvSpPr>
         <p:spPr>
-          <a:xfrm rot="16733143">
-            <a:off x="6019287" y="2513338"/>
+          <a:xfrm rot="17039190">
+            <a:off x="6037427" y="2679453"/>
             <a:ext cx="1978822" cy="307777"/>
           </a:xfrm>
           <a:prstGeom prst="rect">
@@ -8366,7 +8406,7 @@
           <a:p>
             <a:r>
               <a:rPr lang="it-IT" sz="1400" dirty="0"/>
-              <a:t> !RO &amp; (7 or 9 or 12)</a:t>
+              <a:t> !RO &amp; ( 9 or 12)</a:t>
             </a:r>
           </a:p>
         </p:txBody>
@@ -8417,6 +8457,286 @@
           </a:fontRef>
         </p:style>
       </p:cxnSp>
+      <p:sp>
+        <p:nvSpPr>
+          <p:cNvPr id="120" name="Ovale 119">
+            <a:extLst>
+              <a:ext uri="{FF2B5EF4-FFF2-40B4-BE49-F238E27FC236}">
+                <a16:creationId xmlns:a16="http://schemas.microsoft.com/office/drawing/2014/main" id="{61B4C90E-52F6-4B3F-B2A4-45CEBFAFF445}"/>
+              </a:ext>
+            </a:extLst>
+          </p:cNvPr>
+          <p:cNvSpPr/>
+          <p:nvPr/>
+        </p:nvSpPr>
+        <p:spPr>
+          <a:xfrm rot="21107237">
+            <a:off x="5665869" y="2585339"/>
+            <a:ext cx="1200205" cy="528635"/>
+          </a:xfrm>
+          <a:prstGeom prst="ellipse">
+            <a:avLst/>
+          </a:prstGeom>
+        </p:spPr>
+        <p:style>
+          <a:lnRef idx="2">
+            <a:schemeClr val="accent1">
+              <a:shade val="50000"/>
+            </a:schemeClr>
+          </a:lnRef>
+          <a:fillRef idx="1">
+            <a:schemeClr val="accent1"/>
+          </a:fillRef>
+          <a:effectRef idx="0">
+            <a:schemeClr val="accent1"/>
+          </a:effectRef>
+          <a:fontRef idx="minor">
+            <a:schemeClr val="lt1"/>
+          </a:fontRef>
+        </p:style>
+        <p:txBody>
+          <a:bodyPr rtlCol="0" anchor="ctr"/>
+          <a:lstStyle/>
+          <a:p>
+            <a:pPr algn="ctr"/>
+            <a:r>
+              <a:rPr lang="it-IT" sz="1100" dirty="0"/>
+              <a:t>Dai precedenza(19)</a:t>
+            </a:r>
+          </a:p>
+        </p:txBody>
+      </p:sp>
+      <p:cxnSp>
+        <p:nvCxnSpPr>
+          <p:cNvPr id="157" name="Connettore 2 156">
+            <a:extLst>
+              <a:ext uri="{FF2B5EF4-FFF2-40B4-BE49-F238E27FC236}">
+                <a16:creationId xmlns:a16="http://schemas.microsoft.com/office/drawing/2014/main" id="{D3B70C4B-A7F7-420C-899D-748203EDBE5C}"/>
+              </a:ext>
+            </a:extLst>
+          </p:cNvPr>
+          <p:cNvCxnSpPr>
+            <a:stCxn id="120" idx="0"/>
+          </p:cNvCxnSpPr>
+          <p:nvPr/>
+        </p:nvCxnSpPr>
+        <p:spPr>
+          <a:xfrm flipH="1" flipV="1">
+            <a:off x="6011207" y="1865898"/>
+            <a:ext cx="217008" cy="722152"/>
+          </a:xfrm>
+          <a:prstGeom prst="straightConnector1">
+            <a:avLst/>
+          </a:prstGeom>
+          <a:ln>
+            <a:tailEnd type="triangle"/>
+          </a:ln>
+        </p:spPr>
+        <p:style>
+          <a:lnRef idx="1">
+            <a:schemeClr val="accent1"/>
+          </a:lnRef>
+          <a:fillRef idx="0">
+            <a:schemeClr val="accent1"/>
+          </a:fillRef>
+          <a:effectRef idx="0">
+            <a:schemeClr val="accent1"/>
+          </a:effectRef>
+          <a:fontRef idx="minor">
+            <a:schemeClr val="tx1"/>
+          </a:fontRef>
+        </p:style>
+      </p:cxnSp>
+      <p:cxnSp>
+        <p:nvCxnSpPr>
+          <p:cNvPr id="160" name="Connettore 2 159">
+            <a:extLst>
+              <a:ext uri="{FF2B5EF4-FFF2-40B4-BE49-F238E27FC236}">
+                <a16:creationId xmlns:a16="http://schemas.microsoft.com/office/drawing/2014/main" id="{82AC8F8F-8884-4EA9-BB15-C23DD550FD48}"/>
+              </a:ext>
+            </a:extLst>
+          </p:cNvPr>
+          <p:cNvCxnSpPr>
+            <a:stCxn id="120" idx="0"/>
+          </p:cNvCxnSpPr>
+          <p:nvPr/>
+        </p:nvCxnSpPr>
+        <p:spPr>
+          <a:xfrm flipV="1">
+            <a:off x="6228215" y="1693626"/>
+            <a:ext cx="827564" cy="894424"/>
+          </a:xfrm>
+          <a:prstGeom prst="straightConnector1">
+            <a:avLst/>
+          </a:prstGeom>
+          <a:ln>
+            <a:tailEnd type="triangle"/>
+          </a:ln>
+        </p:spPr>
+        <p:style>
+          <a:lnRef idx="1">
+            <a:schemeClr val="accent1"/>
+          </a:lnRef>
+          <a:fillRef idx="0">
+            <a:schemeClr val="accent1"/>
+          </a:fillRef>
+          <a:effectRef idx="0">
+            <a:schemeClr val="accent1"/>
+          </a:effectRef>
+          <a:fontRef idx="minor">
+            <a:schemeClr val="tx1"/>
+          </a:fontRef>
+        </p:style>
+      </p:cxnSp>
+      <p:sp>
+        <p:nvSpPr>
+          <p:cNvPr id="184" name="CasellaDiTesto 183">
+            <a:extLst>
+              <a:ext uri="{FF2B5EF4-FFF2-40B4-BE49-F238E27FC236}">
+                <a16:creationId xmlns:a16="http://schemas.microsoft.com/office/drawing/2014/main" id="{E761C9DD-EAAB-49EF-BBEA-87B45EBE35FF}"/>
+              </a:ext>
+            </a:extLst>
+          </p:cNvPr>
+          <p:cNvSpPr txBox="1"/>
+          <p:nvPr/>
+        </p:nvSpPr>
+        <p:spPr>
+          <a:xfrm rot="4438211">
+            <a:off x="5710364" y="2044893"/>
+            <a:ext cx="977388" cy="307777"/>
+          </a:xfrm>
+          <a:prstGeom prst="rect">
+            <a:avLst/>
+          </a:prstGeom>
+          <a:noFill/>
+        </p:spPr>
+        <p:txBody>
+          <a:bodyPr wrap="square" rtlCol="0">
+            <a:spAutoFit/>
+          </a:bodyPr>
+          <a:lstStyle/>
+          <a:p>
+            <a:r>
+              <a:rPr lang="it-IT" sz="1400" dirty="0"/>
+              <a:t> !RO &amp; -6</a:t>
+            </a:r>
+          </a:p>
+        </p:txBody>
+      </p:sp>
+      <p:sp>
+        <p:nvSpPr>
+          <p:cNvPr id="185" name="CasellaDiTesto 184">
+            <a:extLst>
+              <a:ext uri="{FF2B5EF4-FFF2-40B4-BE49-F238E27FC236}">
+                <a16:creationId xmlns:a16="http://schemas.microsoft.com/office/drawing/2014/main" id="{079E6D35-09E1-4FAD-AD54-B5A7D72DC1E7}"/>
+              </a:ext>
+            </a:extLst>
+          </p:cNvPr>
+          <p:cNvSpPr txBox="1"/>
+          <p:nvPr/>
+        </p:nvSpPr>
+        <p:spPr>
+          <a:xfrm rot="18763718">
+            <a:off x="6290912" y="1983615"/>
+            <a:ext cx="977388" cy="307777"/>
+          </a:xfrm>
+          <a:prstGeom prst="rect">
+            <a:avLst/>
+          </a:prstGeom>
+          <a:noFill/>
+        </p:spPr>
+        <p:txBody>
+          <a:bodyPr wrap="square" rtlCol="0">
+            <a:spAutoFit/>
+          </a:bodyPr>
+          <a:lstStyle/>
+          <a:p>
+            <a:r>
+              <a:rPr lang="it-IT" sz="1400" dirty="0"/>
+              <a:t> !RO &amp; -7</a:t>
+            </a:r>
+          </a:p>
+        </p:txBody>
+      </p:sp>
+      <p:cxnSp>
+        <p:nvCxnSpPr>
+          <p:cNvPr id="166" name="Connettore a gomito 165">
+            <a:extLst>
+              <a:ext uri="{FF2B5EF4-FFF2-40B4-BE49-F238E27FC236}">
+                <a16:creationId xmlns:a16="http://schemas.microsoft.com/office/drawing/2014/main" id="{16FFDE11-8B5B-4121-A932-82782CE6F20B}"/>
+              </a:ext>
+            </a:extLst>
+          </p:cNvPr>
+          <p:cNvCxnSpPr>
+            <a:cxnSpLocks/>
+            <a:endCxn id="120" idx="2"/>
+          </p:cNvCxnSpPr>
+          <p:nvPr/>
+        </p:nvCxnSpPr>
+        <p:spPr>
+          <a:xfrm rot="10800000" flipV="1">
+            <a:off x="5672024" y="2577175"/>
+            <a:ext cx="582185" cy="358206"/>
+          </a:xfrm>
+          <a:prstGeom prst="bentConnector3">
+            <a:avLst>
+              <a:gd name="adj1" fmla="val 115260"/>
+            </a:avLst>
+          </a:prstGeom>
+          <a:ln>
+            <a:tailEnd type="triangle"/>
+          </a:ln>
+        </p:spPr>
+        <p:style>
+          <a:lnRef idx="1">
+            <a:schemeClr val="accent1"/>
+          </a:lnRef>
+          <a:fillRef idx="0">
+            <a:schemeClr val="accent1"/>
+          </a:fillRef>
+          <a:effectRef idx="0">
+            <a:schemeClr val="accent1"/>
+          </a:effectRef>
+          <a:fontRef idx="minor">
+            <a:schemeClr val="tx1"/>
+          </a:fontRef>
+        </p:style>
+      </p:cxnSp>
+      <p:sp>
+        <p:nvSpPr>
+          <p:cNvPr id="192" name="CasellaDiTesto 191">
+            <a:extLst>
+              <a:ext uri="{FF2B5EF4-FFF2-40B4-BE49-F238E27FC236}">
+                <a16:creationId xmlns:a16="http://schemas.microsoft.com/office/drawing/2014/main" id="{E659048E-402A-4554-82F2-A611A9434FBD}"/>
+              </a:ext>
+            </a:extLst>
+          </p:cNvPr>
+          <p:cNvSpPr txBox="1"/>
+          <p:nvPr/>
+        </p:nvSpPr>
+        <p:spPr>
+          <a:xfrm>
+            <a:off x="5543344" y="2367753"/>
+            <a:ext cx="977388" cy="307777"/>
+          </a:xfrm>
+          <a:prstGeom prst="rect">
+            <a:avLst/>
+          </a:prstGeom>
+          <a:noFill/>
+        </p:spPr>
+        <p:txBody>
+          <a:bodyPr wrap="square" rtlCol="0">
+            <a:spAutoFit/>
+          </a:bodyPr>
+          <a:lstStyle/>
+          <a:p>
+            <a:r>
+              <a:rPr lang="it-IT" sz="1400" dirty="0"/>
+              <a:t> C19&lt;ta</a:t>
+            </a:r>
+          </a:p>
+        </p:txBody>
+      </p:sp>
     </p:spTree>
     <p:extLst>
       <p:ext uri="{BB962C8B-B14F-4D97-AF65-F5344CB8AC3E}">

</xml_diff>